<commit_message>
power point draft 3
</commit_message>
<xml_diff>
--- a/presentazione/presentazione.pptx
+++ b/presentazione/presentazione.pptx
@@ -4830,7 +4830,9 @@
         </p:nvSpPr>
         <p:spPr/>
         <p:txBody>
-          <a:bodyPr/>
+          <a:bodyPr>
+            <a:normAutofit lnSpcReduction="10000"/>
+          </a:bodyPr>
           <a:lstStyle/>
           <a:p>
             <a:r>
@@ -4839,6 +4841,12 @@
             </a:r>
           </a:p>
           <a:p>
+            <a:pPr marL="0" indent="0">
+              <a:buNone/>
+            </a:pPr>
+            <a:endParaRPr lang="it-IT" dirty="0"/>
+          </a:p>
+          <a:p>
             <a:r>
               <a:rPr lang="it-IT" dirty="0"/>
               <a:t>Valutare il modello </a:t>
@@ -4853,11 +4861,10 @@
             </a:r>
           </a:p>
           <a:p>
-            <a:pPr lvl="1"/>
-            <a:r>
-              <a:rPr lang="it-IT" dirty="0"/>
-              <a:t>Comportamento con feature di utenti, oggetti e contesto diverso</a:t>
-            </a:r>
+            <a:pPr marL="0" indent="0">
+              <a:buNone/>
+            </a:pPr>
+            <a:endParaRPr lang="it-IT" dirty="0"/>
           </a:p>
           <a:p>
             <a:r>
@@ -4872,6 +4879,12 @@
               <a:rPr lang="it-IT" dirty="0"/>
               <a:t> nel tempo</a:t>
             </a:r>
+          </a:p>
+          <a:p>
+            <a:pPr marL="0" indent="0">
+              <a:buNone/>
+            </a:pPr>
+            <a:endParaRPr lang="it-IT" dirty="0"/>
           </a:p>
           <a:p>
             <a:r>
@@ -5070,11 +5083,11 @@
             </a:r>
             <a:r>
               <a:rPr lang="it-IT" b="0" i="0" u="none" strike="noStrike" baseline="0" dirty="0"/>
-              <a:t>entità generica che </a:t>
+              <a:t>la definizione è generica e può </a:t>
             </a:r>
             <a:r>
               <a:rPr lang="it-IT" dirty="0"/>
-              <a:t>può includere film, libri, vestiti, punti di interesse</a:t>
+              <a:t>includere film, libri, vestiti, punti di interesse, etc.</a:t>
             </a:r>
           </a:p>
           <a:p>
@@ -5104,7 +5117,7 @@
             </a:r>
             <a:r>
               <a:rPr lang="it-IT" b="0" i="0" u="none" strike="noStrike" baseline="0" dirty="0"/>
-              <a:t>situazione dell’utente nel momento in cui ha generato un feedback (posizione, attività utente, persone in prossimità…)</a:t>
+              <a:t>situazione dell’utente nel momento in cui ha generato un feedback (posizione, attività utente, persone in prossimità, data e ora…)</a:t>
             </a:r>
           </a:p>
           <a:p>
@@ -5632,12 +5645,23 @@
               <a:rPr lang="it-IT" dirty="0" err="1"/>
               <a:t>factorization</a:t>
             </a:r>
-            <a:endParaRPr lang="it-IT" dirty="0"/>
-          </a:p>
-          <a:p>
             <a:r>
               <a:rPr lang="it-IT" dirty="0"/>
-              <a:t>Stato dell’arte per i </a:t>
+              <a:t> (ECAM </a:t>
+            </a:r>
+            <a:r>
+              <a:rPr lang="it-IT" dirty="0" err="1"/>
+              <a:t>NeuMF</a:t>
+            </a:r>
+            <a:r>
+              <a:rPr lang="it-IT" dirty="0"/>
+              <a:t>)</a:t>
+            </a:r>
+          </a:p>
+          <a:p>
+            <a:r>
+              <a:rPr lang="it-IT" dirty="0"/>
+              <a:t>Sistema di raccomandazione </a:t>
             </a:r>
             <a:r>
               <a:rPr lang="it-IT" dirty="0" err="1"/>
@@ -5645,13 +5669,13 @@
             </a:r>
             <a:r>
               <a:rPr lang="it-IT" dirty="0"/>
-              <a:t> RS</a:t>
+              <a:t> stato dell’arte</a:t>
             </a:r>
           </a:p>
           <a:p>
             <a:r>
               <a:rPr lang="it-IT" dirty="0"/>
-              <a:t>Combinazione di una rete neurale e l’approccio </a:t>
+              <a:t>Combina una rete neurale con l’approccio </a:t>
             </a:r>
             <a:r>
               <a:rPr lang="it-IT" dirty="0" err="1"/>
@@ -5851,8 +5875,8 @@
           </a:prstGeom>
         </p:spPr>
       </p:pic>
-      <mc:AlternateContent xmlns:mc="http://schemas.openxmlformats.org/markup-compatibility/2006">
-        <mc:Choice xmlns:a14="http://schemas.microsoft.com/office/drawing/2010/main" Requires="a14">
+      <mc:AlternateContent xmlns:mc="http://schemas.openxmlformats.org/markup-compatibility/2006" xmlns:a14="http://schemas.microsoft.com/office/drawing/2010/main">
+        <mc:Choice Requires="a14">
           <p:sp>
             <p:nvSpPr>
               <p:cNvPr id="11" name="CasellaDiTesto 10">
@@ -6129,7 +6153,7 @@
             </p:txBody>
           </p:sp>
         </mc:Choice>
-        <mc:Fallback>
+        <mc:Fallback xmlns="">
           <p:sp>
             <p:nvSpPr>
               <p:cNvPr id="11" name="CasellaDiTesto 10">
@@ -6698,7 +6722,7 @@
         <p:spPr>
           <a:xfrm>
             <a:off x="51371" y="2153999"/>
-            <a:ext cx="3984402" cy="2585323"/>
+            <a:ext cx="3984402" cy="3970318"/>
           </a:xfrm>
           <a:prstGeom prst="rect">
             <a:avLst/>
@@ -6721,13 +6745,66 @@
             </a:r>
           </a:p>
           <a:p>
-            <a:endParaRPr lang="it-IT" dirty="0"/>
-          </a:p>
-          <a:p>
             <a:pPr marL="285750" indent="-285750">
               <a:buFont typeface="Arial" panose="020B0604020202020204" pitchFamily="34" charset="0"/>
               <a:buChar char="•"/>
             </a:pPr>
+            <a:endParaRPr lang="it-IT" dirty="0"/>
+          </a:p>
+          <a:p>
+            <a:pPr marL="285750" indent="-285750">
+              <a:buFont typeface="Arial" panose="020B0604020202020204" pitchFamily="34" charset="0"/>
+              <a:buChar char="•"/>
+            </a:pPr>
+            <a:r>
+              <a:rPr lang="it-IT" dirty="0"/>
+              <a:t>Modelli di confronto:</a:t>
+            </a:r>
+          </a:p>
+          <a:p>
+            <a:pPr marL="742950" lvl="1" indent="-285750">
+              <a:buFont typeface="Arial" panose="020B0604020202020204" pitchFamily="34" charset="0"/>
+              <a:buChar char="•"/>
+            </a:pPr>
+            <a:r>
+              <a:rPr lang="it-IT" dirty="0"/>
+              <a:t>ALS</a:t>
+            </a:r>
+          </a:p>
+          <a:p>
+            <a:pPr marL="742950" lvl="1" indent="-285750">
+              <a:buFont typeface="Arial" panose="020B0604020202020204" pitchFamily="34" charset="0"/>
+              <a:buChar char="•"/>
+            </a:pPr>
+            <a:r>
+              <a:rPr lang="it-IT" dirty="0" err="1"/>
+              <a:t>NeuMF</a:t>
+            </a:r>
+            <a:endParaRPr lang="it-IT" dirty="0"/>
+          </a:p>
+          <a:p>
+            <a:pPr marL="742950" lvl="1" indent="-285750">
+              <a:buFont typeface="Arial" panose="020B0604020202020204" pitchFamily="34" charset="0"/>
+              <a:buChar char="•"/>
+            </a:pPr>
+            <a:r>
+              <a:rPr lang="it-IT" dirty="0"/>
+              <a:t>ECAM </a:t>
+            </a:r>
+            <a:r>
+              <a:rPr lang="it-IT" dirty="0" err="1"/>
+              <a:t>NeuMF</a:t>
+            </a:r>
+            <a:endParaRPr lang="it-IT" dirty="0"/>
+          </a:p>
+          <a:p>
+            <a:endParaRPr lang="it-IT" dirty="0"/>
+          </a:p>
+          <a:p>
+            <a:pPr marL="285750" indent="-285750">
+              <a:buFont typeface="Arial" panose="020B0604020202020204" pitchFamily="34" charset="0"/>
+              <a:buChar char="•"/>
+            </a:pPr>
             <a:r>
               <a:rPr lang="it-IT" dirty="0"/>
               <a:t>I modelli </a:t>
@@ -6738,7 +6815,7 @@
             </a:r>
             <a:r>
               <a:rPr lang="it-IT" dirty="0"/>
-              <a:t> hanno un AUC più alta</a:t>
+              <a:t> hanno l’AUC più alta</a:t>
             </a:r>
           </a:p>
           <a:p>

</xml_diff>

<commit_message>
power point checked 1
</commit_message>
<xml_diff>
--- a/presentazione/presentazione.pptx
+++ b/presentazione/presentazione.pptx
@@ -5,25 +5,27 @@
     <p:sldMasterId id="2147483797" r:id="rId1"/>
   </p:sldMasterIdLst>
   <p:notesMasterIdLst>
-    <p:notesMasterId r:id="rId15"/>
+    <p:notesMasterId r:id="rId17"/>
   </p:notesMasterIdLst>
   <p:handoutMasterIdLst>
-    <p:handoutMasterId r:id="rId16"/>
+    <p:handoutMasterId r:id="rId18"/>
   </p:handoutMasterIdLst>
   <p:sldIdLst>
     <p:sldId id="256" r:id="rId2"/>
     <p:sldId id="258" r:id="rId3"/>
-    <p:sldId id="257" r:id="rId4"/>
-    <p:sldId id="267" r:id="rId5"/>
-    <p:sldId id="272" r:id="rId6"/>
-    <p:sldId id="266" r:id="rId7"/>
-    <p:sldId id="270" r:id="rId8"/>
-    <p:sldId id="261" r:id="rId9"/>
-    <p:sldId id="262" r:id="rId10"/>
-    <p:sldId id="263" r:id="rId11"/>
-    <p:sldId id="264" r:id="rId12"/>
-    <p:sldId id="265" r:id="rId13"/>
-    <p:sldId id="268" r:id="rId14"/>
+    <p:sldId id="273" r:id="rId4"/>
+    <p:sldId id="257" r:id="rId5"/>
+    <p:sldId id="267" r:id="rId6"/>
+    <p:sldId id="272" r:id="rId7"/>
+    <p:sldId id="266" r:id="rId8"/>
+    <p:sldId id="270" r:id="rId9"/>
+    <p:sldId id="261" r:id="rId10"/>
+    <p:sldId id="274" r:id="rId11"/>
+    <p:sldId id="262" r:id="rId12"/>
+    <p:sldId id="263" r:id="rId13"/>
+    <p:sldId id="264" r:id="rId14"/>
+    <p:sldId id="265" r:id="rId15"/>
+    <p:sldId id="268" r:id="rId16"/>
   </p:sldIdLst>
   <p:sldSz cx="9144000" cy="6858000" type="screen4x3"/>
   <p:notesSz cx="6858000" cy="9144000"/>
@@ -1188,7 +1190,7 @@
             <a:fld id="{558B94EF-AFA9-40FF-986C-F27447FA4EE9}" type="slidenum">
               <a:rPr lang="en-GB" altLang="it-IT" smtClean="0"/>
               <a:pPr/>
-              <a:t>3</a:t>
+              <a:t>4</a:t>
             </a:fld>
             <a:endParaRPr lang="en-GB" altLang="it-IT"/>
           </a:p>
@@ -1273,7 +1275,7 @@
             <a:fld id="{558B94EF-AFA9-40FF-986C-F27447FA4EE9}" type="slidenum">
               <a:rPr lang="en-GB" altLang="it-IT" smtClean="0"/>
               <a:pPr/>
-              <a:t>5</a:t>
+              <a:t>6</a:t>
             </a:fld>
             <a:endParaRPr lang="en-GB" altLang="it-IT"/>
           </a:p>
@@ -4763,6 +4765,444 @@
 <file path=ppt/slides/slide10.xml><?xml version="1.0" encoding="utf-8"?>
 <p:sld xmlns:a="http://schemas.openxmlformats.org/drawingml/2006/main" xmlns:r="http://schemas.openxmlformats.org/officeDocument/2006/relationships" xmlns:p="http://schemas.openxmlformats.org/presentationml/2006/main">
   <p:cSld>
+    <p:spTree>
+      <p:nvGrpSpPr>
+        <p:cNvPr id="1" name=""/>
+        <p:cNvGrpSpPr/>
+        <p:nvPr/>
+      </p:nvGrpSpPr>
+      <p:grpSpPr>
+        <a:xfrm>
+          <a:off x="0" y="0"/>
+          <a:ext cx="0" cy="0"/>
+          <a:chOff x="0" y="0"/>
+          <a:chExt cx="0" cy="0"/>
+        </a:xfrm>
+      </p:grpSpPr>
+      <p:sp>
+        <p:nvSpPr>
+          <p:cNvPr id="2" name="Titolo 1">
+            <a:extLst>
+              <a:ext uri="{FF2B5EF4-FFF2-40B4-BE49-F238E27FC236}">
+                <a16:creationId xmlns:a16="http://schemas.microsoft.com/office/drawing/2014/main" id="{46E9E1F8-8C38-4444-9E91-AEA784B6981E}"/>
+              </a:ext>
+            </a:extLst>
+          </p:cNvPr>
+          <p:cNvSpPr>
+            <a:spLocks noGrp="1"/>
+          </p:cNvSpPr>
+          <p:nvPr>
+            <p:ph type="title"/>
+          </p:nvPr>
+        </p:nvSpPr>
+        <p:spPr/>
+        <p:txBody>
+          <a:bodyPr/>
+          <a:lstStyle/>
+          <a:p>
+            <a:pPr algn="ctr"/>
+            <a:r>
+              <a:rPr lang="it-IT" dirty="0"/>
+              <a:t>Valutazione</a:t>
+            </a:r>
+          </a:p>
+        </p:txBody>
+      </p:sp>
+      <p:sp>
+        <p:nvSpPr>
+          <p:cNvPr id="3" name="Segnaposto contenuto 2">
+            <a:extLst>
+              <a:ext uri="{FF2B5EF4-FFF2-40B4-BE49-F238E27FC236}">
+                <a16:creationId xmlns:a16="http://schemas.microsoft.com/office/drawing/2014/main" id="{751510C9-6594-4046-8B7F-321272A9BB79}"/>
+              </a:ext>
+            </a:extLst>
+          </p:cNvPr>
+          <p:cNvSpPr>
+            <a:spLocks noGrp="1"/>
+          </p:cNvSpPr>
+          <p:nvPr>
+            <p:ph idx="1"/>
+          </p:nvPr>
+        </p:nvSpPr>
+        <p:spPr/>
+        <p:txBody>
+          <a:bodyPr/>
+          <a:lstStyle/>
+          <a:p>
+            <a:r>
+              <a:rPr lang="it-IT" dirty="0"/>
+              <a:t>Ottenere prestazioni comparabili agli algoritmi stato dell’arte</a:t>
+            </a:r>
+          </a:p>
+          <a:p>
+            <a:r>
+              <a:rPr lang="it-IT" dirty="0"/>
+              <a:t>Mantenere tempi di esecuzione bassi</a:t>
+            </a:r>
+          </a:p>
+          <a:p>
+            <a:r>
+              <a:rPr lang="it-IT" dirty="0"/>
+              <a:t>Metrica: Area Under the ROC Curve</a:t>
+            </a:r>
+          </a:p>
+          <a:p>
+            <a:r>
+              <a:rPr lang="it-IT" dirty="0"/>
+              <a:t>K-</a:t>
+            </a:r>
+            <a:r>
+              <a:rPr lang="it-IT" dirty="0" err="1"/>
+              <a:t>fold</a:t>
+            </a:r>
+            <a:r>
+              <a:rPr lang="it-IT" dirty="0"/>
+              <a:t> cross </a:t>
+            </a:r>
+            <a:r>
+              <a:rPr lang="it-IT" dirty="0" err="1"/>
+              <a:t>validation</a:t>
+            </a:r>
+            <a:endParaRPr lang="it-IT" dirty="0"/>
+          </a:p>
+          <a:p>
+            <a:r>
+              <a:rPr lang="it-IT" dirty="0"/>
+              <a:t>Modelli di confronto:</a:t>
+            </a:r>
+          </a:p>
+          <a:p>
+            <a:pPr lvl="1"/>
+            <a:r>
+              <a:rPr lang="it-IT" dirty="0"/>
+              <a:t>ALS</a:t>
+            </a:r>
+          </a:p>
+          <a:p>
+            <a:pPr lvl="1"/>
+            <a:r>
+              <a:rPr lang="it-IT" dirty="0" err="1"/>
+              <a:t>NeuMF</a:t>
+            </a:r>
+            <a:endParaRPr lang="it-IT" dirty="0"/>
+          </a:p>
+          <a:p>
+            <a:pPr lvl="1"/>
+            <a:r>
+              <a:rPr lang="it-IT" dirty="0"/>
+              <a:t>ECAM </a:t>
+            </a:r>
+            <a:r>
+              <a:rPr lang="it-IT" dirty="0" err="1"/>
+              <a:t>NeuMF</a:t>
+            </a:r>
+            <a:endParaRPr lang="it-IT" dirty="0"/>
+          </a:p>
+          <a:p>
+            <a:endParaRPr lang="it-IT" dirty="0"/>
+          </a:p>
+        </p:txBody>
+      </p:sp>
+    </p:spTree>
+    <p:extLst>
+      <p:ext uri="{BB962C8B-B14F-4D97-AF65-F5344CB8AC3E}">
+        <p14:creationId xmlns:p14="http://schemas.microsoft.com/office/powerpoint/2010/main" val="541751724"/>
+      </p:ext>
+    </p:extLst>
+  </p:cSld>
+  <p:clrMapOvr>
+    <a:masterClrMapping/>
+  </p:clrMapOvr>
+</p:sld>
+</file>
+
+<file path=ppt/slides/slide11.xml><?xml version="1.0" encoding="utf-8"?>
+<p:sld xmlns:a="http://schemas.openxmlformats.org/drawingml/2006/main" xmlns:r="http://schemas.openxmlformats.org/officeDocument/2006/relationships" xmlns:p="http://schemas.openxmlformats.org/presentationml/2006/main">
+  <p:cSld>
+    <p:spTree>
+      <p:nvGrpSpPr>
+        <p:cNvPr id="1" name=""/>
+        <p:cNvGrpSpPr/>
+        <p:nvPr/>
+      </p:nvGrpSpPr>
+      <p:grpSpPr>
+        <a:xfrm>
+          <a:off x="0" y="0"/>
+          <a:ext cx="0" cy="0"/>
+          <a:chOff x="0" y="0"/>
+          <a:chExt cx="0" cy="0"/>
+        </a:xfrm>
+      </p:grpSpPr>
+      <p:sp>
+        <p:nvSpPr>
+          <p:cNvPr id="2" name="Titolo 1">
+            <a:extLst>
+              <a:ext uri="{FF2B5EF4-FFF2-40B4-BE49-F238E27FC236}">
+                <a16:creationId xmlns:a16="http://schemas.microsoft.com/office/drawing/2014/main" id="{43EAF889-71E4-403D-B7D3-14CE26366C96}"/>
+              </a:ext>
+            </a:extLst>
+          </p:cNvPr>
+          <p:cNvSpPr>
+            <a:spLocks noGrp="1"/>
+          </p:cNvSpPr>
+          <p:nvPr>
+            <p:ph type="title"/>
+          </p:nvPr>
+        </p:nvSpPr>
+        <p:spPr>
+          <a:xfrm>
+            <a:off x="756783" y="188640"/>
+            <a:ext cx="2562119" cy="400772"/>
+          </a:xfrm>
+        </p:spPr>
+        <p:txBody>
+          <a:bodyPr vert="horz" lIns="91440" tIns="45720" rIns="91440" bIns="45720" rtlCol="0" anchor="ctr">
+            <a:normAutofit fontScale="90000"/>
+          </a:bodyPr>
+          <a:lstStyle/>
+          <a:p>
+            <a:pPr defTabSz="914400"/>
+            <a:r>
+              <a:rPr lang="en-US" sz="4400" kern="1200" dirty="0" err="1">
+                <a:latin typeface="+mj-lt"/>
+                <a:ea typeface="+mj-ea"/>
+                <a:cs typeface="+mj-cs"/>
+              </a:rPr>
+              <a:t>Risultati</a:t>
+            </a:r>
+            <a:endParaRPr lang="en-US" sz="4400" kern="1200" dirty="0">
+              <a:latin typeface="+mj-lt"/>
+              <a:ea typeface="+mj-ea"/>
+              <a:cs typeface="+mj-cs"/>
+            </a:endParaRPr>
+          </a:p>
+        </p:txBody>
+      </p:sp>
+      <p:pic>
+        <p:nvPicPr>
+          <p:cNvPr id="17" name="Segnaposto contenuto 16">
+            <a:extLst>
+              <a:ext uri="{FF2B5EF4-FFF2-40B4-BE49-F238E27FC236}">
+                <a16:creationId xmlns:a16="http://schemas.microsoft.com/office/drawing/2014/main" id="{28C8BA65-1CC5-4CD8-941C-2D5BD2C214BD}"/>
+              </a:ext>
+            </a:extLst>
+          </p:cNvPr>
+          <p:cNvPicPr>
+            <a:picLocks noGrp="1" noChangeAspect="1"/>
+          </p:cNvPicPr>
+          <p:nvPr>
+            <p:ph sz="half" idx="2"/>
+          </p:nvPr>
+        </p:nvPicPr>
+        <p:blipFill>
+          <a:blip r:embed="rId2">
+            <a:extLst>
+              <a:ext uri="{28A0092B-C50C-407E-A947-70E740481C1C}">
+                <a14:useLocalDpi xmlns:a14="http://schemas.microsoft.com/office/drawing/2010/main" val="0"/>
+              </a:ext>
+              <a:ext uri="{96DAC541-7B7A-43D3-8B79-37D633B846F1}">
+                <asvg:svgBlip xmlns:asvg="http://schemas.microsoft.com/office/drawing/2016/SVG/main" r:embed="rId3"/>
+              </a:ext>
+            </a:extLst>
+          </a:blip>
+          <a:stretch>
+            <a:fillRect/>
+          </a:stretch>
+        </p:blipFill>
+        <p:spPr>
+          <a:xfrm>
+            <a:off x="4024313" y="21357"/>
+            <a:ext cx="5012184" cy="3148305"/>
+          </a:xfrm>
+        </p:spPr>
+      </p:pic>
+      <p:pic>
+        <p:nvPicPr>
+          <p:cNvPr id="20" name="Segnaposto contenuto 19">
+            <a:extLst>
+              <a:ext uri="{FF2B5EF4-FFF2-40B4-BE49-F238E27FC236}">
+                <a16:creationId xmlns:a16="http://schemas.microsoft.com/office/drawing/2014/main" id="{90B773DD-FCF5-4576-9C9D-3F81BFC5846E}"/>
+              </a:ext>
+            </a:extLst>
+          </p:cNvPr>
+          <p:cNvPicPr>
+            <a:picLocks noGrp="1" noChangeAspect="1"/>
+          </p:cNvPicPr>
+          <p:nvPr>
+            <p:ph sz="quarter" idx="4"/>
+          </p:nvPr>
+        </p:nvPicPr>
+        <p:blipFill>
+          <a:blip r:embed="rId4">
+            <a:extLst>
+              <a:ext uri="{28A0092B-C50C-407E-A947-70E740481C1C}">
+                <a14:useLocalDpi xmlns:a14="http://schemas.microsoft.com/office/drawing/2010/main" val="0"/>
+              </a:ext>
+              <a:ext uri="{96DAC541-7B7A-43D3-8B79-37D633B846F1}">
+                <asvg:svgBlip xmlns:asvg="http://schemas.microsoft.com/office/drawing/2016/SVG/main" r:embed="rId5"/>
+              </a:ext>
+            </a:extLst>
+          </a:blip>
+          <a:stretch>
+            <a:fillRect/>
+          </a:stretch>
+        </p:blipFill>
+        <p:spPr>
+          <a:xfrm>
+            <a:off x="4024313" y="3378788"/>
+            <a:ext cx="5006714" cy="3144869"/>
+          </a:xfrm>
+        </p:spPr>
+      </p:pic>
+      <p:sp>
+        <p:nvSpPr>
+          <p:cNvPr id="30" name="CasellaDiTesto 29">
+            <a:extLst>
+              <a:ext uri="{FF2B5EF4-FFF2-40B4-BE49-F238E27FC236}">
+                <a16:creationId xmlns:a16="http://schemas.microsoft.com/office/drawing/2014/main" id="{814A474E-75D0-4267-A552-64BE3B93B90D}"/>
+              </a:ext>
+            </a:extLst>
+          </p:cNvPr>
+          <p:cNvSpPr txBox="1"/>
+          <p:nvPr/>
+        </p:nvSpPr>
+        <p:spPr>
+          <a:xfrm>
+            <a:off x="-8111" y="2413337"/>
+            <a:ext cx="4091905" cy="3139321"/>
+          </a:xfrm>
+          <a:prstGeom prst="rect">
+            <a:avLst/>
+          </a:prstGeom>
+          <a:noFill/>
+        </p:spPr>
+        <p:txBody>
+          <a:bodyPr wrap="square" rtlCol="0">
+            <a:spAutoFit/>
+          </a:bodyPr>
+          <a:lstStyle/>
+          <a:p>
+            <a:endParaRPr lang="it-IT" dirty="0"/>
+          </a:p>
+          <a:p>
+            <a:pPr marL="285750" indent="-285750">
+              <a:buFont typeface="Arial" panose="020B0604020202020204" pitchFamily="34" charset="0"/>
+              <a:buChar char="•"/>
+            </a:pPr>
+            <a:r>
+              <a:rPr lang="it-IT" dirty="0"/>
+              <a:t>I modelli </a:t>
+            </a:r>
+            <a:r>
+              <a:rPr lang="it-IT" dirty="0" err="1"/>
+              <a:t>context-aware</a:t>
+            </a:r>
+            <a:r>
+              <a:rPr lang="it-IT" dirty="0"/>
+              <a:t> (</a:t>
+            </a:r>
+            <a:r>
+              <a:rPr lang="it-IT" dirty="0" err="1"/>
+              <a:t>moveCARS</a:t>
+            </a:r>
+            <a:r>
+              <a:rPr lang="it-IT" dirty="0"/>
+              <a:t>, ECAM </a:t>
+            </a:r>
+            <a:r>
+              <a:rPr lang="it-IT" dirty="0" err="1"/>
+              <a:t>NeuMF</a:t>
+            </a:r>
+            <a:r>
+              <a:rPr lang="it-IT" dirty="0"/>
+              <a:t>) hanno l’AUC più alta</a:t>
+            </a:r>
+          </a:p>
+          <a:p>
+            <a:pPr marL="285750" indent="-285750">
+              <a:buFont typeface="Arial" panose="020B0604020202020204" pitchFamily="34" charset="0"/>
+              <a:buChar char="•"/>
+            </a:pPr>
+            <a:endParaRPr lang="it-IT" dirty="0"/>
+          </a:p>
+          <a:p>
+            <a:pPr marL="285750" indent="-285750">
+              <a:buFont typeface="Arial" panose="020B0604020202020204" pitchFamily="34" charset="0"/>
+              <a:buChar char="•"/>
+            </a:pPr>
+            <a:r>
+              <a:rPr lang="it-IT" dirty="0" err="1"/>
+              <a:t>moveCARS</a:t>
+            </a:r>
+            <a:r>
+              <a:rPr lang="it-IT" dirty="0"/>
+              <a:t> ha ottenuto risultati simili al modello </a:t>
+            </a:r>
+            <a:r>
+              <a:rPr lang="it-IT" dirty="0" err="1"/>
+              <a:t>context-aware</a:t>
+            </a:r>
+            <a:r>
+              <a:rPr lang="it-IT" dirty="0"/>
+              <a:t> stato dell’arte ECAM </a:t>
+            </a:r>
+            <a:r>
+              <a:rPr lang="it-IT" dirty="0" err="1"/>
+              <a:t>NeuMF</a:t>
+            </a:r>
+            <a:endParaRPr lang="it-IT" dirty="0"/>
+          </a:p>
+          <a:p>
+            <a:pPr marL="285750" indent="-285750">
+              <a:buFont typeface="Arial" panose="020B0604020202020204" pitchFamily="34" charset="0"/>
+              <a:buChar char="•"/>
+            </a:pPr>
+            <a:endParaRPr lang="it-IT" dirty="0"/>
+          </a:p>
+          <a:p>
+            <a:pPr marL="285750" indent="-285750">
+              <a:buFont typeface="Arial" panose="020B0604020202020204" pitchFamily="34" charset="0"/>
+              <a:buChar char="•"/>
+            </a:pPr>
+            <a:r>
+              <a:rPr lang="it-IT" dirty="0"/>
+              <a:t>La differenza tra modelli non </a:t>
+            </a:r>
+            <a:r>
+              <a:rPr lang="it-IT" dirty="0" err="1"/>
+              <a:t>context-aware</a:t>
+            </a:r>
+            <a:r>
+              <a:rPr lang="it-IT" dirty="0"/>
+              <a:t> e </a:t>
+            </a:r>
+            <a:r>
+              <a:rPr lang="it-IT" dirty="0" err="1"/>
+              <a:t>context-aware</a:t>
+            </a:r>
+            <a:r>
+              <a:rPr lang="it-IT" dirty="0"/>
+              <a:t> è maggiore su MDF</a:t>
+            </a:r>
+          </a:p>
+        </p:txBody>
+      </p:sp>
+    </p:spTree>
+    <p:extLst>
+      <p:ext uri="{BB962C8B-B14F-4D97-AF65-F5344CB8AC3E}">
+        <p14:creationId xmlns:p14="http://schemas.microsoft.com/office/powerpoint/2010/main" val="3288315151"/>
+      </p:ext>
+    </p:extLst>
+  </p:cSld>
+  <p:clrMapOvr>
+    <a:masterClrMapping/>
+  </p:clrMapOvr>
+</p:sld>
+</file>
+
+<file path=ppt/slides/slide12.xml><?xml version="1.0" encoding="utf-8"?>
+<p:sld xmlns:a="http://schemas.openxmlformats.org/drawingml/2006/main" xmlns:r="http://schemas.openxmlformats.org/officeDocument/2006/relationships" xmlns:p="http://schemas.openxmlformats.org/presentationml/2006/main">
+  <p:cSld>
     <p:bg>
       <p:bgPr>
         <a:solidFill>
@@ -5043,255 +5483,6 @@
 </p:sld>
 </file>
 
-<file path=ppt/slides/slide11.xml><?xml version="1.0" encoding="utf-8"?>
-<p:sld xmlns:a="http://schemas.openxmlformats.org/drawingml/2006/main" xmlns:r="http://schemas.openxmlformats.org/officeDocument/2006/relationships" xmlns:p="http://schemas.openxmlformats.org/presentationml/2006/main">
-  <p:cSld>
-    <p:spTree>
-      <p:nvGrpSpPr>
-        <p:cNvPr id="1" name=""/>
-        <p:cNvGrpSpPr/>
-        <p:nvPr/>
-      </p:nvGrpSpPr>
-      <p:grpSpPr>
-        <a:xfrm>
-          <a:off x="0" y="0"/>
-          <a:ext cx="0" cy="0"/>
-          <a:chOff x="0" y="0"/>
-          <a:chExt cx="0" cy="0"/>
-        </a:xfrm>
-      </p:grpSpPr>
-      <p:sp>
-        <p:nvSpPr>
-          <p:cNvPr id="2" name="Titolo 1">
-            <a:extLst>
-              <a:ext uri="{FF2B5EF4-FFF2-40B4-BE49-F238E27FC236}">
-                <a16:creationId xmlns:a16="http://schemas.microsoft.com/office/drawing/2014/main" id="{152980A4-3E84-4C09-8F59-8706C4B25284}"/>
-              </a:ext>
-            </a:extLst>
-          </p:cNvPr>
-          <p:cNvSpPr>
-            <a:spLocks noGrp="1"/>
-          </p:cNvSpPr>
-          <p:nvPr>
-            <p:ph type="title"/>
-          </p:nvPr>
-        </p:nvSpPr>
-        <p:spPr/>
-        <p:txBody>
-          <a:bodyPr/>
-          <a:lstStyle/>
-          <a:p>
-            <a:pPr algn="ctr"/>
-            <a:r>
-              <a:rPr lang="it-IT" dirty="0"/>
-              <a:t>Conclusioni</a:t>
-            </a:r>
-          </a:p>
-        </p:txBody>
-      </p:sp>
-      <p:sp>
-        <p:nvSpPr>
-          <p:cNvPr id="3" name="Segnaposto contenuto 2">
-            <a:extLst>
-              <a:ext uri="{FF2B5EF4-FFF2-40B4-BE49-F238E27FC236}">
-                <a16:creationId xmlns:a16="http://schemas.microsoft.com/office/drawing/2014/main" id="{1F9BD3DC-3555-44D3-9C15-FF91C6F96FE2}"/>
-              </a:ext>
-            </a:extLst>
-          </p:cNvPr>
-          <p:cNvSpPr>
-            <a:spLocks noGrp="1"/>
-          </p:cNvSpPr>
-          <p:nvPr>
-            <p:ph idx="1"/>
-          </p:nvPr>
-        </p:nvSpPr>
-        <p:spPr/>
-        <p:txBody>
-          <a:bodyPr/>
-          <a:lstStyle/>
-          <a:p>
-            <a:r>
-              <a:rPr lang="it-IT" dirty="0" err="1"/>
-              <a:t>moveCARS</a:t>
-            </a:r>
-            <a:r>
-              <a:rPr lang="it-IT" dirty="0"/>
-              <a:t> ha ottenuto risultati simili alle soluzioni stato dell’arte:</a:t>
-            </a:r>
-          </a:p>
-          <a:p>
-            <a:pPr lvl="1"/>
-            <a:r>
-              <a:rPr lang="it-IT" dirty="0"/>
-              <a:t>Con tempi di esecuzione minori</a:t>
-            </a:r>
-          </a:p>
-          <a:p>
-            <a:pPr lvl="1"/>
-            <a:r>
-              <a:rPr lang="it-IT" dirty="0"/>
-              <a:t>Con una struttura della rete meno restrittiva</a:t>
-            </a:r>
-          </a:p>
-          <a:p>
-            <a:r>
-              <a:rPr lang="it-IT" dirty="0"/>
-              <a:t>Il contesto ha un ruolo importante nelle raccomandazioni</a:t>
-            </a:r>
-          </a:p>
-          <a:p>
-            <a:r>
-              <a:rPr lang="it-IT" dirty="0"/>
-              <a:t>Se il contesto è molto descrittivo della situazione dell’utente le raccomandazioni sono ancora più precise</a:t>
-            </a:r>
-          </a:p>
-          <a:p>
-            <a:endParaRPr lang="it-IT" dirty="0"/>
-          </a:p>
-        </p:txBody>
-      </p:sp>
-    </p:spTree>
-    <p:extLst>
-      <p:ext uri="{BB962C8B-B14F-4D97-AF65-F5344CB8AC3E}">
-        <p14:creationId xmlns:p14="http://schemas.microsoft.com/office/powerpoint/2010/main" val="354855335"/>
-      </p:ext>
-    </p:extLst>
-  </p:cSld>
-  <p:clrMapOvr>
-    <a:masterClrMapping/>
-  </p:clrMapOvr>
-</p:sld>
-</file>
-
-<file path=ppt/slides/slide12.xml><?xml version="1.0" encoding="utf-8"?>
-<p:sld xmlns:a="http://schemas.openxmlformats.org/drawingml/2006/main" xmlns:r="http://schemas.openxmlformats.org/officeDocument/2006/relationships" xmlns:p="http://schemas.openxmlformats.org/presentationml/2006/main">
-  <p:cSld>
-    <p:spTree>
-      <p:nvGrpSpPr>
-        <p:cNvPr id="1" name=""/>
-        <p:cNvGrpSpPr/>
-        <p:nvPr/>
-      </p:nvGrpSpPr>
-      <p:grpSpPr>
-        <a:xfrm>
-          <a:off x="0" y="0"/>
-          <a:ext cx="0" cy="0"/>
-          <a:chOff x="0" y="0"/>
-          <a:chExt cx="0" cy="0"/>
-        </a:xfrm>
-      </p:grpSpPr>
-      <p:sp>
-        <p:nvSpPr>
-          <p:cNvPr id="2" name="Titolo 1">
-            <a:extLst>
-              <a:ext uri="{FF2B5EF4-FFF2-40B4-BE49-F238E27FC236}">
-                <a16:creationId xmlns:a16="http://schemas.microsoft.com/office/drawing/2014/main" id="{E967507E-1146-4581-B644-0005BC8A387E}"/>
-              </a:ext>
-            </a:extLst>
-          </p:cNvPr>
-          <p:cNvSpPr>
-            <a:spLocks noGrp="1"/>
-          </p:cNvSpPr>
-          <p:nvPr>
-            <p:ph type="title"/>
-          </p:nvPr>
-        </p:nvSpPr>
-        <p:spPr/>
-        <p:txBody>
-          <a:bodyPr/>
-          <a:lstStyle/>
-          <a:p>
-            <a:pPr algn="ctr"/>
-            <a:r>
-              <a:rPr lang="it-IT" dirty="0"/>
-              <a:t>Sviluppi futuri</a:t>
-            </a:r>
-          </a:p>
-        </p:txBody>
-      </p:sp>
-      <p:sp>
-        <p:nvSpPr>
-          <p:cNvPr id="3" name="Segnaposto contenuto 2">
-            <a:extLst>
-              <a:ext uri="{FF2B5EF4-FFF2-40B4-BE49-F238E27FC236}">
-                <a16:creationId xmlns:a16="http://schemas.microsoft.com/office/drawing/2014/main" id="{5570E059-74DD-4635-8D46-0B022D464045}"/>
-              </a:ext>
-            </a:extLst>
-          </p:cNvPr>
-          <p:cNvSpPr>
-            <a:spLocks noGrp="1"/>
-          </p:cNvSpPr>
-          <p:nvPr>
-            <p:ph idx="1"/>
-          </p:nvPr>
-        </p:nvSpPr>
-        <p:spPr/>
-        <p:txBody>
-          <a:bodyPr>
-            <a:normAutofit/>
-          </a:bodyPr>
-          <a:lstStyle/>
-          <a:p>
-            <a:r>
-              <a:rPr lang="it-IT" dirty="0"/>
-              <a:t>Training dell’algoritmo su dispositivo mobile</a:t>
-            </a:r>
-          </a:p>
-          <a:p>
-            <a:pPr marL="0" indent="0">
-              <a:buNone/>
-            </a:pPr>
-            <a:endParaRPr lang="it-IT" dirty="0"/>
-          </a:p>
-          <a:p>
-            <a:r>
-              <a:rPr lang="it-IT" dirty="0"/>
-              <a:t>Valutare il modello </a:t>
-            </a:r>
-            <a:r>
-              <a:rPr lang="it-IT" dirty="0" err="1"/>
-              <a:t>moveCARS</a:t>
-            </a:r>
-            <a:r>
-              <a:rPr lang="it-IT" dirty="0"/>
-              <a:t> su nuovi dataset</a:t>
-            </a:r>
-          </a:p>
-          <a:p>
-            <a:pPr marL="0" indent="0">
-              <a:buNone/>
-            </a:pPr>
-            <a:endParaRPr lang="it-IT" dirty="0"/>
-          </a:p>
-          <a:p>
-            <a:r>
-              <a:rPr lang="it-IT" dirty="0"/>
-              <a:t>Sviluppare un’applicazione per dispositivi mobili per valutare le prestazioni di </a:t>
-            </a:r>
-            <a:r>
-              <a:rPr lang="it-IT" dirty="0" err="1"/>
-              <a:t>moveCARS</a:t>
-            </a:r>
-            <a:r>
-              <a:rPr lang="it-IT" dirty="0"/>
-              <a:t> in ambiente reale</a:t>
-            </a:r>
-          </a:p>
-        </p:txBody>
-      </p:sp>
-    </p:spTree>
-    <p:extLst>
-      <p:ext uri="{BB962C8B-B14F-4D97-AF65-F5344CB8AC3E}">
-        <p14:creationId xmlns:p14="http://schemas.microsoft.com/office/powerpoint/2010/main" val="3978805847"/>
-      </p:ext>
-    </p:extLst>
-  </p:cSld>
-  <p:clrMapOvr>
-    <a:masterClrMapping/>
-  </p:clrMapOvr>
-</p:sld>
-</file>
-
 <file path=ppt/slides/slide13.xml><?xml version="1.0" encoding="utf-8"?>
 <p:sld xmlns:a="http://schemas.openxmlformats.org/drawingml/2006/main" xmlns:r="http://schemas.openxmlformats.org/officeDocument/2006/relationships" xmlns:p="http://schemas.openxmlformats.org/presentationml/2006/main">
   <p:cSld>
@@ -5311,6 +5502,255 @@
       </p:grpSpPr>
       <p:sp>
         <p:nvSpPr>
+          <p:cNvPr id="2" name="Titolo 1">
+            <a:extLst>
+              <a:ext uri="{FF2B5EF4-FFF2-40B4-BE49-F238E27FC236}">
+                <a16:creationId xmlns:a16="http://schemas.microsoft.com/office/drawing/2014/main" id="{152980A4-3E84-4C09-8F59-8706C4B25284}"/>
+              </a:ext>
+            </a:extLst>
+          </p:cNvPr>
+          <p:cNvSpPr>
+            <a:spLocks noGrp="1"/>
+          </p:cNvSpPr>
+          <p:nvPr>
+            <p:ph type="title"/>
+          </p:nvPr>
+        </p:nvSpPr>
+        <p:spPr/>
+        <p:txBody>
+          <a:bodyPr/>
+          <a:lstStyle/>
+          <a:p>
+            <a:pPr algn="ctr"/>
+            <a:r>
+              <a:rPr lang="it-IT" dirty="0"/>
+              <a:t>Conclusioni</a:t>
+            </a:r>
+          </a:p>
+        </p:txBody>
+      </p:sp>
+      <p:sp>
+        <p:nvSpPr>
+          <p:cNvPr id="3" name="Segnaposto contenuto 2">
+            <a:extLst>
+              <a:ext uri="{FF2B5EF4-FFF2-40B4-BE49-F238E27FC236}">
+                <a16:creationId xmlns:a16="http://schemas.microsoft.com/office/drawing/2014/main" id="{1F9BD3DC-3555-44D3-9C15-FF91C6F96FE2}"/>
+              </a:ext>
+            </a:extLst>
+          </p:cNvPr>
+          <p:cNvSpPr>
+            <a:spLocks noGrp="1"/>
+          </p:cNvSpPr>
+          <p:nvPr>
+            <p:ph idx="1"/>
+          </p:nvPr>
+        </p:nvSpPr>
+        <p:spPr/>
+        <p:txBody>
+          <a:bodyPr/>
+          <a:lstStyle/>
+          <a:p>
+            <a:r>
+              <a:rPr lang="it-IT" dirty="0" err="1"/>
+              <a:t>moveCARS</a:t>
+            </a:r>
+            <a:r>
+              <a:rPr lang="it-IT" dirty="0"/>
+              <a:t> ha ottenuto risultati simili alle soluzioni stato dell’arte:</a:t>
+            </a:r>
+          </a:p>
+          <a:p>
+            <a:pPr lvl="1"/>
+            <a:r>
+              <a:rPr lang="it-IT" dirty="0"/>
+              <a:t>Con tempi di esecuzione minori</a:t>
+            </a:r>
+          </a:p>
+          <a:p>
+            <a:pPr lvl="1"/>
+            <a:r>
+              <a:rPr lang="it-IT" dirty="0"/>
+              <a:t>Con una struttura della rete meno restrittiva</a:t>
+            </a:r>
+          </a:p>
+          <a:p>
+            <a:r>
+              <a:rPr lang="it-IT" dirty="0"/>
+              <a:t>Il contesto ha un ruolo importante nelle raccomandazioni</a:t>
+            </a:r>
+          </a:p>
+          <a:p>
+            <a:r>
+              <a:rPr lang="it-IT" dirty="0"/>
+              <a:t>Se il contesto è molto descrittivo della situazione dell’utente le raccomandazioni sono ancora più precise</a:t>
+            </a:r>
+          </a:p>
+          <a:p>
+            <a:endParaRPr lang="it-IT" dirty="0"/>
+          </a:p>
+        </p:txBody>
+      </p:sp>
+    </p:spTree>
+    <p:extLst>
+      <p:ext uri="{BB962C8B-B14F-4D97-AF65-F5344CB8AC3E}">
+        <p14:creationId xmlns:p14="http://schemas.microsoft.com/office/powerpoint/2010/main" val="354855335"/>
+      </p:ext>
+    </p:extLst>
+  </p:cSld>
+  <p:clrMapOvr>
+    <a:masterClrMapping/>
+  </p:clrMapOvr>
+</p:sld>
+</file>
+
+<file path=ppt/slides/slide14.xml><?xml version="1.0" encoding="utf-8"?>
+<p:sld xmlns:a="http://schemas.openxmlformats.org/drawingml/2006/main" xmlns:r="http://schemas.openxmlformats.org/officeDocument/2006/relationships" xmlns:p="http://schemas.openxmlformats.org/presentationml/2006/main">
+  <p:cSld>
+    <p:spTree>
+      <p:nvGrpSpPr>
+        <p:cNvPr id="1" name=""/>
+        <p:cNvGrpSpPr/>
+        <p:nvPr/>
+      </p:nvGrpSpPr>
+      <p:grpSpPr>
+        <a:xfrm>
+          <a:off x="0" y="0"/>
+          <a:ext cx="0" cy="0"/>
+          <a:chOff x="0" y="0"/>
+          <a:chExt cx="0" cy="0"/>
+        </a:xfrm>
+      </p:grpSpPr>
+      <p:sp>
+        <p:nvSpPr>
+          <p:cNvPr id="2" name="Titolo 1">
+            <a:extLst>
+              <a:ext uri="{FF2B5EF4-FFF2-40B4-BE49-F238E27FC236}">
+                <a16:creationId xmlns:a16="http://schemas.microsoft.com/office/drawing/2014/main" id="{E967507E-1146-4581-B644-0005BC8A387E}"/>
+              </a:ext>
+            </a:extLst>
+          </p:cNvPr>
+          <p:cNvSpPr>
+            <a:spLocks noGrp="1"/>
+          </p:cNvSpPr>
+          <p:nvPr>
+            <p:ph type="title"/>
+          </p:nvPr>
+        </p:nvSpPr>
+        <p:spPr/>
+        <p:txBody>
+          <a:bodyPr/>
+          <a:lstStyle/>
+          <a:p>
+            <a:pPr algn="ctr"/>
+            <a:r>
+              <a:rPr lang="it-IT" dirty="0"/>
+              <a:t>Sviluppi futuri</a:t>
+            </a:r>
+          </a:p>
+        </p:txBody>
+      </p:sp>
+      <p:sp>
+        <p:nvSpPr>
+          <p:cNvPr id="3" name="Segnaposto contenuto 2">
+            <a:extLst>
+              <a:ext uri="{FF2B5EF4-FFF2-40B4-BE49-F238E27FC236}">
+                <a16:creationId xmlns:a16="http://schemas.microsoft.com/office/drawing/2014/main" id="{5570E059-74DD-4635-8D46-0B022D464045}"/>
+              </a:ext>
+            </a:extLst>
+          </p:cNvPr>
+          <p:cNvSpPr>
+            <a:spLocks noGrp="1"/>
+          </p:cNvSpPr>
+          <p:nvPr>
+            <p:ph idx="1"/>
+          </p:nvPr>
+        </p:nvSpPr>
+        <p:spPr/>
+        <p:txBody>
+          <a:bodyPr>
+            <a:normAutofit/>
+          </a:bodyPr>
+          <a:lstStyle/>
+          <a:p>
+            <a:r>
+              <a:rPr lang="it-IT" dirty="0"/>
+              <a:t>Training dell’algoritmo su dispositivo mobile</a:t>
+            </a:r>
+          </a:p>
+          <a:p>
+            <a:pPr marL="0" indent="0">
+              <a:buNone/>
+            </a:pPr>
+            <a:endParaRPr lang="it-IT" dirty="0"/>
+          </a:p>
+          <a:p>
+            <a:r>
+              <a:rPr lang="it-IT" dirty="0"/>
+              <a:t>Valutare il modello </a:t>
+            </a:r>
+            <a:r>
+              <a:rPr lang="it-IT" dirty="0" err="1"/>
+              <a:t>moveCARS</a:t>
+            </a:r>
+            <a:r>
+              <a:rPr lang="it-IT" dirty="0"/>
+              <a:t> su nuovi dataset</a:t>
+            </a:r>
+          </a:p>
+          <a:p>
+            <a:pPr marL="0" indent="0">
+              <a:buNone/>
+            </a:pPr>
+            <a:endParaRPr lang="it-IT" dirty="0"/>
+          </a:p>
+          <a:p>
+            <a:r>
+              <a:rPr lang="it-IT" dirty="0"/>
+              <a:t>Sviluppare un’applicazione per dispositivi mobili per valutare le prestazioni di </a:t>
+            </a:r>
+            <a:r>
+              <a:rPr lang="it-IT" dirty="0" err="1"/>
+              <a:t>moveCARS</a:t>
+            </a:r>
+            <a:r>
+              <a:rPr lang="it-IT" dirty="0"/>
+              <a:t> in ambiente reale</a:t>
+            </a:r>
+          </a:p>
+        </p:txBody>
+      </p:sp>
+    </p:spTree>
+    <p:extLst>
+      <p:ext uri="{BB962C8B-B14F-4D97-AF65-F5344CB8AC3E}">
+        <p14:creationId xmlns:p14="http://schemas.microsoft.com/office/powerpoint/2010/main" val="3978805847"/>
+      </p:ext>
+    </p:extLst>
+  </p:cSld>
+  <p:clrMapOvr>
+    <a:masterClrMapping/>
+  </p:clrMapOvr>
+</p:sld>
+</file>
+
+<file path=ppt/slides/slide15.xml><?xml version="1.0" encoding="utf-8"?>
+<p:sld xmlns:a="http://schemas.openxmlformats.org/drawingml/2006/main" xmlns:r="http://schemas.openxmlformats.org/officeDocument/2006/relationships" xmlns:p="http://schemas.openxmlformats.org/presentationml/2006/main">
+  <p:cSld>
+    <p:spTree>
+      <p:nvGrpSpPr>
+        <p:cNvPr id="1" name=""/>
+        <p:cNvGrpSpPr/>
+        <p:nvPr/>
+      </p:nvGrpSpPr>
+      <p:grpSpPr>
+        <a:xfrm>
+          <a:off x="0" y="0"/>
+          <a:ext cx="0" cy="0"/>
+          <a:chOff x="0" y="0"/>
+          <a:chExt cx="0" cy="0"/>
+        </a:xfrm>
+      </p:grpSpPr>
+      <p:sp>
+        <p:nvSpPr>
           <p:cNvPr id="12" name="Titolo 11">
             <a:extLst>
               <a:ext uri="{FF2B5EF4-FFF2-40B4-BE49-F238E27FC236}">
@@ -5340,7 +5780,7 @@
             <a:pPr algn="ctr"/>
             <a:r>
               <a:rPr lang="it-IT" sz="5400" dirty="0"/>
-              <a:t>Grazie per l’attenzione!</a:t>
+              <a:t>Grazie</a:t>
             </a:r>
           </a:p>
         </p:txBody>
@@ -5359,7 +5799,7 @@
 </file>
 
 <file path=ppt/slides/slide2.xml><?xml version="1.0" encoding="utf-8"?>
-<p:sld xmlns:a="http://schemas.openxmlformats.org/drawingml/2006/main" xmlns:r="http://schemas.openxmlformats.org/officeDocument/2006/relationships" xmlns:p="http://schemas.openxmlformats.org/presentationml/2006/main">
+<p:sld xmlns:a="http://schemas.openxmlformats.org/drawingml/2006/main" xmlns:r="http://schemas.openxmlformats.org/officeDocument/2006/relationships" xmlns:p="http://schemas.openxmlformats.org/presentationml/2006/main" show="0">
   <p:cSld>
     <p:spTree>
       <p:nvGrpSpPr>
@@ -5532,6 +5972,169 @@
           <p:cNvPr id="2" name="Titolo 1">
             <a:extLst>
               <a:ext uri="{FF2B5EF4-FFF2-40B4-BE49-F238E27FC236}">
+                <a16:creationId xmlns:a16="http://schemas.microsoft.com/office/drawing/2014/main" id="{408C4C7B-E853-45EB-B3EC-438728329FFF}"/>
+              </a:ext>
+            </a:extLst>
+          </p:cNvPr>
+          <p:cNvSpPr>
+            <a:spLocks noGrp="1"/>
+          </p:cNvSpPr>
+          <p:nvPr>
+            <p:ph type="title"/>
+          </p:nvPr>
+        </p:nvSpPr>
+        <p:spPr>
+          <a:xfrm>
+            <a:off x="628650" y="-171400"/>
+            <a:ext cx="7886700" cy="1325563"/>
+          </a:xfrm>
+        </p:spPr>
+        <p:txBody>
+          <a:bodyPr/>
+          <a:lstStyle/>
+          <a:p>
+            <a:pPr algn="ctr"/>
+            <a:r>
+              <a:rPr lang="it-IT" dirty="0"/>
+              <a:t>Ambiente di riferimento</a:t>
+            </a:r>
+          </a:p>
+        </p:txBody>
+      </p:sp>
+      <p:sp>
+        <p:nvSpPr>
+          <p:cNvPr id="3" name="Segnaposto contenuto 2">
+            <a:extLst>
+              <a:ext uri="{FF2B5EF4-FFF2-40B4-BE49-F238E27FC236}">
+                <a16:creationId xmlns:a16="http://schemas.microsoft.com/office/drawing/2014/main" id="{1092EA9F-6FED-4186-AA52-B095CB45B0D3}"/>
+              </a:ext>
+            </a:extLst>
+          </p:cNvPr>
+          <p:cNvSpPr>
+            <a:spLocks noGrp="1"/>
+          </p:cNvSpPr>
+          <p:nvPr>
+            <p:ph idx="1"/>
+          </p:nvPr>
+        </p:nvSpPr>
+        <p:spPr>
+          <a:xfrm>
+            <a:off x="143508" y="3799426"/>
+            <a:ext cx="8856984" cy="2941941"/>
+          </a:xfrm>
+        </p:spPr>
+        <p:txBody>
+          <a:bodyPr>
+            <a:normAutofit lnSpcReduction="10000"/>
+          </a:bodyPr>
+          <a:lstStyle/>
+          <a:p>
+            <a:r>
+              <a:rPr lang="it-IT" dirty="0"/>
+              <a:t>I dispositivi mobili stanno contribuendo all’evoluzione dello </a:t>
+            </a:r>
+            <a:r>
+              <a:rPr lang="it-IT" dirty="0" err="1"/>
+              <a:t>edge</a:t>
+            </a:r>
+            <a:r>
+              <a:rPr lang="it-IT" dirty="0"/>
+              <a:t> computing</a:t>
+            </a:r>
+          </a:p>
+          <a:p>
+            <a:r>
+              <a:rPr lang="it-IT" dirty="0"/>
+              <a:t>I dispositivi mobili scoprono nuovi contenuti per gli utenti</a:t>
+            </a:r>
+          </a:p>
+          <a:p>
+            <a:r>
+              <a:rPr lang="it-IT" dirty="0"/>
+              <a:t>Un </a:t>
+            </a:r>
+            <a:r>
+              <a:rPr lang="it-IT" dirty="0" err="1"/>
+              <a:t>recommender</a:t>
+            </a:r>
+            <a:r>
+              <a:rPr lang="it-IT" dirty="0"/>
+              <a:t> system (RS) può essere utile per filtrare questi contenuti</a:t>
+            </a:r>
+          </a:p>
+          <a:p>
+            <a:r>
+              <a:rPr lang="it-IT" dirty="0"/>
+              <a:t>La dinamicità dell’ambiente richiede una soluzione che possa eseguire su dispositivo mobile</a:t>
+            </a:r>
+          </a:p>
+        </p:txBody>
+      </p:sp>
+      <p:pic>
+        <p:nvPicPr>
+          <p:cNvPr id="5" name="Immagine 4">
+            <a:extLst>
+              <a:ext uri="{FF2B5EF4-FFF2-40B4-BE49-F238E27FC236}">
+                <a16:creationId xmlns:a16="http://schemas.microsoft.com/office/drawing/2014/main" id="{57ECDB0F-E642-4625-9AC8-157C0837E278}"/>
+              </a:ext>
+            </a:extLst>
+          </p:cNvPr>
+          <p:cNvPicPr>
+            <a:picLocks noChangeAspect="1"/>
+          </p:cNvPicPr>
+          <p:nvPr/>
+        </p:nvPicPr>
+        <p:blipFill>
+          <a:blip r:embed="rId2"/>
+          <a:stretch>
+            <a:fillRect/>
+          </a:stretch>
+        </p:blipFill>
+        <p:spPr>
+          <a:xfrm>
+            <a:off x="3293858" y="908720"/>
+            <a:ext cx="2556284" cy="2826660"/>
+          </a:xfrm>
+          <a:prstGeom prst="rect">
+            <a:avLst/>
+          </a:prstGeom>
+        </p:spPr>
+      </p:pic>
+    </p:spTree>
+    <p:extLst>
+      <p:ext uri="{BB962C8B-B14F-4D97-AF65-F5344CB8AC3E}">
+        <p14:creationId xmlns:p14="http://schemas.microsoft.com/office/powerpoint/2010/main" val="3402772325"/>
+      </p:ext>
+    </p:extLst>
+  </p:cSld>
+  <p:clrMapOvr>
+    <a:masterClrMapping/>
+  </p:clrMapOvr>
+</p:sld>
+</file>
+
+<file path=ppt/slides/slide4.xml><?xml version="1.0" encoding="utf-8"?>
+<p:sld xmlns:a="http://schemas.openxmlformats.org/drawingml/2006/main" xmlns:r="http://schemas.openxmlformats.org/officeDocument/2006/relationships" xmlns:p="http://schemas.openxmlformats.org/presentationml/2006/main">
+  <p:cSld>
+    <p:spTree>
+      <p:nvGrpSpPr>
+        <p:cNvPr id="1" name=""/>
+        <p:cNvGrpSpPr/>
+        <p:nvPr/>
+      </p:nvGrpSpPr>
+      <p:grpSpPr>
+        <a:xfrm>
+          <a:off x="0" y="0"/>
+          <a:ext cx="0" cy="0"/>
+          <a:chOff x="0" y="0"/>
+          <a:chExt cx="0" cy="0"/>
+        </a:xfrm>
+      </p:grpSpPr>
+      <p:sp>
+        <p:nvSpPr>
+          <p:cNvPr id="2" name="Titolo 1">
+            <a:extLst>
+              <a:ext uri="{FF2B5EF4-FFF2-40B4-BE49-F238E27FC236}">
                 <a16:creationId xmlns:a16="http://schemas.microsoft.com/office/drawing/2014/main" id="{6E85C9F5-082B-43A8-B30E-83A00057087C}"/>
               </a:ext>
             </a:extLst>
@@ -5545,7 +6148,7 @@
         </p:nvSpPr>
         <p:spPr>
           <a:xfrm>
-            <a:off x="628650" y="187006"/>
+            <a:off x="628650" y="116632"/>
             <a:ext cx="7886700" cy="696924"/>
           </a:xfrm>
         </p:spPr>
@@ -5579,37 +6182,37 @@
         </p:nvSpPr>
         <p:spPr>
           <a:xfrm>
-            <a:off x="251520" y="3789041"/>
-            <a:ext cx="8640960" cy="2881954"/>
+            <a:off x="251520" y="3569678"/>
+            <a:ext cx="8640960" cy="3171690"/>
           </a:xfrm>
         </p:spPr>
         <p:txBody>
           <a:bodyPr>
-            <a:normAutofit fontScale="92500" lnSpcReduction="10000"/>
+            <a:normAutofit lnSpcReduction="10000"/>
           </a:bodyPr>
           <a:lstStyle/>
           <a:p>
             <a:r>
               <a:rPr lang="it-IT" dirty="0"/>
-              <a:t>Largamente utilizzati da piattaforme di e-commerce,  di streaming, social network, etc.</a:t>
+              <a:t>Generano raccomandazioni personalizzate per gli utenti</a:t>
+            </a:r>
+          </a:p>
+          <a:p>
+            <a:r>
+              <a:rPr lang="it-IT" b="0" i="0" u="none" strike="noStrike" baseline="0" dirty="0"/>
+              <a:t>RS centralizzati: conoscenza globale di tutti gli utenti e oggetti</a:t>
             </a:r>
           </a:p>
           <a:p>
             <a:r>
               <a:rPr lang="it-IT" dirty="0"/>
-              <a:t>Generano raccomandazioni personalizzate per gli utenti</a:t>
-            </a:r>
-          </a:p>
-          <a:p>
-            <a:r>
-              <a:rPr lang="it-IT" b="0" i="0" u="none" strike="noStrike" baseline="0" dirty="0"/>
-              <a:t>Sono sistemi centralizzati con conoscenza globale di tutti gli utenti e oggetti</a:t>
-            </a:r>
-          </a:p>
-          <a:p>
-            <a:r>
-              <a:rPr lang="it-IT" i="0" u="none" strike="noStrike" baseline="0" dirty="0"/>
-              <a:t>Contesto limitato a poche informazioni contestuali</a:t>
+              <a:t>RS mobile: le informazioni sono limitate a quelle raccolte dall’utente locale</a:t>
+            </a:r>
+          </a:p>
+          <a:p>
+            <a:r>
+              <a:rPr lang="it-IT" dirty="0"/>
+              <a:t>Integrare contesto descrittivo</a:t>
             </a:r>
           </a:p>
           <a:p>
@@ -5623,7 +6226,7 @@
             </a:r>
             <a:r>
               <a:rPr lang="it-IT" i="0" u="none" strike="noStrike" baseline="0" dirty="0"/>
-              <a:t> per dispositivi mobili</a:t>
+              <a:t> per dispositivi mobili </a:t>
             </a:r>
           </a:p>
           <a:p>
@@ -5665,7 +6268,7 @@
         </p:blipFill>
         <p:spPr>
           <a:xfrm>
-            <a:off x="1363207" y="959694"/>
+            <a:off x="1403648" y="764704"/>
             <a:ext cx="6417586" cy="2804974"/>
           </a:xfrm>
           <a:prstGeom prst="rect">
@@ -5686,7 +6289,7 @@
 </p:sld>
 </file>
 
-<file path=ppt/slides/slide4.xml><?xml version="1.0" encoding="utf-8"?>
+<file path=ppt/slides/slide5.xml><?xml version="1.0" encoding="utf-8"?>
 <p:sld xmlns:a="http://schemas.openxmlformats.org/drawingml/2006/main" xmlns:r="http://schemas.openxmlformats.org/officeDocument/2006/relationships" xmlns:p="http://schemas.openxmlformats.org/presentationml/2006/main">
   <p:cSld>
     <p:bg>
@@ -5797,8 +6400,8 @@
           </a:prstGeom>
         </p:spPr>
       </p:pic>
-      <mc:AlternateContent xmlns:mc="http://schemas.openxmlformats.org/markup-compatibility/2006">
-        <mc:Choice xmlns:a14="http://schemas.microsoft.com/office/drawing/2010/main" Requires="a14">
+      <mc:AlternateContent xmlns:mc="http://schemas.openxmlformats.org/markup-compatibility/2006" xmlns:a14="http://schemas.microsoft.com/office/drawing/2010/main">
+        <mc:Choice Requires="a14">
           <p:sp>
             <p:nvSpPr>
               <p:cNvPr id="20" name="CasellaDiTesto 19">
@@ -6057,7 +6660,7 @@
             </p:txBody>
           </p:sp>
         </mc:Choice>
-        <mc:Fallback>
+        <mc:Fallback xmlns="">
           <p:sp>
             <p:nvSpPr>
               <p:cNvPr id="20" name="CasellaDiTesto 19">
@@ -6115,7 +6718,7 @@
 </p:sld>
 </file>
 
-<file path=ppt/slides/slide5.xml><?xml version="1.0" encoding="utf-8"?>
+<file path=ppt/slides/slide6.xml><?xml version="1.0" encoding="utf-8"?>
 <p:sld xmlns:a="http://schemas.openxmlformats.org/drawingml/2006/main" xmlns:r="http://schemas.openxmlformats.org/officeDocument/2006/relationships" xmlns:p="http://schemas.openxmlformats.org/presentationml/2006/main">
   <p:cSld>
     <p:spTree>
@@ -6797,7 +7400,7 @@
 </p:sld>
 </file>
 
-<file path=ppt/slides/slide6.xml><?xml version="1.0" encoding="utf-8"?>
+<file path=ppt/slides/slide7.xml><?xml version="1.0" encoding="utf-8"?>
 <p:sld xmlns:a="http://schemas.openxmlformats.org/drawingml/2006/main" xmlns:r="http://schemas.openxmlformats.org/officeDocument/2006/relationships" xmlns:p="http://schemas.openxmlformats.org/presentationml/2006/main">
   <p:cSld>
     <p:spTree>
@@ -7245,7 +7848,7 @@
 </p:sld>
 </file>
 
-<file path=ppt/slides/slide7.xml><?xml version="1.0" encoding="utf-8"?>
+<file path=ppt/slides/slide8.xml><?xml version="1.0" encoding="utf-8"?>
 <p:sld xmlns:a="http://schemas.openxmlformats.org/drawingml/2006/main" xmlns:r="http://schemas.openxmlformats.org/officeDocument/2006/relationships" xmlns:p="http://schemas.openxmlformats.org/presentationml/2006/main">
   <p:cSld>
     <p:spTree>
@@ -7445,367 +8048,6 @@
 </p:sld>
 </file>
 
-<file path=ppt/slides/slide8.xml><?xml version="1.0" encoding="utf-8"?>
-<p:sld xmlns:a="http://schemas.openxmlformats.org/drawingml/2006/main" xmlns:r="http://schemas.openxmlformats.org/officeDocument/2006/relationships" xmlns:p="http://schemas.openxmlformats.org/presentationml/2006/main">
-  <p:cSld>
-    <p:spTree>
-      <p:nvGrpSpPr>
-        <p:cNvPr id="1" name=""/>
-        <p:cNvGrpSpPr/>
-        <p:nvPr/>
-      </p:nvGrpSpPr>
-      <p:grpSpPr>
-        <a:xfrm>
-          <a:off x="0" y="0"/>
-          <a:ext cx="0" cy="0"/>
-          <a:chOff x="0" y="0"/>
-          <a:chExt cx="0" cy="0"/>
-        </a:xfrm>
-      </p:grpSpPr>
-      <p:sp>
-        <p:nvSpPr>
-          <p:cNvPr id="2" name="Titolo 1">
-            <a:extLst>
-              <a:ext uri="{FF2B5EF4-FFF2-40B4-BE49-F238E27FC236}">
-                <a16:creationId xmlns:a16="http://schemas.microsoft.com/office/drawing/2014/main" id="{6B5C8CE6-773B-4C99-A303-3A55CAA756D3}"/>
-              </a:ext>
-            </a:extLst>
-          </p:cNvPr>
-          <p:cNvSpPr>
-            <a:spLocks noGrp="1"/>
-          </p:cNvSpPr>
-          <p:nvPr>
-            <p:ph type="title"/>
-          </p:nvPr>
-        </p:nvSpPr>
-        <p:spPr>
-          <a:xfrm>
-            <a:off x="539552" y="117066"/>
-            <a:ext cx="7886700" cy="421929"/>
-          </a:xfrm>
-        </p:spPr>
-        <p:txBody>
-          <a:bodyPr>
-            <a:noAutofit/>
-          </a:bodyPr>
-          <a:lstStyle/>
-          <a:p>
-            <a:pPr algn="ctr"/>
-            <a:r>
-              <a:rPr lang="it-IT" dirty="0"/>
-              <a:t>Dataset</a:t>
-            </a:r>
-          </a:p>
-        </p:txBody>
-      </p:sp>
-      <p:sp>
-        <p:nvSpPr>
-          <p:cNvPr id="3" name="Segnaposto contenuto 2">
-            <a:extLst>
-              <a:ext uri="{FF2B5EF4-FFF2-40B4-BE49-F238E27FC236}">
-                <a16:creationId xmlns:a16="http://schemas.microsoft.com/office/drawing/2014/main" id="{BE723A70-E80B-4CA0-941A-CB18D109A863}"/>
-              </a:ext>
-            </a:extLst>
-          </p:cNvPr>
-          <p:cNvSpPr>
-            <a:spLocks noGrp="1"/>
-          </p:cNvSpPr>
-          <p:nvPr>
-            <p:ph idx="1"/>
-          </p:nvPr>
-        </p:nvSpPr>
-        <p:spPr>
-          <a:xfrm>
-            <a:off x="179512" y="538995"/>
-            <a:ext cx="8784976" cy="2664296"/>
-          </a:xfrm>
-        </p:spPr>
-        <p:txBody>
-          <a:bodyPr>
-            <a:normAutofit fontScale="92500" lnSpcReduction="10000"/>
-          </a:bodyPr>
-          <a:lstStyle/>
-          <a:p>
-            <a:pPr marL="0" indent="0" algn="l">
-              <a:buNone/>
-            </a:pPr>
-            <a:r>
-              <a:rPr lang="it-IT" sz="2200" b="1" dirty="0"/>
-              <a:t>Frappe: </a:t>
-            </a:r>
-          </a:p>
-          <a:p>
-            <a:pPr marL="0" indent="0" algn="l">
-              <a:buNone/>
-            </a:pPr>
-            <a:r>
-              <a:rPr lang="it-IT" sz="1900" b="0" i="0" u="none" strike="noStrike" baseline="0" dirty="0"/>
-              <a:t>È un dataset di feedback impliciti collezionato da un sistema di raccomandazione </a:t>
-            </a:r>
-            <a:r>
-              <a:rPr lang="it-IT" sz="1900" b="0" i="0" u="none" strike="noStrike" baseline="0" dirty="0" err="1"/>
-              <a:t>context-aware</a:t>
-            </a:r>
-            <a:r>
-              <a:rPr lang="it-IT" sz="1900" b="0" i="0" u="none" strike="noStrike" baseline="0" dirty="0"/>
-              <a:t> di applicazioni Android.</a:t>
-            </a:r>
-          </a:p>
-          <a:p>
-            <a:pPr marL="0" indent="0" algn="l">
-              <a:buNone/>
-            </a:pPr>
-            <a:r>
-              <a:rPr lang="it-IT" sz="1900" dirty="0"/>
-              <a:t>Feature di contesto:</a:t>
-            </a:r>
-          </a:p>
-          <a:p>
-            <a:r>
-              <a:rPr lang="it-IT" sz="1900" dirty="0"/>
-              <a:t>Momento giornata</a:t>
-            </a:r>
-          </a:p>
-          <a:p>
-            <a:r>
-              <a:rPr lang="it-IT" sz="1900" dirty="0"/>
-              <a:t>Giorno della settimana</a:t>
-            </a:r>
-          </a:p>
-          <a:p>
-            <a:r>
-              <a:rPr lang="it-IT" sz="1900" dirty="0"/>
-              <a:t>Se è il fine settimana</a:t>
-            </a:r>
-          </a:p>
-          <a:p>
-            <a:r>
-              <a:rPr lang="it-IT" sz="1900" dirty="0"/>
-              <a:t>Meteo</a:t>
-            </a:r>
-          </a:p>
-          <a:p>
-            <a:pPr marL="0" indent="0">
-              <a:buNone/>
-            </a:pPr>
-            <a:endParaRPr lang="it-IT" b="1" dirty="0"/>
-          </a:p>
-        </p:txBody>
-      </p:sp>
-      <p:sp>
-        <p:nvSpPr>
-          <p:cNvPr id="9" name="CasellaDiTesto 8">
-            <a:extLst>
-              <a:ext uri="{FF2B5EF4-FFF2-40B4-BE49-F238E27FC236}">
-                <a16:creationId xmlns:a16="http://schemas.microsoft.com/office/drawing/2014/main" id="{A4BA0D4A-419D-4B7E-80B1-C402EFBEA01F}"/>
-              </a:ext>
-            </a:extLst>
-          </p:cNvPr>
-          <p:cNvSpPr txBox="1"/>
-          <p:nvPr/>
-        </p:nvSpPr>
-        <p:spPr>
-          <a:xfrm>
-            <a:off x="154792" y="3429000"/>
-            <a:ext cx="8809695" cy="936104"/>
-          </a:xfrm>
-          <a:prstGeom prst="rect">
-            <a:avLst/>
-          </a:prstGeom>
-          <a:noFill/>
-        </p:spPr>
-        <p:txBody>
-          <a:bodyPr wrap="square">
-            <a:normAutofit lnSpcReduction="10000"/>
-          </a:bodyPr>
-          <a:lstStyle/>
-          <a:p>
-            <a:r>
-              <a:rPr lang="it-IT" sz="2000" b="1" dirty="0"/>
-              <a:t>My Digital Footprint (MDF): </a:t>
-            </a:r>
-          </a:p>
-          <a:p>
-            <a:r>
-              <a:rPr lang="it-IT" dirty="0"/>
-              <a:t>È un nuovo dataset composto da dati di sensori di smartphone, informazioni di prossimità fisica, e interazioni sugli online social network.</a:t>
-            </a:r>
-          </a:p>
-          <a:p>
-            <a:endParaRPr lang="it-IT" dirty="0"/>
-          </a:p>
-          <a:p>
-            <a:endParaRPr lang="it-IT" dirty="0"/>
-          </a:p>
-          <a:p>
-            <a:endParaRPr lang="it-IT" dirty="0"/>
-          </a:p>
-          <a:p>
-            <a:endParaRPr lang="it-IT" dirty="0"/>
-          </a:p>
-          <a:p>
-            <a:endParaRPr lang="it-IT" dirty="0"/>
-          </a:p>
-        </p:txBody>
-      </p:sp>
-      <p:sp>
-        <p:nvSpPr>
-          <p:cNvPr id="10" name="CasellaDiTesto 9">
-            <a:extLst>
-              <a:ext uri="{FF2B5EF4-FFF2-40B4-BE49-F238E27FC236}">
-                <a16:creationId xmlns:a16="http://schemas.microsoft.com/office/drawing/2014/main" id="{3D9FFB73-567F-4A21-9A4E-FD1CA3A2DC3D}"/>
-              </a:ext>
-            </a:extLst>
-          </p:cNvPr>
-          <p:cNvSpPr txBox="1"/>
-          <p:nvPr/>
-        </p:nvSpPr>
-        <p:spPr>
-          <a:xfrm>
-            <a:off x="179512" y="4221087"/>
-            <a:ext cx="8784976" cy="2097917"/>
-          </a:xfrm>
-          <a:prstGeom prst="rect">
-            <a:avLst/>
-          </a:prstGeom>
-          <a:noFill/>
-        </p:spPr>
-        <p:txBody>
-          <a:bodyPr wrap="square" numCol="2" rtlCol="0">
-            <a:normAutofit/>
-          </a:bodyPr>
-          <a:lstStyle/>
-          <a:p>
-            <a:r>
-              <a:rPr lang="it-IT" dirty="0"/>
-              <a:t>Feature di contesto:</a:t>
-            </a:r>
-          </a:p>
-          <a:p>
-            <a:pPr marL="285750" indent="-285750">
-              <a:buFont typeface="Arial" panose="020B0604020202020204" pitchFamily="34" charset="0"/>
-              <a:buChar char="•"/>
-            </a:pPr>
-            <a:r>
-              <a:rPr lang="it-IT" dirty="0"/>
-              <a:t>Attività utente (a piedi, in bici, corsa…)</a:t>
-            </a:r>
-          </a:p>
-          <a:p>
-            <a:pPr marL="285750" indent="-285750">
-              <a:buFont typeface="Arial" panose="020B0604020202020204" pitchFamily="34" charset="0"/>
-              <a:buChar char="•"/>
-            </a:pPr>
-            <a:r>
-              <a:rPr lang="it-IT" dirty="0"/>
-              <a:t>Modalità audio (silenzioso, vibrazione…)</a:t>
-            </a:r>
-          </a:p>
-          <a:p>
-            <a:pPr marL="285750" indent="-285750">
-              <a:buFont typeface="Arial" panose="020B0604020202020204" pitchFamily="34" charset="0"/>
-              <a:buChar char="•"/>
-            </a:pPr>
-            <a:r>
-              <a:rPr lang="it-IT" dirty="0"/>
-              <a:t>Volume </a:t>
-            </a:r>
-          </a:p>
-          <a:p>
-            <a:pPr marL="285750" indent="-285750">
-              <a:buFont typeface="Arial" panose="020B0604020202020204" pitchFamily="34" charset="0"/>
-              <a:buChar char="•"/>
-            </a:pPr>
-            <a:r>
-              <a:rPr lang="it-IT" dirty="0"/>
-              <a:t>Musica </a:t>
-            </a:r>
-          </a:p>
-          <a:p>
-            <a:pPr marL="285750" indent="-285750">
-              <a:buFont typeface="Arial" panose="020B0604020202020204" pitchFamily="34" charset="0"/>
-              <a:buChar char="•"/>
-            </a:pPr>
-            <a:r>
-              <a:rPr lang="it-IT" dirty="0"/>
-              <a:t>Batteria (livello, in carica)</a:t>
-            </a:r>
-          </a:p>
-          <a:p>
-            <a:pPr marL="285750" indent="-285750">
-              <a:buFont typeface="Arial" panose="020B0604020202020204" pitchFamily="34" charset="0"/>
-              <a:buChar char="•"/>
-            </a:pPr>
-            <a:r>
-              <a:rPr lang="it-IT" dirty="0"/>
-              <a:t>Schermo (rotazione, stato)</a:t>
-            </a:r>
-          </a:p>
-          <a:p>
-            <a:pPr marL="285750" indent="-285750">
-              <a:buFont typeface="Arial" panose="020B0604020202020204" pitchFamily="34" charset="0"/>
-              <a:buChar char="•"/>
-            </a:pPr>
-            <a:endParaRPr lang="it-IT" dirty="0"/>
-          </a:p>
-          <a:p>
-            <a:pPr marL="285750" indent="-285750">
-              <a:buFont typeface="Arial" panose="020B0604020202020204" pitchFamily="34" charset="0"/>
-              <a:buChar char="•"/>
-            </a:pPr>
-            <a:r>
-              <a:rPr lang="it-IT" dirty="0"/>
-              <a:t>Meteo</a:t>
-            </a:r>
-          </a:p>
-          <a:p>
-            <a:pPr marL="285750" indent="-285750">
-              <a:buFont typeface="Arial" panose="020B0604020202020204" pitchFamily="34" charset="0"/>
-              <a:buChar char="•"/>
-            </a:pPr>
-            <a:r>
-              <a:rPr lang="it-IT" dirty="0"/>
-              <a:t>WiFi</a:t>
-            </a:r>
-          </a:p>
-          <a:p>
-            <a:pPr marL="285750" indent="-285750">
-              <a:buFont typeface="Arial" panose="020B0604020202020204" pitchFamily="34" charset="0"/>
-              <a:buChar char="•"/>
-            </a:pPr>
-            <a:r>
-              <a:rPr lang="it-IT" dirty="0"/>
-              <a:t>Data e ora</a:t>
-            </a:r>
-          </a:p>
-          <a:p>
-            <a:pPr marL="285750" indent="-285750">
-              <a:buFont typeface="Arial" panose="020B0604020202020204" pitchFamily="34" charset="0"/>
-              <a:buChar char="•"/>
-            </a:pPr>
-            <a:r>
-              <a:rPr lang="it-IT" dirty="0"/>
-              <a:t>Tipologia di persone in prossimità dell’utente</a:t>
-            </a:r>
-          </a:p>
-          <a:p>
-            <a:endParaRPr lang="it-IT" dirty="0"/>
-          </a:p>
-        </p:txBody>
-      </p:sp>
-    </p:spTree>
-    <p:extLst>
-      <p:ext uri="{BB962C8B-B14F-4D97-AF65-F5344CB8AC3E}">
-        <p14:creationId xmlns:p14="http://schemas.microsoft.com/office/powerpoint/2010/main" val="1769353711"/>
-      </p:ext>
-    </p:extLst>
-  </p:cSld>
-  <p:clrMapOvr>
-    <a:masterClrMapping/>
-  </p:clrMapOvr>
-</p:sld>
-</file>
-
 <file path=ppt/slides/slide9.xml><?xml version="1.0" encoding="utf-8"?>
 <p:sld xmlns:a="http://schemas.openxmlformats.org/drawingml/2006/main" xmlns:r="http://schemas.openxmlformats.org/officeDocument/2006/relationships" xmlns:p="http://schemas.openxmlformats.org/presentationml/2006/main">
   <p:cSld>
@@ -7828,7 +8070,7 @@
           <p:cNvPr id="2" name="Titolo 1">
             <a:extLst>
               <a:ext uri="{FF2B5EF4-FFF2-40B4-BE49-F238E27FC236}">
-                <a16:creationId xmlns:a16="http://schemas.microsoft.com/office/drawing/2014/main" id="{43EAF889-71E4-403D-B7D3-14CE26366C96}"/>
+                <a16:creationId xmlns:a16="http://schemas.microsoft.com/office/drawing/2014/main" id="{6B5C8CE6-773B-4C99-A303-3A55CAA756D3}"/>
               </a:ext>
             </a:extLst>
           </p:cNvPr>
@@ -7841,115 +8083,91 @@
         </p:nvSpPr>
         <p:spPr>
           <a:xfrm>
-            <a:off x="756783" y="188640"/>
-            <a:ext cx="2562119" cy="400772"/>
+            <a:off x="539552" y="117066"/>
+            <a:ext cx="7886700" cy="421929"/>
           </a:xfrm>
         </p:spPr>
         <p:txBody>
-          <a:bodyPr vert="horz" lIns="91440" tIns="45720" rIns="91440" bIns="45720" rtlCol="0" anchor="ctr">
-            <a:normAutofit fontScale="90000"/>
+          <a:bodyPr>
+            <a:noAutofit/>
           </a:bodyPr>
           <a:lstStyle/>
           <a:p>
-            <a:pPr defTabSz="914400"/>
-            <a:r>
-              <a:rPr lang="en-US" sz="4400" kern="1200" dirty="0" err="1">
-                <a:latin typeface="+mj-lt"/>
-                <a:ea typeface="+mj-ea"/>
-                <a:cs typeface="+mj-cs"/>
-              </a:rPr>
-              <a:t>Risultati</a:t>
-            </a:r>
-            <a:endParaRPr lang="en-US" sz="4400" kern="1200" dirty="0">
-              <a:latin typeface="+mj-lt"/>
-              <a:ea typeface="+mj-ea"/>
-              <a:cs typeface="+mj-cs"/>
-            </a:endParaRPr>
-          </a:p>
-        </p:txBody>
-      </p:sp>
-      <p:pic>
-        <p:nvPicPr>
-          <p:cNvPr id="17" name="Segnaposto contenuto 16">
+            <a:pPr algn="ctr"/>
+            <a:r>
+              <a:rPr lang="it-IT" dirty="0"/>
+              <a:t>Dataset</a:t>
+            </a:r>
+          </a:p>
+        </p:txBody>
+      </p:sp>
+      <p:sp>
+        <p:nvSpPr>
+          <p:cNvPr id="3" name="Segnaposto contenuto 2">
             <a:extLst>
               <a:ext uri="{FF2B5EF4-FFF2-40B4-BE49-F238E27FC236}">
-                <a16:creationId xmlns:a16="http://schemas.microsoft.com/office/drawing/2014/main" id="{28C8BA65-1CC5-4CD8-941C-2D5BD2C214BD}"/>
+                <a16:creationId xmlns:a16="http://schemas.microsoft.com/office/drawing/2014/main" id="{BE723A70-E80B-4CA0-941A-CB18D109A863}"/>
               </a:ext>
             </a:extLst>
           </p:cNvPr>
-          <p:cNvPicPr>
-            <a:picLocks noGrp="1" noChangeAspect="1"/>
-          </p:cNvPicPr>
-          <p:nvPr>
-            <p:ph sz="half" idx="2"/>
-          </p:nvPr>
-        </p:nvPicPr>
-        <p:blipFill>
-          <a:blip r:embed="rId2">
-            <a:extLst>
-              <a:ext uri="{28A0092B-C50C-407E-A947-70E740481C1C}">
-                <a14:useLocalDpi xmlns:a14="http://schemas.microsoft.com/office/drawing/2010/main" val="0"/>
-              </a:ext>
-              <a:ext uri="{96DAC541-7B7A-43D3-8B79-37D633B846F1}">
-                <asvg:svgBlip xmlns:asvg="http://schemas.microsoft.com/office/drawing/2016/SVG/main" r:embed="rId3"/>
-              </a:ext>
-            </a:extLst>
-          </a:blip>
-          <a:stretch>
-            <a:fillRect/>
-          </a:stretch>
-        </p:blipFill>
+          <p:cNvSpPr>
+            <a:spLocks noGrp="1"/>
+          </p:cNvSpPr>
+          <p:nvPr>
+            <p:ph idx="1"/>
+          </p:nvPr>
+        </p:nvSpPr>
         <p:spPr>
           <a:xfrm>
-            <a:off x="4024313" y="21357"/>
-            <a:ext cx="5012184" cy="3148305"/>
+            <a:off x="179512" y="538995"/>
+            <a:ext cx="8784976" cy="1017797"/>
           </a:xfrm>
         </p:spPr>
-      </p:pic>
-      <p:pic>
-        <p:nvPicPr>
-          <p:cNvPr id="20" name="Segnaposto contenuto 19">
+        <p:txBody>
+          <a:bodyPr>
+            <a:normAutofit lnSpcReduction="10000"/>
+          </a:bodyPr>
+          <a:lstStyle/>
+          <a:p>
+            <a:pPr marL="0" indent="0" algn="l">
+              <a:buNone/>
+            </a:pPr>
+            <a:r>
+              <a:rPr lang="it-IT" sz="2200" b="1" dirty="0"/>
+              <a:t>Frappe: </a:t>
+            </a:r>
+          </a:p>
+          <a:p>
+            <a:pPr marL="0" indent="0" algn="l">
+              <a:buNone/>
+            </a:pPr>
+            <a:r>
+              <a:rPr lang="it-IT" sz="1900" b="0" i="0" u="none" strike="noStrike" baseline="0" dirty="0"/>
+              <a:t>È un dataset di feedback impliciti collezionato da un sistema di raccomandazione </a:t>
+            </a:r>
+            <a:r>
+              <a:rPr lang="it-IT" sz="1900" b="0" i="0" u="none" strike="noStrike" baseline="0" dirty="0" err="1"/>
+              <a:t>context-aware</a:t>
+            </a:r>
+            <a:r>
+              <a:rPr lang="it-IT" sz="1900" b="0" i="0" u="none" strike="noStrike" baseline="0" dirty="0"/>
+              <a:t> di applicazioni Android.</a:t>
+            </a:r>
+          </a:p>
+          <a:p>
+            <a:pPr marL="0" indent="0">
+              <a:buNone/>
+            </a:pPr>
+            <a:endParaRPr lang="it-IT" b="1" dirty="0"/>
+          </a:p>
+        </p:txBody>
+      </p:sp>
+      <p:sp>
+        <p:nvSpPr>
+          <p:cNvPr id="9" name="CasellaDiTesto 8">
             <a:extLst>
               <a:ext uri="{FF2B5EF4-FFF2-40B4-BE49-F238E27FC236}">
-                <a16:creationId xmlns:a16="http://schemas.microsoft.com/office/drawing/2014/main" id="{90B773DD-FCF5-4576-9C9D-3F81BFC5846E}"/>
-              </a:ext>
-            </a:extLst>
-          </p:cNvPr>
-          <p:cNvPicPr>
-            <a:picLocks noGrp="1" noChangeAspect="1"/>
-          </p:cNvPicPr>
-          <p:nvPr>
-            <p:ph sz="quarter" idx="4"/>
-          </p:nvPr>
-        </p:nvPicPr>
-        <p:blipFill>
-          <a:blip r:embed="rId4">
-            <a:extLst>
-              <a:ext uri="{28A0092B-C50C-407E-A947-70E740481C1C}">
-                <a14:useLocalDpi xmlns:a14="http://schemas.microsoft.com/office/drawing/2010/main" val="0"/>
-              </a:ext>
-              <a:ext uri="{96DAC541-7B7A-43D3-8B79-37D633B846F1}">
-                <asvg:svgBlip xmlns:asvg="http://schemas.microsoft.com/office/drawing/2016/SVG/main" r:embed="rId5"/>
-              </a:ext>
-            </a:extLst>
-          </a:blip>
-          <a:stretch>
-            <a:fillRect/>
-          </a:stretch>
-        </p:blipFill>
-        <p:spPr>
-          <a:xfrm>
-            <a:off x="4024313" y="3378788"/>
-            <a:ext cx="5006714" cy="3144869"/>
-          </a:xfrm>
-        </p:spPr>
-      </p:pic>
-      <p:sp>
-        <p:nvSpPr>
-          <p:cNvPr id="30" name="CasellaDiTesto 29">
-            <a:extLst>
-              <a:ext uri="{FF2B5EF4-FFF2-40B4-BE49-F238E27FC236}">
-                <a16:creationId xmlns:a16="http://schemas.microsoft.com/office/drawing/2014/main" id="{814A474E-75D0-4267-A552-64BE3B93B90D}"/>
+                <a16:creationId xmlns:a16="http://schemas.microsoft.com/office/drawing/2014/main" id="{A4BA0D4A-419D-4B7E-80B1-C402EFBEA01F}"/>
               </a:ext>
             </a:extLst>
           </p:cNvPr>
@@ -7958,8 +8176,8 @@
         </p:nvSpPr>
         <p:spPr>
           <a:xfrm>
-            <a:off x="0" y="1443841"/>
-            <a:ext cx="4091905" cy="3970318"/>
+            <a:off x="154792" y="3429000"/>
+            <a:ext cx="8809695" cy="936104"/>
           </a:xfrm>
           <a:prstGeom prst="rect">
             <a:avLst/>
@@ -7967,18 +8185,104 @@
           <a:noFill/>
         </p:spPr>
         <p:txBody>
-          <a:bodyPr wrap="square" rtlCol="0">
-            <a:spAutoFit/>
+          <a:bodyPr wrap="square">
+            <a:normAutofit lnSpcReduction="10000"/>
           </a:bodyPr>
           <a:lstStyle/>
+          <a:p>
+            <a:r>
+              <a:rPr lang="it-IT" sz="2000" b="1" dirty="0"/>
+              <a:t>My Digital Footprint (MDF): </a:t>
+            </a:r>
+          </a:p>
+          <a:p>
+            <a:r>
+              <a:rPr lang="it-IT" dirty="0"/>
+              <a:t>È un dataset composto da dati di sensori di smartphone, informazioni di prossimità fisica, e interazioni sugli online social network.</a:t>
+            </a:r>
+          </a:p>
+          <a:p>
+            <a:endParaRPr lang="it-IT" dirty="0"/>
+          </a:p>
+          <a:p>
+            <a:endParaRPr lang="it-IT" dirty="0"/>
+          </a:p>
+          <a:p>
+            <a:endParaRPr lang="it-IT" dirty="0"/>
+          </a:p>
+          <a:p>
+            <a:endParaRPr lang="it-IT" dirty="0"/>
+          </a:p>
+          <a:p>
+            <a:endParaRPr lang="it-IT" dirty="0"/>
+          </a:p>
+        </p:txBody>
+      </p:sp>
+      <p:sp>
+        <p:nvSpPr>
+          <p:cNvPr id="10" name="CasellaDiTesto 9">
+            <a:extLst>
+              <a:ext uri="{FF2B5EF4-FFF2-40B4-BE49-F238E27FC236}">
+                <a16:creationId xmlns:a16="http://schemas.microsoft.com/office/drawing/2014/main" id="{3D9FFB73-567F-4A21-9A4E-FD1CA3A2DC3D}"/>
+              </a:ext>
+            </a:extLst>
+          </p:cNvPr>
+          <p:cNvSpPr txBox="1"/>
+          <p:nvPr/>
+        </p:nvSpPr>
+        <p:spPr>
+          <a:xfrm>
+            <a:off x="179512" y="4221087"/>
+            <a:ext cx="8784976" cy="2519847"/>
+          </a:xfrm>
+          <a:prstGeom prst="rect">
+            <a:avLst/>
+          </a:prstGeom>
+          <a:noFill/>
+        </p:spPr>
+        <p:txBody>
+          <a:bodyPr wrap="square" numCol="2" rtlCol="0">
+            <a:normAutofit lnSpcReduction="10000"/>
+          </a:bodyPr>
+          <a:lstStyle/>
+          <a:p>
+            <a:r>
+              <a:rPr lang="it-IT" u="sng" dirty="0"/>
+              <a:t>Statistiche:</a:t>
+            </a:r>
+          </a:p>
           <a:p>
             <a:pPr marL="285750" indent="-285750">
               <a:buFont typeface="Arial" panose="020B0604020202020204" pitchFamily="34" charset="0"/>
               <a:buChar char="•"/>
             </a:pPr>
             <a:r>
+              <a:rPr lang="it-IT" sz="1800" b="0" i="0" u="none" strike="noStrike" baseline="0" dirty="0">
+                <a:latin typeface="CMR12"/>
+              </a:rPr>
+              <a:t>73176 rating</a:t>
+            </a:r>
+          </a:p>
+          <a:p>
+            <a:pPr marL="285750" indent="-285750">
+              <a:buFont typeface="Arial" panose="020B0604020202020204" pitchFamily="34" charset="0"/>
+              <a:buChar char="•"/>
+            </a:pPr>
+            <a:r>
+              <a:rPr lang="it-IT" dirty="0">
+                <a:latin typeface="CMR12"/>
+              </a:rPr>
+              <a:t>31 utenti</a:t>
+            </a:r>
+          </a:p>
+          <a:p>
+            <a:pPr marL="285750" indent="-285750">
+              <a:buFont typeface="Arial" panose="020B0604020202020204" pitchFamily="34" charset="0"/>
+              <a:buChar char="•"/>
+            </a:pPr>
+            <a:r>
               <a:rPr lang="it-IT" dirty="0"/>
-              <a:t>Metrica utilizzata: Area under the ROC curve (AUC)</a:t>
+              <a:t>338 oggetti</a:t>
             </a:r>
           </a:p>
           <a:p>
@@ -7989,53 +8293,20 @@
             <a:endParaRPr lang="it-IT" dirty="0"/>
           </a:p>
           <a:p>
+            <a:r>
+              <a:rPr lang="it-IT" u="sng" dirty="0"/>
+              <a:t>Feature di contesto:</a:t>
+            </a:r>
+          </a:p>
+          <a:p>
             <a:pPr marL="285750" indent="-285750">
               <a:buFont typeface="Arial" panose="020B0604020202020204" pitchFamily="34" charset="0"/>
               <a:buChar char="•"/>
             </a:pPr>
             <a:r>
               <a:rPr lang="it-IT" dirty="0"/>
-              <a:t>Modelli di confronto:</a:t>
-            </a:r>
-          </a:p>
-          <a:p>
-            <a:pPr marL="742950" lvl="1" indent="-285750">
-              <a:buFont typeface="Arial" panose="020B0604020202020204" pitchFamily="34" charset="0"/>
-              <a:buChar char="•"/>
-            </a:pPr>
-            <a:r>
-              <a:rPr lang="it-IT" dirty="0"/>
-              <a:t>ALS</a:t>
-            </a:r>
-          </a:p>
-          <a:p>
-            <a:pPr marL="742950" lvl="1" indent="-285750">
-              <a:buFont typeface="Arial" panose="020B0604020202020204" pitchFamily="34" charset="0"/>
-              <a:buChar char="•"/>
-            </a:pPr>
-            <a:r>
-              <a:rPr lang="it-IT" dirty="0" err="1"/>
-              <a:t>NeuMF</a:t>
-            </a:r>
-            <a:endParaRPr lang="it-IT" dirty="0"/>
-          </a:p>
-          <a:p>
-            <a:pPr marL="742950" lvl="1" indent="-285750">
-              <a:buFont typeface="Arial" panose="020B0604020202020204" pitchFamily="34" charset="0"/>
-              <a:buChar char="•"/>
-            </a:pPr>
-            <a:r>
-              <a:rPr lang="it-IT" dirty="0"/>
-              <a:t>ECAM </a:t>
-            </a:r>
-            <a:r>
-              <a:rPr lang="it-IT" dirty="0" err="1"/>
-              <a:t>NeuMF</a:t>
-            </a:r>
-            <a:endParaRPr lang="it-IT" dirty="0"/>
-          </a:p>
-          <a:p>
-            <a:endParaRPr lang="it-IT" dirty="0"/>
+              <a:t>Attività utente (a piedi, in bici, corsa…)</a:t>
+            </a:r>
           </a:p>
           <a:p>
             <a:pPr marL="285750" indent="-285750">
@@ -8044,31 +8315,7 @@
             </a:pPr>
             <a:r>
               <a:rPr lang="it-IT" dirty="0"/>
-              <a:t>I modelli </a:t>
-            </a:r>
-            <a:r>
-              <a:rPr lang="it-IT" dirty="0" err="1"/>
-              <a:t>context-aware</a:t>
-            </a:r>
-            <a:r>
-              <a:rPr lang="it-IT" dirty="0"/>
-              <a:t> (</a:t>
-            </a:r>
-            <a:r>
-              <a:rPr lang="it-IT" dirty="0" err="1"/>
-              <a:t>moveCARS</a:t>
-            </a:r>
-            <a:r>
-              <a:rPr lang="it-IT" dirty="0"/>
-              <a:t>, ECAM </a:t>
-            </a:r>
-            <a:r>
-              <a:rPr lang="it-IT" dirty="0" err="1"/>
-              <a:t>NeuMF</a:t>
-            </a:r>
-            <a:r>
-              <a:rPr lang="it-IT" dirty="0"/>
-              <a:t>) hanno l’AUC più alta</a:t>
+              <a:t>Modalità audio (silenzioso, vibrazione…)</a:t>
             </a:r>
           </a:p>
           <a:p>
@@ -8076,7 +8323,10 @@
               <a:buFont typeface="Arial" panose="020B0604020202020204" pitchFamily="34" charset="0"/>
               <a:buChar char="•"/>
             </a:pPr>
-            <a:endParaRPr lang="it-IT" dirty="0"/>
+            <a:r>
+              <a:rPr lang="it-IT" dirty="0"/>
+              <a:t>Volume </a:t>
+            </a:r>
           </a:p>
           <a:p>
             <a:pPr marL="285750" indent="-285750">
@@ -8084,25 +8334,203 @@
               <a:buChar char="•"/>
             </a:pPr>
             <a:r>
-              <a:rPr lang="it-IT" dirty="0" err="1"/>
-              <a:t>moveCARS</a:t>
-            </a:r>
-            <a:r>
               <a:rPr lang="it-IT" dirty="0"/>
-              <a:t> ha ottenuto risultati simili al modello </a:t>
-            </a:r>
-            <a:r>
-              <a:rPr lang="it-IT" dirty="0" err="1"/>
-              <a:t>context-aware</a:t>
-            </a:r>
+              <a:t>Musica </a:t>
+            </a:r>
+          </a:p>
+          <a:p>
+            <a:pPr marL="285750" indent="-285750">
+              <a:buFont typeface="Arial" panose="020B0604020202020204" pitchFamily="34" charset="0"/>
+              <a:buChar char="•"/>
+            </a:pPr>
             <a:r>
               <a:rPr lang="it-IT" dirty="0"/>
-              <a:t> stato dell’arte ECAM </a:t>
-            </a:r>
-            <a:r>
-              <a:rPr lang="it-IT" dirty="0" err="1"/>
-              <a:t>NeuMF</a:t>
-            </a:r>
+              <a:t>Batteria (livello, in carica)</a:t>
+            </a:r>
+          </a:p>
+          <a:p>
+            <a:pPr marL="285750" indent="-285750">
+              <a:buFont typeface="Arial" panose="020B0604020202020204" pitchFamily="34" charset="0"/>
+              <a:buChar char="•"/>
+            </a:pPr>
+            <a:r>
+              <a:rPr lang="it-IT" dirty="0"/>
+              <a:t>Schermo (rotazione, stato)</a:t>
+            </a:r>
+          </a:p>
+          <a:p>
+            <a:pPr marL="285750" indent="-285750">
+              <a:buFont typeface="Arial" panose="020B0604020202020204" pitchFamily="34" charset="0"/>
+              <a:buChar char="•"/>
+            </a:pPr>
+            <a:r>
+              <a:rPr lang="it-IT" dirty="0"/>
+              <a:t>Meteo</a:t>
+            </a:r>
+          </a:p>
+          <a:p>
+            <a:pPr marL="285750" indent="-285750">
+              <a:buFont typeface="Arial" panose="020B0604020202020204" pitchFamily="34" charset="0"/>
+              <a:buChar char="•"/>
+            </a:pPr>
+            <a:r>
+              <a:rPr lang="it-IT" dirty="0"/>
+              <a:t>WiFi</a:t>
+            </a:r>
+          </a:p>
+          <a:p>
+            <a:pPr marL="285750" indent="-285750">
+              <a:buFont typeface="Arial" panose="020B0604020202020204" pitchFamily="34" charset="0"/>
+              <a:buChar char="•"/>
+            </a:pPr>
+            <a:r>
+              <a:rPr lang="it-IT" dirty="0"/>
+              <a:t>Data e ora</a:t>
+            </a:r>
+          </a:p>
+          <a:p>
+            <a:pPr marL="285750" indent="-285750">
+              <a:buFont typeface="Arial" panose="020B0604020202020204" pitchFamily="34" charset="0"/>
+              <a:buChar char="•"/>
+            </a:pPr>
+            <a:r>
+              <a:rPr lang="it-IT" dirty="0"/>
+              <a:t>Tipologia di persone in prossimità dell’utente</a:t>
+            </a:r>
+          </a:p>
+          <a:p>
+            <a:endParaRPr lang="it-IT" dirty="0"/>
+          </a:p>
+        </p:txBody>
+      </p:sp>
+      <p:sp>
+        <p:nvSpPr>
+          <p:cNvPr id="4" name="CasellaDiTesto 3">
+            <a:extLst>
+              <a:ext uri="{FF2B5EF4-FFF2-40B4-BE49-F238E27FC236}">
+                <a16:creationId xmlns:a16="http://schemas.microsoft.com/office/drawing/2014/main" id="{74541A4D-BABD-4315-853C-48B6205E8C1A}"/>
+              </a:ext>
+            </a:extLst>
+          </p:cNvPr>
+          <p:cNvSpPr txBox="1"/>
+          <p:nvPr/>
+        </p:nvSpPr>
+        <p:spPr>
+          <a:xfrm>
+            <a:off x="179512" y="1556792"/>
+            <a:ext cx="8640960" cy="1754326"/>
+          </a:xfrm>
+          <a:prstGeom prst="rect">
+            <a:avLst/>
+          </a:prstGeom>
+          <a:noFill/>
+        </p:spPr>
+        <p:txBody>
+          <a:bodyPr wrap="square" numCol="2" rtlCol="0">
+            <a:normAutofit/>
+          </a:bodyPr>
+          <a:lstStyle/>
+          <a:p>
+            <a:pPr marL="0" indent="0" algn="l">
+              <a:buNone/>
+            </a:pPr>
+            <a:r>
+              <a:rPr lang="it-IT" u="sng" dirty="0"/>
+              <a:t>Statistiche:</a:t>
+            </a:r>
+          </a:p>
+          <a:p>
+            <a:pPr marL="342900" indent="-342900" algn="l">
+              <a:buFont typeface="Arial" panose="020B0604020202020204" pitchFamily="34" charset="0"/>
+              <a:buChar char="•"/>
+            </a:pPr>
+            <a:r>
+              <a:rPr lang="it-IT" dirty="0"/>
+              <a:t>78335 rating</a:t>
+            </a:r>
+          </a:p>
+          <a:p>
+            <a:pPr marL="342900" indent="-342900" algn="l">
+              <a:buFont typeface="Arial" panose="020B0604020202020204" pitchFamily="34" charset="0"/>
+              <a:buChar char="•"/>
+            </a:pPr>
+            <a:r>
+              <a:rPr lang="it-IT" dirty="0"/>
+              <a:t>857 utenti</a:t>
+            </a:r>
+          </a:p>
+          <a:p>
+            <a:pPr marL="342900" indent="-342900" algn="l">
+              <a:buFont typeface="Arial" panose="020B0604020202020204" pitchFamily="34" charset="0"/>
+              <a:buChar char="•"/>
+            </a:pPr>
+            <a:r>
+              <a:rPr lang="it-IT" dirty="0"/>
+              <a:t>3180 oggetti</a:t>
+            </a:r>
+          </a:p>
+          <a:p>
+            <a:pPr marL="0" indent="0" algn="l">
+              <a:buNone/>
+            </a:pPr>
+            <a:endParaRPr lang="it-IT" u="sng" dirty="0"/>
+          </a:p>
+          <a:p>
+            <a:pPr marL="0" indent="0" algn="l">
+              <a:buNone/>
+            </a:pPr>
+            <a:endParaRPr lang="it-IT" u="sng" dirty="0"/>
+          </a:p>
+          <a:p>
+            <a:pPr marL="0" indent="0" algn="l">
+              <a:buNone/>
+            </a:pPr>
+            <a:r>
+              <a:rPr lang="it-IT" u="sng" dirty="0"/>
+              <a:t>Feature di contesto:</a:t>
+            </a:r>
+          </a:p>
+          <a:p>
+            <a:pPr marL="285750" indent="-285750">
+              <a:buFont typeface="Arial" panose="020B0604020202020204" pitchFamily="34" charset="0"/>
+              <a:buChar char="•"/>
+            </a:pPr>
+            <a:r>
+              <a:rPr lang="it-IT" dirty="0"/>
+              <a:t>Momento giornata</a:t>
+            </a:r>
+          </a:p>
+          <a:p>
+            <a:pPr marL="285750" indent="-285750">
+              <a:buFont typeface="Arial" panose="020B0604020202020204" pitchFamily="34" charset="0"/>
+              <a:buChar char="•"/>
+            </a:pPr>
+            <a:r>
+              <a:rPr lang="it-IT" dirty="0"/>
+              <a:t>Giorno della settimana</a:t>
+            </a:r>
+          </a:p>
+          <a:p>
+            <a:pPr marL="285750" indent="-285750">
+              <a:buFont typeface="Arial" panose="020B0604020202020204" pitchFamily="34" charset="0"/>
+              <a:buChar char="•"/>
+            </a:pPr>
+            <a:r>
+              <a:rPr lang="it-IT" dirty="0"/>
+              <a:t>Se è il fine settimana</a:t>
+            </a:r>
+          </a:p>
+          <a:p>
+            <a:pPr marL="285750" indent="-285750">
+              <a:buFont typeface="Arial" panose="020B0604020202020204" pitchFamily="34" charset="0"/>
+              <a:buChar char="•"/>
+            </a:pPr>
+            <a:r>
+              <a:rPr lang="it-IT" dirty="0"/>
+              <a:t>Meteo</a:t>
+            </a:r>
+          </a:p>
+          <a:p>
             <a:endParaRPr lang="it-IT" dirty="0"/>
           </a:p>
         </p:txBody>
@@ -8110,7 +8538,7 @@
     </p:spTree>
     <p:extLst>
       <p:ext uri="{BB962C8B-B14F-4D97-AF65-F5344CB8AC3E}">
-        <p14:creationId xmlns:p14="http://schemas.microsoft.com/office/powerpoint/2010/main" val="3288315151"/>
+        <p14:creationId xmlns:p14="http://schemas.microsoft.com/office/powerpoint/2010/main" val="1769353711"/>
       </p:ext>
     </p:extLst>
   </p:cSld>

</xml_diff>

<commit_message>
power point checked 2
</commit_message>
<xml_diff>
--- a/presentazione/presentazione.pptx
+++ b/presentazione/presentazione.pptx
@@ -5,27 +5,26 @@
     <p:sldMasterId id="2147483797" r:id="rId1"/>
   </p:sldMasterIdLst>
   <p:notesMasterIdLst>
-    <p:notesMasterId r:id="rId17"/>
+    <p:notesMasterId r:id="rId16"/>
   </p:notesMasterIdLst>
   <p:handoutMasterIdLst>
-    <p:handoutMasterId r:id="rId18"/>
+    <p:handoutMasterId r:id="rId17"/>
   </p:handoutMasterIdLst>
   <p:sldIdLst>
     <p:sldId id="256" r:id="rId2"/>
-    <p:sldId id="258" r:id="rId3"/>
-    <p:sldId id="273" r:id="rId4"/>
-    <p:sldId id="257" r:id="rId5"/>
-    <p:sldId id="267" r:id="rId6"/>
-    <p:sldId id="272" r:id="rId7"/>
-    <p:sldId id="266" r:id="rId8"/>
-    <p:sldId id="270" r:id="rId9"/>
-    <p:sldId id="261" r:id="rId10"/>
-    <p:sldId id="274" r:id="rId11"/>
-    <p:sldId id="262" r:id="rId12"/>
-    <p:sldId id="263" r:id="rId13"/>
-    <p:sldId id="264" r:id="rId14"/>
-    <p:sldId id="265" r:id="rId15"/>
-    <p:sldId id="268" r:id="rId16"/>
+    <p:sldId id="273" r:id="rId3"/>
+    <p:sldId id="257" r:id="rId4"/>
+    <p:sldId id="267" r:id="rId5"/>
+    <p:sldId id="272" r:id="rId6"/>
+    <p:sldId id="266" r:id="rId7"/>
+    <p:sldId id="270" r:id="rId8"/>
+    <p:sldId id="261" r:id="rId9"/>
+    <p:sldId id="274" r:id="rId10"/>
+    <p:sldId id="262" r:id="rId11"/>
+    <p:sldId id="263" r:id="rId12"/>
+    <p:sldId id="264" r:id="rId13"/>
+    <p:sldId id="265" r:id="rId14"/>
+    <p:sldId id="268" r:id="rId15"/>
   </p:sldIdLst>
   <p:sldSz cx="9144000" cy="6858000" type="screen4x3"/>
   <p:notesSz cx="6858000" cy="9144000"/>
@@ -1190,7 +1189,7 @@
             <a:fld id="{558B94EF-AFA9-40FF-986C-F27447FA4EE9}" type="slidenum">
               <a:rPr lang="en-GB" altLang="it-IT" smtClean="0"/>
               <a:pPr/>
-              <a:t>4</a:t>
+              <a:t>3</a:t>
             </a:fld>
             <a:endParaRPr lang="en-GB" altLang="it-IT"/>
           </a:p>
@@ -1275,7 +1274,7 @@
             <a:fld id="{558B94EF-AFA9-40FF-986C-F27447FA4EE9}" type="slidenum">
               <a:rPr lang="en-GB" altLang="it-IT" smtClean="0"/>
               <a:pPr/>
-              <a:t>6</a:t>
+              <a:t>5</a:t>
             </a:fld>
             <a:endParaRPr lang="en-GB" altLang="it-IT"/>
           </a:p>
@@ -1452,7 +1451,10 @@
             <a:pPr>
               <a:defRPr/>
             </a:pPr>
-            <a:endParaRPr lang="en-GB"/>
+            <a:r>
+              <a:rPr lang="en-GB"/>
+              <a:t>Fonte immagine: </a:t>
+            </a:r>
           </a:p>
         </p:txBody>
       </p:sp>
@@ -1629,7 +1631,10 @@
             <a:pPr>
               <a:defRPr/>
             </a:pPr>
-            <a:endParaRPr lang="en-GB"/>
+            <a:r>
+              <a:rPr lang="en-GB"/>
+              <a:t>Fonte immagine: </a:t>
+            </a:r>
           </a:p>
         </p:txBody>
       </p:sp>
@@ -1816,7 +1821,10 @@
             <a:pPr>
               <a:defRPr/>
             </a:pPr>
-            <a:endParaRPr lang="en-GB"/>
+            <a:r>
+              <a:rPr lang="en-GB"/>
+              <a:t>Fonte immagine: </a:t>
+            </a:r>
           </a:p>
         </p:txBody>
       </p:sp>
@@ -1993,7 +2001,10 @@
             <a:pPr>
               <a:defRPr/>
             </a:pPr>
-            <a:endParaRPr lang="en-GB"/>
+            <a:r>
+              <a:rPr lang="en-GB"/>
+              <a:t>Fonte immagine: </a:t>
+            </a:r>
           </a:p>
         </p:txBody>
       </p:sp>
@@ -2244,7 +2255,10 @@
             <a:pPr>
               <a:defRPr/>
             </a:pPr>
-            <a:endParaRPr lang="en-GB"/>
+            <a:r>
+              <a:rPr lang="en-GB"/>
+              <a:t>Fonte immagine: </a:t>
+            </a:r>
           </a:p>
         </p:txBody>
       </p:sp>
@@ -2483,7 +2497,10 @@
             <a:pPr>
               <a:defRPr/>
             </a:pPr>
-            <a:endParaRPr lang="en-GB"/>
+            <a:r>
+              <a:rPr lang="en-GB"/>
+              <a:t>Fonte immagine: </a:t>
+            </a:r>
           </a:p>
         </p:txBody>
       </p:sp>
@@ -2857,7 +2874,10 @@
             <a:pPr>
               <a:defRPr/>
             </a:pPr>
-            <a:endParaRPr lang="en-GB"/>
+            <a:r>
+              <a:rPr lang="en-GB"/>
+              <a:t>Fonte immagine: </a:t>
+            </a:r>
           </a:p>
         </p:txBody>
       </p:sp>
@@ -2982,7 +3002,10 @@
             <a:pPr>
               <a:defRPr/>
             </a:pPr>
-            <a:endParaRPr lang="en-GB"/>
+            <a:r>
+              <a:rPr lang="en-GB"/>
+              <a:t>Fonte immagine: </a:t>
+            </a:r>
           </a:p>
         </p:txBody>
       </p:sp>
@@ -3084,7 +3107,10 @@
             <a:pPr>
               <a:defRPr/>
             </a:pPr>
-            <a:endParaRPr lang="en-GB"/>
+            <a:r>
+              <a:rPr lang="en-GB"/>
+              <a:t>Fonte immagine: </a:t>
+            </a:r>
           </a:p>
         </p:txBody>
       </p:sp>
@@ -3368,7 +3394,10 @@
             <a:pPr>
               <a:defRPr/>
             </a:pPr>
-            <a:endParaRPr lang="en-GB"/>
+            <a:r>
+              <a:rPr lang="en-GB"/>
+              <a:t>Fonte immagine: </a:t>
+            </a:r>
           </a:p>
         </p:txBody>
       </p:sp>
@@ -3632,7 +3661,10 @@
             <a:pPr>
               <a:defRPr/>
             </a:pPr>
-            <a:endParaRPr lang="en-GB"/>
+            <a:r>
+              <a:rPr lang="en-GB"/>
+              <a:t>Fonte immagine: </a:t>
+            </a:r>
           </a:p>
         </p:txBody>
       </p:sp>
@@ -3870,7 +3902,10 @@
             <a:pPr>
               <a:defRPr/>
             </a:pPr>
-            <a:endParaRPr lang="en-GB"/>
+            <a:r>
+              <a:rPr lang="en-GB"/>
+              <a:t>Fonte immagine: </a:t>
+            </a:r>
           </a:p>
         </p:txBody>
       </p:sp>
@@ -3937,7 +3972,7 @@
     <p:sldLayoutId id="2147483807" r:id="rId10"/>
     <p:sldLayoutId id="2147483808" r:id="rId11"/>
   </p:sldLayoutIdLst>
-  <p:hf sldNum="0" hdr="0" ftr="0" dt="0"/>
+  <p:hf hdr="0" dt="0"/>
   <p:txStyles>
     <p:titleStyle>
       <a:lvl1pPr algn="l" defTabSz="914400" rtl="0" eaLnBrk="1" latinLnBrk="0" hangingPunct="1">
@@ -4784,160 +4819,6 @@
           <p:cNvPr id="2" name="Titolo 1">
             <a:extLst>
               <a:ext uri="{FF2B5EF4-FFF2-40B4-BE49-F238E27FC236}">
-                <a16:creationId xmlns:a16="http://schemas.microsoft.com/office/drawing/2014/main" id="{46E9E1F8-8C38-4444-9E91-AEA784B6981E}"/>
-              </a:ext>
-            </a:extLst>
-          </p:cNvPr>
-          <p:cNvSpPr>
-            <a:spLocks noGrp="1"/>
-          </p:cNvSpPr>
-          <p:nvPr>
-            <p:ph type="title"/>
-          </p:nvPr>
-        </p:nvSpPr>
-        <p:spPr/>
-        <p:txBody>
-          <a:bodyPr/>
-          <a:lstStyle/>
-          <a:p>
-            <a:pPr algn="ctr"/>
-            <a:r>
-              <a:rPr lang="it-IT" dirty="0"/>
-              <a:t>Valutazione</a:t>
-            </a:r>
-          </a:p>
-        </p:txBody>
-      </p:sp>
-      <p:sp>
-        <p:nvSpPr>
-          <p:cNvPr id="3" name="Segnaposto contenuto 2">
-            <a:extLst>
-              <a:ext uri="{FF2B5EF4-FFF2-40B4-BE49-F238E27FC236}">
-                <a16:creationId xmlns:a16="http://schemas.microsoft.com/office/drawing/2014/main" id="{751510C9-6594-4046-8B7F-321272A9BB79}"/>
-              </a:ext>
-            </a:extLst>
-          </p:cNvPr>
-          <p:cNvSpPr>
-            <a:spLocks noGrp="1"/>
-          </p:cNvSpPr>
-          <p:nvPr>
-            <p:ph idx="1"/>
-          </p:nvPr>
-        </p:nvSpPr>
-        <p:spPr/>
-        <p:txBody>
-          <a:bodyPr/>
-          <a:lstStyle/>
-          <a:p>
-            <a:r>
-              <a:rPr lang="it-IT" dirty="0"/>
-              <a:t>Ottenere prestazioni comparabili agli algoritmi stato dell’arte</a:t>
-            </a:r>
-          </a:p>
-          <a:p>
-            <a:r>
-              <a:rPr lang="it-IT" dirty="0"/>
-              <a:t>Mantenere tempi di esecuzione bassi</a:t>
-            </a:r>
-          </a:p>
-          <a:p>
-            <a:r>
-              <a:rPr lang="it-IT" dirty="0"/>
-              <a:t>Metrica: Area Under the ROC Curve</a:t>
-            </a:r>
-          </a:p>
-          <a:p>
-            <a:r>
-              <a:rPr lang="it-IT" dirty="0"/>
-              <a:t>K-</a:t>
-            </a:r>
-            <a:r>
-              <a:rPr lang="it-IT" dirty="0" err="1"/>
-              <a:t>fold</a:t>
-            </a:r>
-            <a:r>
-              <a:rPr lang="it-IT" dirty="0"/>
-              <a:t> cross </a:t>
-            </a:r>
-            <a:r>
-              <a:rPr lang="it-IT" dirty="0" err="1"/>
-              <a:t>validation</a:t>
-            </a:r>
-            <a:endParaRPr lang="it-IT" dirty="0"/>
-          </a:p>
-          <a:p>
-            <a:r>
-              <a:rPr lang="it-IT" dirty="0"/>
-              <a:t>Modelli di confronto:</a:t>
-            </a:r>
-          </a:p>
-          <a:p>
-            <a:pPr lvl="1"/>
-            <a:r>
-              <a:rPr lang="it-IT" dirty="0"/>
-              <a:t>ALS</a:t>
-            </a:r>
-          </a:p>
-          <a:p>
-            <a:pPr lvl="1"/>
-            <a:r>
-              <a:rPr lang="it-IT" dirty="0" err="1"/>
-              <a:t>NeuMF</a:t>
-            </a:r>
-            <a:endParaRPr lang="it-IT" dirty="0"/>
-          </a:p>
-          <a:p>
-            <a:pPr lvl="1"/>
-            <a:r>
-              <a:rPr lang="it-IT" dirty="0"/>
-              <a:t>ECAM </a:t>
-            </a:r>
-            <a:r>
-              <a:rPr lang="it-IT" dirty="0" err="1"/>
-              <a:t>NeuMF</a:t>
-            </a:r>
-            <a:endParaRPr lang="it-IT" dirty="0"/>
-          </a:p>
-          <a:p>
-            <a:endParaRPr lang="it-IT" dirty="0"/>
-          </a:p>
-        </p:txBody>
-      </p:sp>
-    </p:spTree>
-    <p:extLst>
-      <p:ext uri="{BB962C8B-B14F-4D97-AF65-F5344CB8AC3E}">
-        <p14:creationId xmlns:p14="http://schemas.microsoft.com/office/powerpoint/2010/main" val="541751724"/>
-      </p:ext>
-    </p:extLst>
-  </p:cSld>
-  <p:clrMapOvr>
-    <a:masterClrMapping/>
-  </p:clrMapOvr>
-</p:sld>
-</file>
-
-<file path=ppt/slides/slide11.xml><?xml version="1.0" encoding="utf-8"?>
-<p:sld xmlns:a="http://schemas.openxmlformats.org/drawingml/2006/main" xmlns:r="http://schemas.openxmlformats.org/officeDocument/2006/relationships" xmlns:p="http://schemas.openxmlformats.org/presentationml/2006/main">
-  <p:cSld>
-    <p:spTree>
-      <p:nvGrpSpPr>
-        <p:cNvPr id="1" name=""/>
-        <p:cNvGrpSpPr/>
-        <p:nvPr/>
-      </p:nvGrpSpPr>
-      <p:grpSpPr>
-        <a:xfrm>
-          <a:off x="0" y="0"/>
-          <a:ext cx="0" cy="0"/>
-          <a:chOff x="0" y="0"/>
-          <a:chExt cx="0" cy="0"/>
-        </a:xfrm>
-      </p:grpSpPr>
-      <p:sp>
-        <p:nvSpPr>
-          <p:cNvPr id="2" name="Titolo 1">
-            <a:extLst>
-              <a:ext uri="{FF2B5EF4-FFF2-40B4-BE49-F238E27FC236}">
                 <a16:creationId xmlns:a16="http://schemas.microsoft.com/office/drawing/2014/main" id="{43EAF889-71E4-403D-B7D3-14CE26366C96}"/>
               </a:ext>
             </a:extLst>
@@ -4961,7 +4842,7 @@
           </a:bodyPr>
           <a:lstStyle/>
           <a:p>
-            <a:pPr defTabSz="914400"/>
+            <a:pPr algn="ctr" defTabSz="914400"/>
             <a:r>
               <a:rPr lang="en-US" sz="4400" kern="1200" dirty="0" err="1">
                 <a:latin typeface="+mj-lt"/>
@@ -5068,7 +4949,7 @@
         </p:nvSpPr>
         <p:spPr>
           <a:xfrm>
-            <a:off x="-8111" y="2413337"/>
+            <a:off x="0" y="1859339"/>
             <a:ext cx="4091905" cy="3139321"/>
           </a:xfrm>
           <a:prstGeom prst="rect">
@@ -5200,7 +5081,7 @@
 </p:sld>
 </file>
 
-<file path=ppt/slides/slide12.xml><?xml version="1.0" encoding="utf-8"?>
+<file path=ppt/slides/slide11.xml><?xml version="1.0" encoding="utf-8"?>
 <p:sld xmlns:a="http://schemas.openxmlformats.org/drawingml/2006/main" xmlns:r="http://schemas.openxmlformats.org/officeDocument/2006/relationships" xmlns:p="http://schemas.openxmlformats.org/presentationml/2006/main">
   <p:cSld>
     <p:bg>
@@ -5361,8 +5242,8 @@
         </p:nvSpPr>
         <p:spPr>
           <a:xfrm>
-            <a:off x="1" y="1700808"/>
-            <a:ext cx="3914872" cy="3693319"/>
+            <a:off x="88218" y="1876706"/>
+            <a:ext cx="3914872" cy="3416320"/>
           </a:xfrm>
           <a:prstGeom prst="rect">
             <a:avLst/>
@@ -5407,7 +5288,7 @@
               <a:rPr lang="it-IT" sz="1800" b="0" i="0" u="none" strike="noStrike" baseline="0" dirty="0">
                 <a:latin typeface="CMR12"/>
               </a:rPr>
-              <a:t>precedentemente addestrato in un formato compatibile con dispositivi Android</a:t>
+              <a:t>in un formato compatibile con dispositivi Android</a:t>
             </a:r>
           </a:p>
           <a:p>
@@ -5474,6 +5355,126 @@
     <p:extLst>
       <p:ext uri="{BB962C8B-B14F-4D97-AF65-F5344CB8AC3E}">
         <p14:creationId xmlns:p14="http://schemas.microsoft.com/office/powerpoint/2010/main" val="3089386882"/>
+      </p:ext>
+    </p:extLst>
+  </p:cSld>
+  <p:clrMapOvr>
+    <a:masterClrMapping/>
+  </p:clrMapOvr>
+</p:sld>
+</file>
+
+<file path=ppt/slides/slide12.xml><?xml version="1.0" encoding="utf-8"?>
+<p:sld xmlns:a="http://schemas.openxmlformats.org/drawingml/2006/main" xmlns:r="http://schemas.openxmlformats.org/officeDocument/2006/relationships" xmlns:p="http://schemas.openxmlformats.org/presentationml/2006/main">
+  <p:cSld>
+    <p:spTree>
+      <p:nvGrpSpPr>
+        <p:cNvPr id="1" name=""/>
+        <p:cNvGrpSpPr/>
+        <p:nvPr/>
+      </p:nvGrpSpPr>
+      <p:grpSpPr>
+        <a:xfrm>
+          <a:off x="0" y="0"/>
+          <a:ext cx="0" cy="0"/>
+          <a:chOff x="0" y="0"/>
+          <a:chExt cx="0" cy="0"/>
+        </a:xfrm>
+      </p:grpSpPr>
+      <p:sp>
+        <p:nvSpPr>
+          <p:cNvPr id="2" name="Titolo 1">
+            <a:extLst>
+              <a:ext uri="{FF2B5EF4-FFF2-40B4-BE49-F238E27FC236}">
+                <a16:creationId xmlns:a16="http://schemas.microsoft.com/office/drawing/2014/main" id="{152980A4-3E84-4C09-8F59-8706C4B25284}"/>
+              </a:ext>
+            </a:extLst>
+          </p:cNvPr>
+          <p:cNvSpPr>
+            <a:spLocks noGrp="1"/>
+          </p:cNvSpPr>
+          <p:nvPr>
+            <p:ph type="title"/>
+          </p:nvPr>
+        </p:nvSpPr>
+        <p:spPr/>
+        <p:txBody>
+          <a:bodyPr/>
+          <a:lstStyle/>
+          <a:p>
+            <a:pPr algn="ctr"/>
+            <a:r>
+              <a:rPr lang="it-IT" dirty="0"/>
+              <a:t>Conclusioni</a:t>
+            </a:r>
+          </a:p>
+        </p:txBody>
+      </p:sp>
+      <p:sp>
+        <p:nvSpPr>
+          <p:cNvPr id="3" name="Segnaposto contenuto 2">
+            <a:extLst>
+              <a:ext uri="{FF2B5EF4-FFF2-40B4-BE49-F238E27FC236}">
+                <a16:creationId xmlns:a16="http://schemas.microsoft.com/office/drawing/2014/main" id="{1F9BD3DC-3555-44D3-9C15-FF91C6F96FE2}"/>
+              </a:ext>
+            </a:extLst>
+          </p:cNvPr>
+          <p:cNvSpPr>
+            <a:spLocks noGrp="1"/>
+          </p:cNvSpPr>
+          <p:nvPr>
+            <p:ph idx="1"/>
+          </p:nvPr>
+        </p:nvSpPr>
+        <p:spPr/>
+        <p:txBody>
+          <a:bodyPr/>
+          <a:lstStyle/>
+          <a:p>
+            <a:r>
+              <a:rPr lang="it-IT" dirty="0" err="1"/>
+              <a:t>moveCARS</a:t>
+            </a:r>
+            <a:r>
+              <a:rPr lang="it-IT" dirty="0"/>
+              <a:t> ha ottenuto risultati simili alle soluzioni stato dell’arte:</a:t>
+            </a:r>
+          </a:p>
+          <a:p>
+            <a:pPr lvl="1"/>
+            <a:r>
+              <a:rPr lang="it-IT" dirty="0"/>
+              <a:t>Con tempi di esecuzione minori</a:t>
+            </a:r>
+          </a:p>
+          <a:p>
+            <a:pPr lvl="1"/>
+            <a:r>
+              <a:rPr lang="it-IT" dirty="0"/>
+              <a:t>Con una struttura della rete meno restrittiva</a:t>
+            </a:r>
+          </a:p>
+          <a:p>
+            <a:r>
+              <a:rPr lang="it-IT" dirty="0"/>
+              <a:t>Il contesto ha un ruolo importante nelle raccomandazioni</a:t>
+            </a:r>
+          </a:p>
+          <a:p>
+            <a:r>
+              <a:rPr lang="it-IT" dirty="0"/>
+              <a:t>Se il contesto è molto descrittivo della situazione dell’utente le raccomandazioni sono ancora più precise</a:t>
+            </a:r>
+          </a:p>
+          <a:p>
+            <a:endParaRPr lang="it-IT" dirty="0"/>
+          </a:p>
+        </p:txBody>
+      </p:sp>
+    </p:spTree>
+    <p:extLst>
+      <p:ext uri="{BB962C8B-B14F-4D97-AF65-F5344CB8AC3E}">
+        <p14:creationId xmlns:p14="http://schemas.microsoft.com/office/powerpoint/2010/main" val="354855335"/>
       </p:ext>
     </p:extLst>
   </p:cSld>
@@ -5505,7 +5506,7 @@
           <p:cNvPr id="2" name="Titolo 1">
             <a:extLst>
               <a:ext uri="{FF2B5EF4-FFF2-40B4-BE49-F238E27FC236}">
-                <a16:creationId xmlns:a16="http://schemas.microsoft.com/office/drawing/2014/main" id="{152980A4-3E84-4C09-8F59-8706C4B25284}"/>
+                <a16:creationId xmlns:a16="http://schemas.microsoft.com/office/drawing/2014/main" id="{E967507E-1146-4581-B644-0005BC8A387E}"/>
               </a:ext>
             </a:extLst>
           </p:cNvPr>
@@ -5524,7 +5525,7 @@
             <a:pPr algn="ctr"/>
             <a:r>
               <a:rPr lang="it-IT" dirty="0"/>
-              <a:t>Conclusioni</a:t>
+              <a:t>Sviluppi futuri</a:t>
             </a:r>
           </a:p>
         </p:txBody>
@@ -5534,7 +5535,7 @@
           <p:cNvPr id="3" name="Segnaposto contenuto 2">
             <a:extLst>
               <a:ext uri="{FF2B5EF4-FFF2-40B4-BE49-F238E27FC236}">
-                <a16:creationId xmlns:a16="http://schemas.microsoft.com/office/drawing/2014/main" id="{1F9BD3DC-3555-44D3-9C15-FF91C6F96FE2}"/>
+                <a16:creationId xmlns:a16="http://schemas.microsoft.com/office/drawing/2014/main" id="{5570E059-74DD-4635-8D46-0B022D464045}"/>
               </a:ext>
             </a:extLst>
           </p:cNvPr>
@@ -5547,53 +5548,62 @@
         </p:nvSpPr>
         <p:spPr/>
         <p:txBody>
-          <a:bodyPr/>
+          <a:bodyPr>
+            <a:normAutofit/>
+          </a:bodyPr>
           <a:lstStyle/>
           <a:p>
+            <a:r>
+              <a:rPr lang="it-IT" dirty="0"/>
+              <a:t>Training dell’algoritmo su dispositivo mobile</a:t>
+            </a:r>
+          </a:p>
+          <a:p>
+            <a:pPr marL="0" indent="0">
+              <a:buNone/>
+            </a:pPr>
+            <a:endParaRPr lang="it-IT" dirty="0"/>
+          </a:p>
+          <a:p>
+            <a:r>
+              <a:rPr lang="it-IT" dirty="0"/>
+              <a:t>Valutare il modello </a:t>
+            </a:r>
             <a:r>
               <a:rPr lang="it-IT" dirty="0" err="1"/>
               <a:t>moveCARS</a:t>
             </a:r>
             <a:r>
               <a:rPr lang="it-IT" dirty="0"/>
-              <a:t> ha ottenuto risultati simili alle soluzioni stato dell’arte:</a:t>
-            </a:r>
-          </a:p>
-          <a:p>
-            <a:pPr lvl="1"/>
+              <a:t> su nuovi dataset</a:t>
+            </a:r>
+          </a:p>
+          <a:p>
+            <a:pPr marL="0" indent="0">
+              <a:buNone/>
+            </a:pPr>
+            <a:endParaRPr lang="it-IT" dirty="0"/>
+          </a:p>
+          <a:p>
             <a:r>
               <a:rPr lang="it-IT" dirty="0"/>
-              <a:t>Con tempi di esecuzione minori</a:t>
-            </a:r>
-          </a:p>
-          <a:p>
-            <a:pPr lvl="1"/>
+              <a:t>Sviluppare un’applicazione per dispositivi mobili per valutare le prestazioni di </a:t>
+            </a:r>
+            <a:r>
+              <a:rPr lang="it-IT" dirty="0" err="1"/>
+              <a:t>moveCARS</a:t>
+            </a:r>
             <a:r>
               <a:rPr lang="it-IT" dirty="0"/>
-              <a:t>Con una struttura della rete meno restrittiva</a:t>
-            </a:r>
-          </a:p>
-          <a:p>
-            <a:r>
-              <a:rPr lang="it-IT" dirty="0"/>
-              <a:t>Il contesto ha un ruolo importante nelle raccomandazioni</a:t>
-            </a:r>
-          </a:p>
-          <a:p>
-            <a:r>
-              <a:rPr lang="it-IT" dirty="0"/>
-              <a:t>Se il contesto è molto descrittivo della situazione dell’utente le raccomandazioni sono ancora più precise</a:t>
-            </a:r>
-          </a:p>
-          <a:p>
-            <a:endParaRPr lang="it-IT" dirty="0"/>
+              <a:t> in ambiente reale</a:t>
+            </a:r>
           </a:p>
         </p:txBody>
       </p:sp>
     </p:spTree>
     <p:extLst>
       <p:ext uri="{BB962C8B-B14F-4D97-AF65-F5344CB8AC3E}">
-        <p14:creationId xmlns:p14="http://schemas.microsoft.com/office/powerpoint/2010/main" val="354855335"/>
+        <p14:creationId xmlns:p14="http://schemas.microsoft.com/office/powerpoint/2010/main" val="3978805847"/>
       </p:ext>
     </p:extLst>
   </p:cSld>
@@ -5622,10 +5632,10 @@
       </p:grpSpPr>
       <p:sp>
         <p:nvSpPr>
-          <p:cNvPr id="2" name="Titolo 1">
+          <p:cNvPr id="12" name="Titolo 11">
             <a:extLst>
               <a:ext uri="{FF2B5EF4-FFF2-40B4-BE49-F238E27FC236}">
-                <a16:creationId xmlns:a16="http://schemas.microsoft.com/office/drawing/2014/main" id="{E967507E-1146-4581-B644-0005BC8A387E}"/>
+                <a16:creationId xmlns:a16="http://schemas.microsoft.com/office/drawing/2014/main" id="{69C17091-7F08-4D3E-BEF5-8B8246BFD142}"/>
               </a:ext>
             </a:extLst>
           </p:cNvPr>
@@ -5636,85 +5646,22 @@
             <p:ph type="title"/>
           </p:nvPr>
         </p:nvSpPr>
-        <p:spPr/>
-        <p:txBody>
-          <a:bodyPr/>
-          <a:lstStyle/>
-          <a:p>
-            <a:pPr algn="ctr"/>
-            <a:r>
-              <a:rPr lang="it-IT" dirty="0"/>
-              <a:t>Sviluppi futuri</a:t>
-            </a:r>
-          </a:p>
-        </p:txBody>
-      </p:sp>
-      <p:sp>
-        <p:nvSpPr>
-          <p:cNvPr id="3" name="Segnaposto contenuto 2">
-            <a:extLst>
-              <a:ext uri="{FF2B5EF4-FFF2-40B4-BE49-F238E27FC236}">
-                <a16:creationId xmlns:a16="http://schemas.microsoft.com/office/drawing/2014/main" id="{5570E059-74DD-4635-8D46-0B022D464045}"/>
-              </a:ext>
-            </a:extLst>
-          </p:cNvPr>
-          <p:cNvSpPr>
-            <a:spLocks noGrp="1"/>
-          </p:cNvSpPr>
-          <p:nvPr>
-            <p:ph idx="1"/>
-          </p:nvPr>
-        </p:nvSpPr>
-        <p:spPr/>
+        <p:spPr>
+          <a:xfrm>
+            <a:off x="609997" y="2492896"/>
+            <a:ext cx="7886700" cy="1325563"/>
+          </a:xfrm>
+        </p:spPr>
         <p:txBody>
           <a:bodyPr>
             <a:normAutofit/>
           </a:bodyPr>
           <a:lstStyle/>
           <a:p>
-            <a:r>
-              <a:rPr lang="it-IT" dirty="0"/>
-              <a:t>Training dell’algoritmo su dispositivo mobile</a:t>
-            </a:r>
-          </a:p>
-          <a:p>
-            <a:pPr marL="0" indent="0">
-              <a:buNone/>
-            </a:pPr>
-            <a:endParaRPr lang="it-IT" dirty="0"/>
-          </a:p>
-          <a:p>
-            <a:r>
-              <a:rPr lang="it-IT" dirty="0"/>
-              <a:t>Valutare il modello </a:t>
-            </a:r>
-            <a:r>
-              <a:rPr lang="it-IT" dirty="0" err="1"/>
-              <a:t>moveCARS</a:t>
-            </a:r>
-            <a:r>
-              <a:rPr lang="it-IT" dirty="0"/>
-              <a:t> su nuovi dataset</a:t>
-            </a:r>
-          </a:p>
-          <a:p>
-            <a:pPr marL="0" indent="0">
-              <a:buNone/>
-            </a:pPr>
-            <a:endParaRPr lang="it-IT" dirty="0"/>
-          </a:p>
-          <a:p>
-            <a:r>
-              <a:rPr lang="it-IT" dirty="0"/>
-              <a:t>Sviluppare un’applicazione per dispositivi mobili per valutare le prestazioni di </a:t>
-            </a:r>
-            <a:r>
-              <a:rPr lang="it-IT" dirty="0" err="1"/>
-              <a:t>moveCARS</a:t>
-            </a:r>
-            <a:r>
-              <a:rPr lang="it-IT" dirty="0"/>
-              <a:t> in ambiente reale</a:t>
+            <a:pPr algn="ctr"/>
+            <a:r>
+              <a:rPr lang="it-IT" sz="5400" dirty="0"/>
+              <a:t>Grazie</a:t>
             </a:r>
           </a:p>
         </p:txBody>
@@ -5722,7 +5669,7 @@
     </p:spTree>
     <p:extLst>
       <p:ext uri="{BB962C8B-B14F-4D97-AF65-F5344CB8AC3E}">
-        <p14:creationId xmlns:p14="http://schemas.microsoft.com/office/powerpoint/2010/main" val="3978805847"/>
+        <p14:creationId xmlns:p14="http://schemas.microsoft.com/office/powerpoint/2010/main" val="1073096933"/>
       </p:ext>
     </p:extLst>
   </p:cSld>
@@ -5732,7 +5679,7 @@
 </p:sld>
 </file>
 
-<file path=ppt/slides/slide15.xml><?xml version="1.0" encoding="utf-8"?>
+<file path=ppt/slides/slide2.xml><?xml version="1.0" encoding="utf-8"?>
 <p:sld xmlns:a="http://schemas.openxmlformats.org/drawingml/2006/main" xmlns:r="http://schemas.openxmlformats.org/officeDocument/2006/relationships" xmlns:p="http://schemas.openxmlformats.org/presentationml/2006/main">
   <p:cSld>
     <p:spTree>
@@ -5751,72 +5698,6 @@
       </p:grpSpPr>
       <p:sp>
         <p:nvSpPr>
-          <p:cNvPr id="12" name="Titolo 11">
-            <a:extLst>
-              <a:ext uri="{FF2B5EF4-FFF2-40B4-BE49-F238E27FC236}">
-                <a16:creationId xmlns:a16="http://schemas.microsoft.com/office/drawing/2014/main" id="{69C17091-7F08-4D3E-BEF5-8B8246BFD142}"/>
-              </a:ext>
-            </a:extLst>
-          </p:cNvPr>
-          <p:cNvSpPr>
-            <a:spLocks noGrp="1"/>
-          </p:cNvSpPr>
-          <p:nvPr>
-            <p:ph type="title"/>
-          </p:nvPr>
-        </p:nvSpPr>
-        <p:spPr>
-          <a:xfrm>
-            <a:off x="609997" y="2492896"/>
-            <a:ext cx="7886700" cy="1325563"/>
-          </a:xfrm>
-        </p:spPr>
-        <p:txBody>
-          <a:bodyPr>
-            <a:normAutofit/>
-          </a:bodyPr>
-          <a:lstStyle/>
-          <a:p>
-            <a:pPr algn="ctr"/>
-            <a:r>
-              <a:rPr lang="it-IT" sz="5400" dirty="0"/>
-              <a:t>Grazie</a:t>
-            </a:r>
-          </a:p>
-        </p:txBody>
-      </p:sp>
-    </p:spTree>
-    <p:extLst>
-      <p:ext uri="{BB962C8B-B14F-4D97-AF65-F5344CB8AC3E}">
-        <p14:creationId xmlns:p14="http://schemas.microsoft.com/office/powerpoint/2010/main" val="1073096933"/>
-      </p:ext>
-    </p:extLst>
-  </p:cSld>
-  <p:clrMapOvr>
-    <a:masterClrMapping/>
-  </p:clrMapOvr>
-</p:sld>
-</file>
-
-<file path=ppt/slides/slide2.xml><?xml version="1.0" encoding="utf-8"?>
-<p:sld xmlns:a="http://schemas.openxmlformats.org/drawingml/2006/main" xmlns:r="http://schemas.openxmlformats.org/officeDocument/2006/relationships" xmlns:p="http://schemas.openxmlformats.org/presentationml/2006/main" show="0">
-  <p:cSld>
-    <p:spTree>
-      <p:nvGrpSpPr>
-        <p:cNvPr id="1" name=""/>
-        <p:cNvGrpSpPr/>
-        <p:nvPr/>
-      </p:nvGrpSpPr>
-      <p:grpSpPr>
-        <a:xfrm>
-          <a:off x="0" y="0"/>
-          <a:ext cx="0" cy="0"/>
-          <a:chOff x="0" y="0"/>
-          <a:chExt cx="0" cy="0"/>
-        </a:xfrm>
-      </p:grpSpPr>
-      <p:sp>
-        <p:nvSpPr>
           <p:cNvPr id="2" name="Titolo 1">
             <a:extLst>
               <a:ext uri="{FF2B5EF4-FFF2-40B4-BE49-F238E27FC236}">
@@ -5833,7 +5714,7 @@
         </p:nvSpPr>
         <p:spPr>
           <a:xfrm>
-            <a:off x="628650" y="0"/>
+            <a:off x="628650" y="-171400"/>
             <a:ext cx="7886700" cy="1325563"/>
           </a:xfrm>
         </p:spPr>
@@ -5867,80 +5748,156 @@
         </p:nvSpPr>
         <p:spPr>
           <a:xfrm>
-            <a:off x="179512" y="1484784"/>
-            <a:ext cx="8856984" cy="5112568"/>
+            <a:off x="143507" y="3887194"/>
+            <a:ext cx="8856984" cy="2376264"/>
           </a:xfrm>
         </p:spPr>
         <p:txBody>
           <a:bodyPr>
-            <a:normAutofit fontScale="92500" lnSpcReduction="10000"/>
+            <a:normAutofit lnSpcReduction="10000"/>
           </a:bodyPr>
           <a:lstStyle/>
           <a:p>
             <a:r>
+              <a:rPr lang="it-IT" sz="2200" dirty="0"/>
+              <a:t>I dispositivi mobili stanno contribuendo all’evoluzione dello </a:t>
+            </a:r>
+            <a:r>
+              <a:rPr lang="it-IT" sz="2200" dirty="0" err="1"/>
+              <a:t>edge</a:t>
+            </a:r>
+            <a:r>
+              <a:rPr lang="it-IT" sz="2200" dirty="0"/>
+              <a:t> computing</a:t>
+            </a:r>
+          </a:p>
+          <a:p>
+            <a:r>
+              <a:rPr lang="it-IT" sz="2200" dirty="0"/>
+              <a:t>Scoperta di nuovi contenuti tramite comunicazione device-to-device</a:t>
+            </a:r>
+          </a:p>
+          <a:p>
+            <a:r>
+              <a:rPr lang="it-IT" sz="2200" dirty="0"/>
+              <a:t>Un </a:t>
+            </a:r>
+            <a:r>
+              <a:rPr lang="it-IT" sz="2200" dirty="0" err="1"/>
+              <a:t>recommender</a:t>
+            </a:r>
+            <a:r>
+              <a:rPr lang="it-IT" sz="2200" dirty="0"/>
+              <a:t> system (RS) può essere utile per filtrare i contenuti scoperti</a:t>
+            </a:r>
+          </a:p>
+          <a:p>
+            <a:r>
+              <a:rPr lang="it-IT" sz="2200" dirty="0"/>
+              <a:t>La dinamicità dell’ambiente richiede una soluzione che possa essere eseguita su dispositivo mobile</a:t>
+            </a:r>
+          </a:p>
+        </p:txBody>
+      </p:sp>
+      <p:pic>
+        <p:nvPicPr>
+          <p:cNvPr id="6" name="Immagine 5">
+            <a:extLst>
+              <a:ext uri="{FF2B5EF4-FFF2-40B4-BE49-F238E27FC236}">
+                <a16:creationId xmlns:a16="http://schemas.microsoft.com/office/drawing/2014/main" id="{2B6E08D7-541C-4528-883B-6C8D50734E4B}"/>
+              </a:ext>
+            </a:extLst>
+          </p:cNvPr>
+          <p:cNvPicPr>
+            <a:picLocks noChangeAspect="1"/>
+          </p:cNvPicPr>
+          <p:nvPr/>
+        </p:nvPicPr>
+        <p:blipFill>
+          <a:blip r:embed="rId2"/>
+          <a:stretch>
+            <a:fillRect/>
+          </a:stretch>
+        </p:blipFill>
+        <p:spPr>
+          <a:xfrm>
+            <a:off x="3097364" y="838831"/>
+            <a:ext cx="2949271" cy="2944060"/>
+          </a:xfrm>
+          <a:prstGeom prst="rect">
+            <a:avLst/>
+          </a:prstGeom>
+        </p:spPr>
+      </p:pic>
+      <p:sp>
+        <p:nvSpPr>
+          <p:cNvPr id="7" name="Segnaposto piè di pagina 6">
+            <a:extLst>
+              <a:ext uri="{FF2B5EF4-FFF2-40B4-BE49-F238E27FC236}">
+                <a16:creationId xmlns:a16="http://schemas.microsoft.com/office/drawing/2014/main" id="{5AC6F72A-4570-4CF6-82F7-D0528FE36F23}"/>
+              </a:ext>
+            </a:extLst>
+          </p:cNvPr>
+          <p:cNvSpPr>
+            <a:spLocks noGrp="1"/>
+          </p:cNvSpPr>
+          <p:nvPr>
+            <p:ph type="ftr" sz="quarter" idx="11"/>
+          </p:nvPr>
+        </p:nvSpPr>
+        <p:spPr>
+          <a:xfrm>
+            <a:off x="2468606" y="6356351"/>
+            <a:ext cx="4207346" cy="365125"/>
+          </a:xfrm>
+        </p:spPr>
+        <p:txBody>
+          <a:bodyPr/>
+          <a:lstStyle/>
+          <a:p>
+            <a:pPr>
+              <a:defRPr/>
+            </a:pPr>
+            <a:r>
               <a:rPr lang="it-IT" dirty="0"/>
-              <a:t>I dispositivi mobili stanno contribuendo all’evoluzione </a:t>
+              <a:t>Fonte immagine: Mattia G. Campana. </a:t>
             </a:r>
             <a:r>
               <a:rPr lang="it-IT" dirty="0" err="1"/>
-              <a:t>dell’edge</a:t>
+              <a:t>Context-aware</a:t>
             </a:r>
             <a:r>
               <a:rPr lang="it-IT" dirty="0"/>
-              <a:t> computing</a:t>
-            </a:r>
-          </a:p>
-          <a:p>
+              <a:t> </a:t>
+            </a:r>
+            <a:r>
+              <a:rPr lang="it-IT" dirty="0" err="1"/>
+              <a:t>recommender</a:t>
+            </a:r>
             <a:r>
               <a:rPr lang="it-IT" dirty="0"/>
-              <a:t>Questi dispositivi sono centrali, interagiscono tramite comunicazione D2D con altri dispositivi e scoprono nuovi contenuti per gli utenti</a:t>
-            </a:r>
-          </a:p>
-          <a:p>
+              <a:t> systems for </a:t>
+            </a:r>
+            <a:r>
+              <a:rPr lang="it-IT" dirty="0" err="1"/>
+              <a:t>opportunistic</a:t>
+            </a:r>
             <a:r>
               <a:rPr lang="it-IT" dirty="0"/>
-              <a:t>Un RS per dispositivi mobili può essere utile per filtrare questi contenuti</a:t>
-            </a:r>
-          </a:p>
-          <a:p>
-            <a:r>
-              <a:rPr lang="it-IT" dirty="0"/>
-              <a:t>A differenza degli RS centralizzati, le informazioni sono limitate a quelle raccolte dall’utente locale, non esiste una conoscenza globale di tutti gli utenti e oggetti del sistema</a:t>
-            </a:r>
-          </a:p>
-          <a:p>
-            <a:r>
-              <a:rPr lang="it-IT" dirty="0"/>
-              <a:t>Vantaggi di un RS mobile:</a:t>
-            </a:r>
-          </a:p>
-          <a:p>
-            <a:pPr lvl="1"/>
-            <a:r>
-              <a:rPr lang="it-IT" dirty="0"/>
-              <a:t>Velocità adattamento</a:t>
-            </a:r>
-          </a:p>
-          <a:p>
-            <a:pPr lvl="1"/>
-            <a:r>
-              <a:rPr lang="it-IT" dirty="0"/>
-              <a:t>Privacy utenti</a:t>
-            </a:r>
-          </a:p>
-          <a:p>
-            <a:pPr lvl="1"/>
-            <a:r>
-              <a:rPr lang="it-IT" dirty="0"/>
-              <a:t>Contesto fisico e sociale molto descrittivo</a:t>
-            </a:r>
+              <a:t> </a:t>
+            </a:r>
+            <a:r>
+              <a:rPr lang="it-IT" dirty="0" err="1"/>
+              <a:t>environments</a:t>
+            </a:r>
+            <a:endParaRPr lang="it-IT" dirty="0"/>
           </a:p>
         </p:txBody>
       </p:sp>
     </p:spTree>
     <p:extLst>
       <p:ext uri="{BB962C8B-B14F-4D97-AF65-F5344CB8AC3E}">
-        <p14:creationId xmlns:p14="http://schemas.microsoft.com/office/powerpoint/2010/main" val="3189697558"/>
+        <p14:creationId xmlns:p14="http://schemas.microsoft.com/office/powerpoint/2010/main" val="3402772325"/>
       </p:ext>
     </p:extLst>
   </p:cSld>
@@ -5972,169 +5929,6 @@
           <p:cNvPr id="2" name="Titolo 1">
             <a:extLst>
               <a:ext uri="{FF2B5EF4-FFF2-40B4-BE49-F238E27FC236}">
-                <a16:creationId xmlns:a16="http://schemas.microsoft.com/office/drawing/2014/main" id="{408C4C7B-E853-45EB-B3EC-438728329FFF}"/>
-              </a:ext>
-            </a:extLst>
-          </p:cNvPr>
-          <p:cNvSpPr>
-            <a:spLocks noGrp="1"/>
-          </p:cNvSpPr>
-          <p:nvPr>
-            <p:ph type="title"/>
-          </p:nvPr>
-        </p:nvSpPr>
-        <p:spPr>
-          <a:xfrm>
-            <a:off x="628650" y="-171400"/>
-            <a:ext cx="7886700" cy="1325563"/>
-          </a:xfrm>
-        </p:spPr>
-        <p:txBody>
-          <a:bodyPr/>
-          <a:lstStyle/>
-          <a:p>
-            <a:pPr algn="ctr"/>
-            <a:r>
-              <a:rPr lang="it-IT" dirty="0"/>
-              <a:t>Ambiente di riferimento</a:t>
-            </a:r>
-          </a:p>
-        </p:txBody>
-      </p:sp>
-      <p:sp>
-        <p:nvSpPr>
-          <p:cNvPr id="3" name="Segnaposto contenuto 2">
-            <a:extLst>
-              <a:ext uri="{FF2B5EF4-FFF2-40B4-BE49-F238E27FC236}">
-                <a16:creationId xmlns:a16="http://schemas.microsoft.com/office/drawing/2014/main" id="{1092EA9F-6FED-4186-AA52-B095CB45B0D3}"/>
-              </a:ext>
-            </a:extLst>
-          </p:cNvPr>
-          <p:cNvSpPr>
-            <a:spLocks noGrp="1"/>
-          </p:cNvSpPr>
-          <p:nvPr>
-            <p:ph idx="1"/>
-          </p:nvPr>
-        </p:nvSpPr>
-        <p:spPr>
-          <a:xfrm>
-            <a:off x="143508" y="3799426"/>
-            <a:ext cx="8856984" cy="2941941"/>
-          </a:xfrm>
-        </p:spPr>
-        <p:txBody>
-          <a:bodyPr>
-            <a:normAutofit lnSpcReduction="10000"/>
-          </a:bodyPr>
-          <a:lstStyle/>
-          <a:p>
-            <a:r>
-              <a:rPr lang="it-IT" dirty="0"/>
-              <a:t>I dispositivi mobili stanno contribuendo all’evoluzione dello </a:t>
-            </a:r>
-            <a:r>
-              <a:rPr lang="it-IT" dirty="0" err="1"/>
-              <a:t>edge</a:t>
-            </a:r>
-            <a:r>
-              <a:rPr lang="it-IT" dirty="0"/>
-              <a:t> computing</a:t>
-            </a:r>
-          </a:p>
-          <a:p>
-            <a:r>
-              <a:rPr lang="it-IT" dirty="0"/>
-              <a:t>I dispositivi mobili scoprono nuovi contenuti per gli utenti</a:t>
-            </a:r>
-          </a:p>
-          <a:p>
-            <a:r>
-              <a:rPr lang="it-IT" dirty="0"/>
-              <a:t>Un </a:t>
-            </a:r>
-            <a:r>
-              <a:rPr lang="it-IT" dirty="0" err="1"/>
-              <a:t>recommender</a:t>
-            </a:r>
-            <a:r>
-              <a:rPr lang="it-IT" dirty="0"/>
-              <a:t> system (RS) può essere utile per filtrare questi contenuti</a:t>
-            </a:r>
-          </a:p>
-          <a:p>
-            <a:r>
-              <a:rPr lang="it-IT" dirty="0"/>
-              <a:t>La dinamicità dell’ambiente richiede una soluzione che possa eseguire su dispositivo mobile</a:t>
-            </a:r>
-          </a:p>
-        </p:txBody>
-      </p:sp>
-      <p:pic>
-        <p:nvPicPr>
-          <p:cNvPr id="5" name="Immagine 4">
-            <a:extLst>
-              <a:ext uri="{FF2B5EF4-FFF2-40B4-BE49-F238E27FC236}">
-                <a16:creationId xmlns:a16="http://schemas.microsoft.com/office/drawing/2014/main" id="{57ECDB0F-E642-4625-9AC8-157C0837E278}"/>
-              </a:ext>
-            </a:extLst>
-          </p:cNvPr>
-          <p:cNvPicPr>
-            <a:picLocks noChangeAspect="1"/>
-          </p:cNvPicPr>
-          <p:nvPr/>
-        </p:nvPicPr>
-        <p:blipFill>
-          <a:blip r:embed="rId2"/>
-          <a:stretch>
-            <a:fillRect/>
-          </a:stretch>
-        </p:blipFill>
-        <p:spPr>
-          <a:xfrm>
-            <a:off x="3293858" y="908720"/>
-            <a:ext cx="2556284" cy="2826660"/>
-          </a:xfrm>
-          <a:prstGeom prst="rect">
-            <a:avLst/>
-          </a:prstGeom>
-        </p:spPr>
-      </p:pic>
-    </p:spTree>
-    <p:extLst>
-      <p:ext uri="{BB962C8B-B14F-4D97-AF65-F5344CB8AC3E}">
-        <p14:creationId xmlns:p14="http://schemas.microsoft.com/office/powerpoint/2010/main" val="3402772325"/>
-      </p:ext>
-    </p:extLst>
-  </p:cSld>
-  <p:clrMapOvr>
-    <a:masterClrMapping/>
-  </p:clrMapOvr>
-</p:sld>
-</file>
-
-<file path=ppt/slides/slide4.xml><?xml version="1.0" encoding="utf-8"?>
-<p:sld xmlns:a="http://schemas.openxmlformats.org/drawingml/2006/main" xmlns:r="http://schemas.openxmlformats.org/officeDocument/2006/relationships" xmlns:p="http://schemas.openxmlformats.org/presentationml/2006/main">
-  <p:cSld>
-    <p:spTree>
-      <p:nvGrpSpPr>
-        <p:cNvPr id="1" name=""/>
-        <p:cNvGrpSpPr/>
-        <p:nvPr/>
-      </p:nvGrpSpPr>
-      <p:grpSpPr>
-        <a:xfrm>
-          <a:off x="0" y="0"/>
-          <a:ext cx="0" cy="0"/>
-          <a:chOff x="0" y="0"/>
-          <a:chExt cx="0" cy="0"/>
-        </a:xfrm>
-      </p:grpSpPr>
-      <p:sp>
-        <p:nvSpPr>
-          <p:cNvPr id="2" name="Titolo 1">
-            <a:extLst>
-              <a:ext uri="{FF2B5EF4-FFF2-40B4-BE49-F238E27FC236}">
                 <a16:creationId xmlns:a16="http://schemas.microsoft.com/office/drawing/2014/main" id="{6E85C9F5-082B-43A8-B30E-83A00057087C}"/>
               </a:ext>
             </a:extLst>
@@ -6183,49 +5977,49 @@
         <p:spPr>
           <a:xfrm>
             <a:off x="251520" y="3569678"/>
-            <a:ext cx="8640960" cy="3171690"/>
+            <a:ext cx="8640960" cy="2667634"/>
           </a:xfrm>
         </p:spPr>
         <p:txBody>
           <a:bodyPr>
-            <a:normAutofit lnSpcReduction="10000"/>
+            <a:normAutofit/>
           </a:bodyPr>
           <a:lstStyle/>
           <a:p>
             <a:r>
-              <a:rPr lang="it-IT" dirty="0"/>
-              <a:t>Generano raccomandazioni personalizzate per gli utenti</a:t>
-            </a:r>
-          </a:p>
-          <a:p>
-            <a:r>
-              <a:rPr lang="it-IT" b="0" i="0" u="none" strike="noStrike" baseline="0" dirty="0"/>
+              <a:rPr lang="it-IT" sz="2400" dirty="0"/>
+              <a:t>I RS generano raccomandazioni personalizzate per gli utenti</a:t>
+            </a:r>
+          </a:p>
+          <a:p>
+            <a:r>
+              <a:rPr lang="it-IT" sz="2400" b="0" i="0" u="none" strike="noStrike" baseline="0" dirty="0"/>
               <a:t>RS centralizzati: conoscenza globale di tutti gli utenti e oggetti</a:t>
             </a:r>
           </a:p>
           <a:p>
             <a:r>
-              <a:rPr lang="it-IT" dirty="0"/>
-              <a:t>RS mobile: le informazioni sono limitate a quelle raccolte dall’utente locale</a:t>
-            </a:r>
-          </a:p>
-          <a:p>
-            <a:r>
-              <a:rPr lang="it-IT" dirty="0"/>
-              <a:t>Integrare contesto descrittivo</a:t>
-            </a:r>
-          </a:p>
-          <a:p>
-            <a:r>
-              <a:rPr lang="it-IT" i="0" u="none" strike="noStrike" baseline="0" dirty="0"/>
-              <a:t>Obiettivo tesi: RS </a:t>
-            </a:r>
-            <a:r>
-              <a:rPr lang="it-IT" i="0" u="none" strike="noStrike" baseline="0" dirty="0" err="1"/>
+              <a:rPr lang="it-IT" sz="2400" dirty="0"/>
+              <a:t>RS per dispositivi mobili: le informazioni sono limitate a quelle raccolte dall’utente locale</a:t>
+            </a:r>
+          </a:p>
+          <a:p>
+            <a:r>
+              <a:rPr lang="it-IT" sz="2400" dirty="0"/>
+              <a:t>Necessità di considerare un contesto descrittivo</a:t>
+            </a:r>
+          </a:p>
+          <a:p>
+            <a:r>
+              <a:rPr lang="it-IT" sz="2400" i="0" u="none" strike="noStrike" baseline="0" dirty="0"/>
+              <a:t>Scopo tesi: RS </a:t>
+            </a:r>
+            <a:r>
+              <a:rPr lang="it-IT" sz="2400" i="0" u="none" strike="noStrike" baseline="0" dirty="0" err="1"/>
               <a:t>context-aware</a:t>
             </a:r>
             <a:r>
-              <a:rPr lang="it-IT" i="0" u="none" strike="noStrike" baseline="0" dirty="0"/>
+              <a:rPr lang="it-IT" sz="2400" i="0" u="none" strike="noStrike" baseline="0" dirty="0"/>
               <a:t> per dispositivi mobili </a:t>
             </a:r>
           </a:p>
@@ -6276,6 +6070,38 @@
           </a:prstGeom>
         </p:spPr>
       </p:pic>
+      <p:sp>
+        <p:nvSpPr>
+          <p:cNvPr id="4" name="Segnaposto piè di pagina 3">
+            <a:extLst>
+              <a:ext uri="{FF2B5EF4-FFF2-40B4-BE49-F238E27FC236}">
+                <a16:creationId xmlns:a16="http://schemas.microsoft.com/office/drawing/2014/main" id="{2D8C7F65-F6DB-42E6-BD0E-CDD6680FFB5A}"/>
+              </a:ext>
+            </a:extLst>
+          </p:cNvPr>
+          <p:cNvSpPr>
+            <a:spLocks noGrp="1"/>
+          </p:cNvSpPr>
+          <p:nvPr>
+            <p:ph type="ftr" sz="quarter" idx="11"/>
+          </p:nvPr>
+        </p:nvSpPr>
+        <p:spPr/>
+        <p:txBody>
+          <a:bodyPr/>
+          <a:lstStyle/>
+          <a:p>
+            <a:pPr>
+              <a:defRPr/>
+            </a:pPr>
+            <a:r>
+              <a:rPr lang="en-GB"/>
+              <a:t>Fonte immagine: https://morioh.com/p/023edf0a8587</a:t>
+            </a:r>
+            <a:endParaRPr lang="en-GB" dirty="0"/>
+          </a:p>
+        </p:txBody>
+      </p:sp>
     </p:spTree>
     <p:extLst>
       <p:ext uri="{BB962C8B-B14F-4D97-AF65-F5344CB8AC3E}">
@@ -6289,7 +6115,7 @@
 </p:sld>
 </file>
 
-<file path=ppt/slides/slide5.xml><?xml version="1.0" encoding="utf-8"?>
+<file path=ppt/slides/slide4.xml><?xml version="1.0" encoding="utf-8"?>
 <p:sld xmlns:a="http://schemas.openxmlformats.org/drawingml/2006/main" xmlns:r="http://schemas.openxmlformats.org/officeDocument/2006/relationships" xmlns:p="http://schemas.openxmlformats.org/presentationml/2006/main">
   <p:cSld>
     <p:bg>
@@ -6416,7 +6242,7 @@
             </p:nvSpPr>
             <p:spPr>
               <a:xfrm>
-                <a:off x="332070" y="3915562"/>
+                <a:off x="332065" y="3545842"/>
                 <a:ext cx="8479859" cy="2731151"/>
               </a:xfrm>
               <a:prstGeom prst="rect">
@@ -6462,8 +6288,47 @@
                 </a:r>
                 <a:r>
                   <a:rPr lang="it-IT" dirty="0"/>
-                  <a:t>algoritmo che fattorizza la matrice in due matrici di dimensione minore</a:t>
+                  <a:t>algoritmo che fattorizza la matrice </a:t>
                 </a:r>
+                <a14:m>
+                  <m:oMath xmlns:m="http://schemas.openxmlformats.org/officeDocument/2006/math">
+                    <m:r>
+                      <a:rPr lang="it-IT" i="1" dirty="0" smtClean="0">
+                        <a:latin typeface="Cambria Math" panose="02040503050406030204" pitchFamily="18" charset="0"/>
+                      </a:rPr>
+                      <m:t>𝐴</m:t>
+                    </m:r>
+                  </m:oMath>
+                </a14:m>
+                <a:r>
+                  <a:rPr lang="it-IT" dirty="0"/>
+                  <a:t> in due matrici di fattori latenti di dimensione minore </a:t>
+                </a:r>
+                <a14:m>
+                  <m:oMath xmlns:m="http://schemas.openxmlformats.org/officeDocument/2006/math">
+                    <m:r>
+                      <a:rPr lang="it-IT" i="1" dirty="0" smtClean="0">
+                        <a:latin typeface="Cambria Math" panose="02040503050406030204" pitchFamily="18" charset="0"/>
+                      </a:rPr>
+                      <m:t>𝑃</m:t>
+                    </m:r>
+                  </m:oMath>
+                </a14:m>
+                <a:r>
+                  <a:rPr lang="it-IT" dirty="0"/>
+                  <a:t> e </a:t>
+                </a:r>
+                <a14:m>
+                  <m:oMath xmlns:m="http://schemas.openxmlformats.org/officeDocument/2006/math">
+                    <m:r>
+                      <a:rPr lang="it-IT" i="1" dirty="0" smtClean="0">
+                        <a:latin typeface="Cambria Math" panose="02040503050406030204" pitchFamily="18" charset="0"/>
+                      </a:rPr>
+                      <m:t>𝑄</m:t>
+                    </m:r>
+                  </m:oMath>
+                </a14:m>
+                <a:endParaRPr lang="it-IT" dirty="0"/>
               </a:p>
               <a:p>
                 <a:pPr marL="742950" lvl="1" indent="-285750">
@@ -6677,7 +6542,7 @@
             </p:nvSpPr>
             <p:spPr>
               <a:xfrm>
-                <a:off x="332070" y="3915562"/>
+                <a:off x="332065" y="3545842"/>
                 <a:ext cx="8479859" cy="2731151"/>
               </a:xfrm>
               <a:prstGeom prst="rect">
@@ -6686,7 +6551,7 @@
               <a:blipFill>
                 <a:blip r:embed="rId4"/>
                 <a:stretch>
-                  <a:fillRect l="-575" t="-1116"/>
+                  <a:fillRect l="-575" t="-1339"/>
                 </a:stretch>
               </a:blipFill>
             </p:spPr>
@@ -6705,6 +6570,43 @@
           </p:sp>
         </mc:Fallback>
       </mc:AlternateContent>
+      <p:sp>
+        <p:nvSpPr>
+          <p:cNvPr id="2" name="Segnaposto piè di pagina 1">
+            <a:extLst>
+              <a:ext uri="{FF2B5EF4-FFF2-40B4-BE49-F238E27FC236}">
+                <a16:creationId xmlns:a16="http://schemas.microsoft.com/office/drawing/2014/main" id="{2DB7E22F-EF06-4EEE-B3BB-5436C6D8C406}"/>
+              </a:ext>
+            </a:extLst>
+          </p:cNvPr>
+          <p:cNvSpPr>
+            <a:spLocks noGrp="1"/>
+          </p:cNvSpPr>
+          <p:nvPr>
+            <p:ph type="ftr" sz="quarter" idx="11"/>
+          </p:nvPr>
+        </p:nvSpPr>
+        <p:spPr>
+          <a:xfrm>
+            <a:off x="2576333" y="6350002"/>
+            <a:ext cx="3991322" cy="365125"/>
+          </a:xfrm>
+        </p:spPr>
+        <p:txBody>
+          <a:bodyPr/>
+          <a:lstStyle/>
+          <a:p>
+            <a:pPr>
+              <a:defRPr/>
+            </a:pPr>
+            <a:r>
+              <a:rPr lang="en-GB"/>
+              <a:t>Fonte immagine: https://developers.google.com/machine-learning/recommendation/collaborative/matrix </a:t>
+            </a:r>
+            <a:endParaRPr lang="en-GB" dirty="0"/>
+          </a:p>
+        </p:txBody>
+      </p:sp>
     </p:spTree>
     <p:extLst>
       <p:ext uri="{BB962C8B-B14F-4D97-AF65-F5344CB8AC3E}">
@@ -6718,7 +6620,7 @@
 </p:sld>
 </file>
 
-<file path=ppt/slides/slide6.xml><?xml version="1.0" encoding="utf-8"?>
+<file path=ppt/slides/slide5.xml><?xml version="1.0" encoding="utf-8"?>
 <p:sld xmlns:a="http://schemas.openxmlformats.org/drawingml/2006/main" xmlns:r="http://schemas.openxmlformats.org/officeDocument/2006/relationships" xmlns:p="http://schemas.openxmlformats.org/presentationml/2006/main">
   <p:cSld>
     <p:spTree>
@@ -6754,93 +6656,101 @@
         <p:spPr>
           <a:xfrm>
             <a:off x="404079" y="3927378"/>
-            <a:ext cx="8335839" cy="2813990"/>
+            <a:ext cx="8335839" cy="2529974"/>
           </a:xfrm>
         </p:spPr>
         <p:txBody>
           <a:bodyPr>
-            <a:normAutofit fontScale="85000" lnSpcReduction="20000"/>
+            <a:normAutofit fontScale="92500" lnSpcReduction="10000"/>
           </a:bodyPr>
           <a:lstStyle/>
           <a:p>
             <a:r>
-              <a:rPr lang="it-IT" dirty="0"/>
+              <a:rPr lang="it-IT" sz="2000" dirty="0"/>
               <a:t>Combina una rete neurale con l’approccio </a:t>
             </a:r>
             <a:r>
-              <a:rPr lang="it-IT" dirty="0" err="1"/>
+              <a:rPr lang="it-IT" sz="2000" dirty="0" err="1"/>
               <a:t>matrix</a:t>
             </a:r>
             <a:r>
-              <a:rPr lang="it-IT" dirty="0"/>
+              <a:rPr lang="it-IT" sz="2000" dirty="0"/>
               <a:t> </a:t>
             </a:r>
             <a:r>
-              <a:rPr lang="it-IT" dirty="0" err="1"/>
+              <a:rPr lang="it-IT" sz="2000" dirty="0" err="1"/>
               <a:t>factorization</a:t>
             </a:r>
-            <a:endParaRPr lang="it-IT" dirty="0"/>
-          </a:p>
-          <a:p>
-            <a:r>
-              <a:rPr lang="it-IT" dirty="0"/>
+            <a:endParaRPr lang="it-IT" sz="2000" dirty="0"/>
+          </a:p>
+          <a:p>
+            <a:r>
+              <a:rPr lang="it-IT" sz="2000" dirty="0"/>
               <a:t>Input: </a:t>
             </a:r>
           </a:p>
           <a:p>
             <a:pPr lvl="1"/>
             <a:r>
-              <a:rPr lang="it-IT" dirty="0"/>
+              <a:rPr lang="it-IT" sz="1800" dirty="0"/>
               <a:t>ID utente come vettore in one hot </a:t>
             </a:r>
             <a:r>
-              <a:rPr lang="it-IT" dirty="0" err="1"/>
+              <a:rPr lang="it-IT" sz="1800" dirty="0" err="1"/>
               <a:t>encoding</a:t>
             </a:r>
-            <a:endParaRPr lang="it-IT" dirty="0"/>
+            <a:endParaRPr lang="it-IT" sz="1800" dirty="0"/>
           </a:p>
           <a:p>
             <a:pPr lvl="1"/>
             <a:r>
-              <a:rPr lang="it-IT" dirty="0"/>
+              <a:rPr lang="it-IT" sz="1800" dirty="0"/>
               <a:t>ID oggetto come vettore in one hot </a:t>
             </a:r>
             <a:r>
-              <a:rPr lang="it-IT" dirty="0" err="1"/>
+              <a:rPr lang="it-IT" sz="1800" dirty="0" err="1"/>
               <a:t>encoding</a:t>
             </a:r>
-            <a:endParaRPr lang="it-IT" dirty="0"/>
+            <a:endParaRPr lang="it-IT" sz="1800" dirty="0"/>
           </a:p>
           <a:p>
             <a:pPr lvl="1"/>
             <a:r>
-              <a:rPr lang="it-IT" dirty="0"/>
+              <a:rPr lang="it-IT" sz="1800" dirty="0"/>
               <a:t>Vettore per il contesto</a:t>
             </a:r>
           </a:p>
           <a:p>
             <a:r>
-              <a:rPr lang="it-IT" dirty="0"/>
-              <a:t>Aggiunge  il contesto dell’utente al modello </a:t>
-            </a:r>
-            <a:r>
-              <a:rPr lang="it-IT" dirty="0" err="1"/>
+              <a:rPr lang="it-IT" sz="2000" dirty="0"/>
+              <a:t>ECAM </a:t>
+            </a:r>
+            <a:r>
+              <a:rPr lang="it-IT" sz="2000" dirty="0" err="1"/>
               <a:t>NeuMF</a:t>
             </a:r>
-            <a:endParaRPr lang="it-IT" dirty="0"/>
-          </a:p>
-          <a:p>
-            <a:r>
-              <a:rPr lang="it-IT" dirty="0"/>
+            <a:r>
+              <a:rPr lang="it-IT" sz="2000" dirty="0"/>
+              <a:t> incorpora  il contesto dell’utente nel modello </a:t>
+            </a:r>
+            <a:r>
+              <a:rPr lang="it-IT" sz="2000" dirty="0" err="1"/>
+              <a:t>NeuMF</a:t>
+            </a:r>
+            <a:endParaRPr lang="it-IT" sz="2000" dirty="0"/>
+          </a:p>
+          <a:p>
+            <a:r>
+              <a:rPr lang="it-IT" sz="2000" dirty="0"/>
               <a:t>Il numero di utenti e oggetti è fisso: i vettori in one hot </a:t>
             </a:r>
             <a:r>
-              <a:rPr lang="it-IT" dirty="0" err="1"/>
+              <a:rPr lang="it-IT" sz="2000" dirty="0" err="1"/>
               <a:t>encoding</a:t>
             </a:r>
             <a:r>
-              <a:rPr lang="it-IT" dirty="0"/>
-              <a:t> hanno dimensione pari al numero di utenti e oggetti</a:t>
+              <a:rPr lang="it-IT" sz="2000" dirty="0"/>
+              <a:t> hanno dimensione pari al numero di utenti/oggetti</a:t>
             </a:r>
           </a:p>
         </p:txBody>
@@ -7013,6 +6923,205 @@
               <a:t>NeuMF</a:t>
             </a:r>
             <a:endParaRPr lang="it-IT" dirty="0"/>
+          </a:p>
+        </p:txBody>
+      </p:sp>
+      <p:sp>
+        <p:nvSpPr>
+          <p:cNvPr id="4" name="Segnaposto piè di pagina 3">
+            <a:extLst>
+              <a:ext uri="{FF2B5EF4-FFF2-40B4-BE49-F238E27FC236}">
+                <a16:creationId xmlns:a16="http://schemas.microsoft.com/office/drawing/2014/main" id="{733ADAAD-74FD-4C3B-9655-9D5D90C5A1B7}"/>
+              </a:ext>
+            </a:extLst>
+          </p:cNvPr>
+          <p:cNvSpPr>
+            <a:spLocks noGrp="1"/>
+          </p:cNvSpPr>
+          <p:nvPr>
+            <p:ph type="ftr" sz="quarter" idx="11"/>
+          </p:nvPr>
+        </p:nvSpPr>
+        <p:spPr>
+          <a:xfrm>
+            <a:off x="2461188" y="6395229"/>
+            <a:ext cx="4221620" cy="365125"/>
+          </a:xfrm>
+        </p:spPr>
+        <p:txBody>
+          <a:bodyPr/>
+          <a:lstStyle/>
+          <a:p>
+            <a:pPr>
+              <a:defRPr/>
+            </a:pPr>
+            <a:r>
+              <a:rPr lang="en-GB"/>
+              <a:t>Fonte immagine: Xiangnan He, Lizi Liao, Hanwang Zhang, Liqiang Nie, Xia Hu, and Tat-Seng Chua. Neural collaborative filtering.</a:t>
+            </a:r>
+            <a:endParaRPr lang="en-GB" dirty="0"/>
+          </a:p>
+        </p:txBody>
+      </p:sp>
+      <p:sp>
+        <p:nvSpPr>
+          <p:cNvPr id="10" name="Segnaposto piè di pagina 3">
+            <a:extLst>
+              <a:ext uri="{FF2B5EF4-FFF2-40B4-BE49-F238E27FC236}">
+                <a16:creationId xmlns:a16="http://schemas.microsoft.com/office/drawing/2014/main" id="{BE199914-8BDB-49E6-AA53-4EFBA6AB70E2}"/>
+              </a:ext>
+            </a:extLst>
+          </p:cNvPr>
+          <p:cNvSpPr txBox="1">
+            <a:spLocks/>
+          </p:cNvSpPr>
+          <p:nvPr/>
+        </p:nvSpPr>
+        <p:spPr>
+          <a:xfrm>
+            <a:off x="2306625" y="6395229"/>
+            <a:ext cx="4640585" cy="365125"/>
+          </a:xfrm>
+          <a:prstGeom prst="rect">
+            <a:avLst/>
+          </a:prstGeom>
+        </p:spPr>
+        <p:txBody>
+          <a:bodyPr vert="horz" lIns="91440" tIns="45720" rIns="91440" bIns="45720" rtlCol="0" anchor="ctr"/>
+          <a:lstStyle>
+            <a:defPPr>
+              <a:defRPr lang="en-US"/>
+            </a:defPPr>
+            <a:lvl1pPr marL="0" algn="ctr" defTabSz="457200" rtl="0" eaLnBrk="1" latinLnBrk="0" hangingPunct="1">
+              <a:defRPr sz="1200" kern="1200">
+                <a:solidFill>
+                  <a:schemeClr val="tx1">
+                    <a:tint val="75000"/>
+                  </a:schemeClr>
+                </a:solidFill>
+                <a:latin typeface="+mn-lt"/>
+                <a:ea typeface="+mn-ea"/>
+                <a:cs typeface="+mn-cs"/>
+              </a:defRPr>
+            </a:lvl1pPr>
+            <a:lvl2pPr marL="457200" algn="l" defTabSz="457200" rtl="0" eaLnBrk="1" latinLnBrk="0" hangingPunct="1">
+              <a:defRPr sz="1800" kern="1200">
+                <a:solidFill>
+                  <a:schemeClr val="tx1"/>
+                </a:solidFill>
+                <a:latin typeface="+mn-lt"/>
+                <a:ea typeface="+mn-ea"/>
+                <a:cs typeface="+mn-cs"/>
+              </a:defRPr>
+            </a:lvl2pPr>
+            <a:lvl3pPr marL="914400" algn="l" defTabSz="457200" rtl="0" eaLnBrk="1" latinLnBrk="0" hangingPunct="1">
+              <a:defRPr sz="1800" kern="1200">
+                <a:solidFill>
+                  <a:schemeClr val="tx1"/>
+                </a:solidFill>
+                <a:latin typeface="+mn-lt"/>
+                <a:ea typeface="+mn-ea"/>
+                <a:cs typeface="+mn-cs"/>
+              </a:defRPr>
+            </a:lvl3pPr>
+            <a:lvl4pPr marL="1371600" algn="l" defTabSz="457200" rtl="0" eaLnBrk="1" latinLnBrk="0" hangingPunct="1">
+              <a:defRPr sz="1800" kern="1200">
+                <a:solidFill>
+                  <a:schemeClr val="tx1"/>
+                </a:solidFill>
+                <a:latin typeface="+mn-lt"/>
+                <a:ea typeface="+mn-ea"/>
+                <a:cs typeface="+mn-cs"/>
+              </a:defRPr>
+            </a:lvl4pPr>
+            <a:lvl5pPr marL="1828800" algn="l" defTabSz="457200" rtl="0" eaLnBrk="1" latinLnBrk="0" hangingPunct="1">
+              <a:defRPr sz="1800" kern="1200">
+                <a:solidFill>
+                  <a:schemeClr val="tx1"/>
+                </a:solidFill>
+                <a:latin typeface="+mn-lt"/>
+                <a:ea typeface="+mn-ea"/>
+                <a:cs typeface="+mn-cs"/>
+              </a:defRPr>
+            </a:lvl5pPr>
+            <a:lvl6pPr marL="2286000" algn="l" defTabSz="457200" rtl="0" eaLnBrk="1" latinLnBrk="0" hangingPunct="1">
+              <a:defRPr sz="1800" kern="1200">
+                <a:solidFill>
+                  <a:schemeClr val="tx1"/>
+                </a:solidFill>
+                <a:latin typeface="+mn-lt"/>
+                <a:ea typeface="+mn-ea"/>
+                <a:cs typeface="+mn-cs"/>
+              </a:defRPr>
+            </a:lvl6pPr>
+            <a:lvl7pPr marL="2743200" algn="l" defTabSz="457200" rtl="0" eaLnBrk="1" latinLnBrk="0" hangingPunct="1">
+              <a:defRPr sz="1800" kern="1200">
+                <a:solidFill>
+                  <a:schemeClr val="tx1"/>
+                </a:solidFill>
+                <a:latin typeface="+mn-lt"/>
+                <a:ea typeface="+mn-ea"/>
+                <a:cs typeface="+mn-cs"/>
+              </a:defRPr>
+            </a:lvl7pPr>
+            <a:lvl8pPr marL="3200400" algn="l" defTabSz="457200" rtl="0" eaLnBrk="1" latinLnBrk="0" hangingPunct="1">
+              <a:defRPr sz="1800" kern="1200">
+                <a:solidFill>
+                  <a:schemeClr val="tx1"/>
+                </a:solidFill>
+                <a:latin typeface="+mn-lt"/>
+                <a:ea typeface="+mn-ea"/>
+                <a:cs typeface="+mn-cs"/>
+              </a:defRPr>
+            </a:lvl8pPr>
+            <a:lvl9pPr marL="3657600" algn="l" defTabSz="457200" rtl="0" eaLnBrk="1" latinLnBrk="0" hangingPunct="1">
+              <a:defRPr sz="1800" kern="1200">
+                <a:solidFill>
+                  <a:schemeClr val="tx1"/>
+                </a:solidFill>
+                <a:latin typeface="+mn-lt"/>
+                <a:ea typeface="+mn-ea"/>
+                <a:cs typeface="+mn-cs"/>
+              </a:defRPr>
+            </a:lvl9pPr>
+          </a:lstStyle>
+          <a:p>
+            <a:pPr>
+              <a:defRPr/>
+            </a:pPr>
+            <a:r>
+              <a:rPr lang="en-GB" dirty="0"/>
+              <a:t>Fonte </a:t>
+            </a:r>
+            <a:r>
+              <a:rPr lang="en-GB" dirty="0" err="1"/>
+              <a:t>immagine</a:t>
+            </a:r>
+            <a:r>
+              <a:rPr lang="en-GB" dirty="0"/>
+              <a:t>: </a:t>
+            </a:r>
+            <a:r>
+              <a:rPr lang="en-US" dirty="0"/>
+              <a:t>Moshe Unger, Alexander </a:t>
+            </a:r>
+            <a:r>
+              <a:rPr lang="en-US" dirty="0" err="1"/>
+              <a:t>Tuzhilin</a:t>
+            </a:r>
+            <a:r>
+              <a:rPr lang="en-US" dirty="0"/>
+              <a:t>, and Amit </a:t>
+            </a:r>
+            <a:r>
+              <a:rPr lang="en-US" dirty="0" err="1"/>
+              <a:t>Livne</a:t>
+            </a:r>
+            <a:r>
+              <a:rPr lang="en-US" dirty="0"/>
+              <a:t>. Context-aware recommendations based on deep learning frameworks</a:t>
+            </a:r>
+            <a:endParaRPr lang="en-GB" dirty="0"/>
           </a:p>
         </p:txBody>
       </p:sp>
@@ -7365,6 +7474,60 @@
                                   </p:childTnLst>
                                 </p:cTn>
                               </p:par>
+                              <p:par>
+                                <p:cTn id="27" presetID="1" presetClass="entr" presetSubtype="0" fill="hold" grpId="0" nodeType="withEffect">
+                                  <p:stCondLst>
+                                    <p:cond delay="0"/>
+                                  </p:stCondLst>
+                                  <p:childTnLst>
+                                    <p:set>
+                                      <p:cBhvr>
+                                        <p:cTn id="28" dur="1" fill="hold">
+                                          <p:stCondLst>
+                                            <p:cond delay="0"/>
+                                          </p:stCondLst>
+                                        </p:cTn>
+                                        <p:tgtEl>
+                                          <p:spTgt spid="10"/>
+                                        </p:tgtEl>
+                                        <p:attrNameLst>
+                                          <p:attrName>style.visibility</p:attrName>
+                                        </p:attrNameLst>
+                                      </p:cBhvr>
+                                      <p:to>
+                                        <p:strVal val="visible"/>
+                                      </p:to>
+                                    </p:set>
+                                  </p:childTnLst>
+                                </p:cTn>
+                              </p:par>
+                              <p:par>
+                                <p:cTn id="29" presetID="1" presetClass="exit" presetSubtype="0" fill="hold" grpId="0" nodeType="withEffect">
+                                  <p:stCondLst>
+                                    <p:cond delay="0"/>
+                                  </p:stCondLst>
+                                  <p:childTnLst>
+                                    <p:set>
+                                      <p:cBhvr>
+                                        <p:cTn id="30" dur="1" fill="hold">
+                                          <p:stCondLst>
+                                            <p:cond delay="0"/>
+                                          </p:stCondLst>
+                                        </p:cTn>
+                                        <p:tgtEl>
+                                          <p:spTgt spid="4"/>
+                                        </p:tgtEl>
+                                        <p:attrNameLst>
+                                          <p:attrName>style.visibility</p:attrName>
+                                        </p:attrNameLst>
+                                      </p:cBhvr>
+                                      <p:to>
+                                        <p:strVal val="hidden"/>
+                                      </p:to>
+                                    </p:set>
+                                  </p:childTnLst>
+                                </p:cTn>
+                              </p:par>
                             </p:childTnLst>
                           </p:cTn>
                         </p:par>
@@ -7395,12 +7558,14 @@
     <p:bldLst>
       <p:bldP spid="3" grpId="0" uiExpand="1" build="p"/>
       <p:bldP spid="2" grpId="0" animBg="1"/>
+      <p:bldP spid="4" grpId="0"/>
+      <p:bldP spid="10" grpId="0"/>
     </p:bldLst>
   </p:timing>
 </p:sld>
 </file>
 
-<file path=ppt/slides/slide7.xml><?xml version="1.0" encoding="utf-8"?>
+<file path=ppt/slides/slide6.xml><?xml version="1.0" encoding="utf-8"?>
 <p:sld xmlns:a="http://schemas.openxmlformats.org/drawingml/2006/main" xmlns:r="http://schemas.openxmlformats.org/officeDocument/2006/relationships" xmlns:p="http://schemas.openxmlformats.org/presentationml/2006/main">
   <p:cSld>
     <p:spTree>
@@ -7479,14 +7644,13 @@
               </a:ext>
             </a:extLst>
           </a:blip>
-          <a:stretch>
-            <a:fillRect/>
-          </a:stretch>
+          <a:srcRect/>
+          <a:stretch/>
         </p:blipFill>
         <p:spPr>
           <a:xfrm>
-            <a:off x="1484568" y="616785"/>
-            <a:ext cx="6174864" cy="2812215"/>
+            <a:off x="1484568" y="650158"/>
+            <a:ext cx="6327792" cy="2813464"/>
           </a:xfrm>
           <a:prstGeom prst="rect">
             <a:avLst/>
@@ -7509,8 +7673,8 @@
             </p:nvSpPr>
             <p:spPr>
               <a:xfrm>
-                <a:off x="633834" y="3501008"/>
-                <a:ext cx="8042622" cy="3356992"/>
+                <a:off x="550689" y="3556663"/>
+                <a:ext cx="8042622" cy="2896673"/>
               </a:xfrm>
               <a:prstGeom prst="rect">
                 <a:avLst/>
@@ -7519,13 +7683,23 @@
             </p:spPr>
             <p:txBody>
               <a:bodyPr wrap="square" rtlCol="0">
-                <a:normAutofit fontScale="92500" lnSpcReduction="10000"/>
+                <a:normAutofit fontScale="92500"/>
               </a:bodyPr>
               <a:lstStyle/>
               <a:p>
                 <a:r>
+                  <a:rPr lang="it-IT" sz="1900" b="1" dirty="0"/>
+                  <a:t>Modello proposto:</a:t>
+                </a:r>
+              </a:p>
+              <a:p>
+                <a:r>
+                  <a:rPr lang="it-IT" sz="1900" dirty="0" err="1"/>
+                  <a:t>MObile</a:t>
+                </a:r>
+                <a:r>
                   <a:rPr lang="it-IT" sz="1900" dirty="0"/>
-                  <a:t>MObile </a:t>
+                  <a:t> </a:t>
                 </a:r>
                 <a:r>
                   <a:rPr lang="it-IT" sz="1900" dirty="0" err="1"/>
@@ -7573,19 +7747,17 @@
                 <a:endParaRPr lang="it-IT" sz="1900" dirty="0"/>
               </a:p>
               <a:p>
-                <a:r>
-                  <a:rPr lang="it-IT" sz="1900" b="1" dirty="0"/>
-                  <a:t>Input:</a:t>
-                </a:r>
-              </a:p>
-              <a:p>
-                <a:pPr marL="285750" indent="-285750">
+                <a:pPr marL="342900" indent="-342900">
                   <a:buFont typeface="Arial" panose="020B0604020202020204" pitchFamily="34" charset="0"/>
                   <a:buChar char="•"/>
                 </a:pPr>
                 <a:r>
+                  <a:rPr lang="it-IT" sz="1900" b="1" dirty="0"/>
+                  <a:t>Input: </a:t>
+                </a:r>
+                <a:r>
                   <a:rPr lang="it-IT" sz="1900" dirty="0"/>
-                  <a:t>Feature dell’utente </a:t>
+                  <a:t>Feature di </a:t>
                 </a:r>
                 <a14:m>
                   <m:oMath xmlns:m="http://schemas.openxmlformats.org/officeDocument/2006/math">
@@ -7595,65 +7767,38 @@
                       </a:rPr>
                       <m:t>𝑢</m:t>
                     </m:r>
-                  </m:oMath>
-                </a14:m>
-                <a:endParaRPr lang="it-IT" sz="1900" dirty="0"/>
-              </a:p>
-              <a:p>
-                <a:pPr marL="285750" indent="-285750">
-                  <a:buFont typeface="Arial" panose="020B0604020202020204" pitchFamily="34" charset="0"/>
-                  <a:buChar char="•"/>
-                </a:pPr>
-                <a:r>
-                  <a:rPr lang="it-IT" sz="1900" dirty="0"/>
-                  <a:t>Feature dell’oggetto </a:t>
-                </a:r>
-                <a14:m>
-                  <m:oMath xmlns:m="http://schemas.openxmlformats.org/officeDocument/2006/math">
                     <m:r>
-                      <a:rPr lang="it-IT" sz="1900" b="0" i="1" smtClean="0">
+                      <a:rPr lang="it-IT" sz="1900" b="0" i="0" smtClean="0">
+                        <a:latin typeface="Cambria Math" panose="02040503050406030204" pitchFamily="18" charset="0"/>
+                      </a:rPr>
+                      <m:t>,  </m:t>
+                    </m:r>
+                    <m:r>
+                      <a:rPr lang="it-IT" sz="1900" i="1" dirty="0" smtClean="0">
                         <a:latin typeface="Cambria Math" panose="02040503050406030204" pitchFamily="18" charset="0"/>
                       </a:rPr>
                       <m:t>𝑖</m:t>
                     </m:r>
-                  </m:oMath>
-                </a14:m>
-                <a:endParaRPr lang="it-IT" sz="1900" dirty="0"/>
-              </a:p>
-              <a:p>
-                <a:pPr marL="285750" indent="-285750">
-                  <a:buFont typeface="Arial" panose="020B0604020202020204" pitchFamily="34" charset="0"/>
-                  <a:buChar char="•"/>
-                </a:pPr>
-                <a:r>
-                  <a:rPr lang="it-IT" sz="1900" dirty="0"/>
-                  <a:t>Feature di contesto fisico </a:t>
-                </a:r>
-                <a14:m>
-                  <m:oMath xmlns:m="http://schemas.openxmlformats.org/officeDocument/2006/math">
                     <m:r>
-                      <a:rPr lang="it-IT" sz="1900" b="0" i="1" smtClean="0">
+                      <a:rPr lang="it-IT" sz="1900" b="0" i="1" dirty="0" smtClean="0">
+                        <a:latin typeface="Cambria Math" panose="02040503050406030204" pitchFamily="18" charset="0"/>
+                      </a:rPr>
+                      <m:t>,  </m:t>
+                    </m:r>
+                    <m:r>
+                      <a:rPr lang="it-IT" sz="1900" b="0" i="1" dirty="0" smtClean="0">
                         <a:latin typeface="Cambria Math" panose="02040503050406030204" pitchFamily="18" charset="0"/>
                       </a:rPr>
                       <m:t>𝑝</m:t>
                     </m:r>
-                  </m:oMath>
-                </a14:m>
-                <a:endParaRPr lang="it-IT" sz="1900" dirty="0"/>
-              </a:p>
-              <a:p>
-                <a:pPr marL="285750" indent="-285750">
-                  <a:buFont typeface="Arial" panose="020B0604020202020204" pitchFamily="34" charset="0"/>
-                  <a:buChar char="•"/>
-                </a:pPr>
-                <a:r>
-                  <a:rPr lang="it-IT" sz="1900" dirty="0"/>
-                  <a:t>Feature di contesto sociale </a:t>
-                </a:r>
-                <a14:m>
-                  <m:oMath xmlns:m="http://schemas.openxmlformats.org/officeDocument/2006/math">
                     <m:r>
-                      <a:rPr lang="it-IT" sz="1900" b="0" i="1" smtClean="0">
+                      <a:rPr lang="it-IT" sz="1900" b="0" i="1" dirty="0" smtClean="0">
+                        <a:latin typeface="Cambria Math" panose="02040503050406030204" pitchFamily="18" charset="0"/>
+                      </a:rPr>
+                      <m:t>,  </m:t>
+                    </m:r>
+                    <m:r>
+                      <a:rPr lang="it-IT" sz="1900" b="0" i="1" dirty="0" smtClean="0">
                         <a:latin typeface="Cambria Math" panose="02040503050406030204" pitchFamily="18" charset="0"/>
                       </a:rPr>
                       <m:t>𝑠</m:t>
@@ -7667,9 +7812,13 @@
                   <a:buFont typeface="Arial" panose="020B0604020202020204" pitchFamily="34" charset="0"/>
                   <a:buChar char="•"/>
                 </a:pPr>
-                <a:endParaRPr lang="it-IT" sz="1900" dirty="0"/>
+                <a:endParaRPr lang="it-IT" sz="1900" b="1" dirty="0"/>
               </a:p>
               <a:p>
+                <a:pPr marL="342900" indent="-342900">
+                  <a:buFont typeface="Arial" panose="020B0604020202020204" pitchFamily="34" charset="0"/>
+                  <a:buChar char="•"/>
+                </a:pPr>
                 <a:r>
                   <a:rPr lang="it-IT" sz="1900" b="1" dirty="0"/>
                   <a:t>Output: </a:t>
@@ -7733,13 +7882,13 @@
                 <a:endParaRPr lang="it-IT" sz="1900" dirty="0"/>
               </a:p>
               <a:p>
-                <a:pPr marL="285750" indent="-285750">
+                <a:endParaRPr lang="it-IT" sz="1900" dirty="0"/>
+              </a:p>
+              <a:p>
+                <a:pPr marL="342900" indent="-342900">
                   <a:buFont typeface="Arial" panose="020B0604020202020204" pitchFamily="34" charset="0"/>
                   <a:buChar char="•"/>
                 </a:pPr>
-                <a:endParaRPr lang="it-IT" sz="1900" dirty="0"/>
-              </a:p>
-              <a:p>
                 <a:r>
                   <a:rPr lang="it-IT" sz="1900" b="1" dirty="0"/>
                   <a:t>Vantaggio: </a:t>
@@ -7807,8 +7956,8 @@
             </p:nvSpPr>
             <p:spPr>
               <a:xfrm>
-                <a:off x="633834" y="3501008"/>
-                <a:ext cx="8042622" cy="3356992"/>
+                <a:off x="550689" y="3556663"/>
+                <a:ext cx="8042622" cy="2896673"/>
               </a:xfrm>
               <a:prstGeom prst="rect">
                 <a:avLst/>
@@ -7816,7 +7965,7 @@
               <a:blipFill>
                 <a:blip r:embed="rId4"/>
                 <a:stretch>
-                  <a:fillRect l="-682" t="-1633" b="-1270"/>
+                  <a:fillRect l="-606" t="-1050" b="-1050"/>
                 </a:stretch>
               </a:blipFill>
             </p:spPr>
@@ -7848,7 +7997,7 @@
 </p:sld>
 </file>
 
-<file path=ppt/slides/slide8.xml><?xml version="1.0" encoding="utf-8"?>
+<file path=ppt/slides/slide7.xml><?xml version="1.0" encoding="utf-8"?>
 <p:sld xmlns:a="http://schemas.openxmlformats.org/drawingml/2006/main" xmlns:r="http://schemas.openxmlformats.org/officeDocument/2006/relationships" xmlns:p="http://schemas.openxmlformats.org/presentationml/2006/main">
   <p:cSld>
     <p:spTree>
@@ -7898,7 +8047,7 @@
         </p:blipFill>
         <p:spPr>
           <a:xfrm>
-            <a:off x="251520" y="292180"/>
+            <a:off x="251520" y="290667"/>
             <a:ext cx="4464496" cy="6273640"/>
           </a:xfrm>
         </p:spPr>
@@ -8027,7 +8176,7 @@
         </p:blipFill>
         <p:spPr>
           <a:xfrm>
-            <a:off x="5911564" y="4221088"/>
+            <a:off x="5895912" y="4005064"/>
             <a:ext cx="1857375" cy="1857375"/>
           </a:xfrm>
           <a:prstGeom prst="rect">
@@ -8035,10 +8184,604 @@
           </a:prstGeom>
         </p:spPr>
       </p:pic>
+      <p:sp>
+        <p:nvSpPr>
+          <p:cNvPr id="7" name="CasellaDiTesto 6">
+            <a:extLst>
+              <a:ext uri="{FF2B5EF4-FFF2-40B4-BE49-F238E27FC236}">
+                <a16:creationId xmlns:a16="http://schemas.microsoft.com/office/drawing/2014/main" id="{A2D838FC-53B1-4968-9465-2805581B26F7}"/>
+              </a:ext>
+            </a:extLst>
+          </p:cNvPr>
+          <p:cNvSpPr txBox="1"/>
+          <p:nvPr/>
+        </p:nvSpPr>
+        <p:spPr>
+          <a:xfrm>
+            <a:off x="6068515" y="5862439"/>
+            <a:ext cx="1512168" cy="276999"/>
+          </a:xfrm>
+          <a:prstGeom prst="rect">
+            <a:avLst/>
+          </a:prstGeom>
+          <a:noFill/>
+        </p:spPr>
+        <p:txBody>
+          <a:bodyPr wrap="square" rtlCol="0">
+            <a:spAutoFit/>
+          </a:bodyPr>
+          <a:lstStyle/>
+          <a:p>
+            <a:pPr algn="ctr"/>
+            <a:r>
+              <a:rPr lang="it-IT" sz="1200" dirty="0">
+                <a:solidFill>
+                  <a:schemeClr val="tx1">
+                    <a:tint val="75000"/>
+                  </a:schemeClr>
+                </a:solidFill>
+              </a:rPr>
+              <a:t>Ego network</a:t>
+            </a:r>
+          </a:p>
+        </p:txBody>
+      </p:sp>
     </p:spTree>
     <p:extLst>
       <p:ext uri="{BB962C8B-B14F-4D97-AF65-F5344CB8AC3E}">
         <p14:creationId xmlns:p14="http://schemas.microsoft.com/office/powerpoint/2010/main" val="3525206491"/>
+      </p:ext>
+    </p:extLst>
+  </p:cSld>
+  <p:clrMapOvr>
+    <a:masterClrMapping/>
+  </p:clrMapOvr>
+</p:sld>
+</file>
+
+<file path=ppt/slides/slide8.xml><?xml version="1.0" encoding="utf-8"?>
+<p:sld xmlns:a="http://schemas.openxmlformats.org/drawingml/2006/main" xmlns:r="http://schemas.openxmlformats.org/officeDocument/2006/relationships" xmlns:p="http://schemas.openxmlformats.org/presentationml/2006/main">
+  <p:cSld>
+    <p:spTree>
+      <p:nvGrpSpPr>
+        <p:cNvPr id="1" name=""/>
+        <p:cNvGrpSpPr/>
+        <p:nvPr/>
+      </p:nvGrpSpPr>
+      <p:grpSpPr>
+        <a:xfrm>
+          <a:off x="0" y="0"/>
+          <a:ext cx="0" cy="0"/>
+          <a:chOff x="0" y="0"/>
+          <a:chExt cx="0" cy="0"/>
+        </a:xfrm>
+      </p:grpSpPr>
+      <p:sp>
+        <p:nvSpPr>
+          <p:cNvPr id="2" name="Titolo 1">
+            <a:extLst>
+              <a:ext uri="{FF2B5EF4-FFF2-40B4-BE49-F238E27FC236}">
+                <a16:creationId xmlns:a16="http://schemas.microsoft.com/office/drawing/2014/main" id="{6B5C8CE6-773B-4C99-A303-3A55CAA756D3}"/>
+              </a:ext>
+            </a:extLst>
+          </p:cNvPr>
+          <p:cNvSpPr>
+            <a:spLocks noGrp="1"/>
+          </p:cNvSpPr>
+          <p:nvPr>
+            <p:ph type="title"/>
+          </p:nvPr>
+        </p:nvSpPr>
+        <p:spPr>
+          <a:xfrm>
+            <a:off x="539552" y="117066"/>
+            <a:ext cx="7886700" cy="421929"/>
+          </a:xfrm>
+        </p:spPr>
+        <p:txBody>
+          <a:bodyPr>
+            <a:noAutofit/>
+          </a:bodyPr>
+          <a:lstStyle/>
+          <a:p>
+            <a:pPr algn="ctr"/>
+            <a:r>
+              <a:rPr lang="it-IT" dirty="0"/>
+              <a:t>Dataset</a:t>
+            </a:r>
+          </a:p>
+        </p:txBody>
+      </p:sp>
+      <p:sp>
+        <p:nvSpPr>
+          <p:cNvPr id="3" name="Segnaposto contenuto 2">
+            <a:extLst>
+              <a:ext uri="{FF2B5EF4-FFF2-40B4-BE49-F238E27FC236}">
+                <a16:creationId xmlns:a16="http://schemas.microsoft.com/office/drawing/2014/main" id="{BE723A70-E80B-4CA0-941A-CB18D109A863}"/>
+              </a:ext>
+            </a:extLst>
+          </p:cNvPr>
+          <p:cNvSpPr>
+            <a:spLocks noGrp="1"/>
+          </p:cNvSpPr>
+          <p:nvPr>
+            <p:ph idx="1"/>
+          </p:nvPr>
+        </p:nvSpPr>
+        <p:spPr>
+          <a:xfrm>
+            <a:off x="179512" y="538995"/>
+            <a:ext cx="8784976" cy="1017797"/>
+          </a:xfrm>
+        </p:spPr>
+        <p:txBody>
+          <a:bodyPr>
+            <a:normAutofit lnSpcReduction="10000"/>
+          </a:bodyPr>
+          <a:lstStyle/>
+          <a:p>
+            <a:pPr marL="0" indent="0" algn="l">
+              <a:buNone/>
+            </a:pPr>
+            <a:r>
+              <a:rPr lang="it-IT" sz="2200" b="1" dirty="0"/>
+              <a:t>Frappe: </a:t>
+            </a:r>
+          </a:p>
+          <a:p>
+            <a:pPr marL="0" indent="0" algn="l">
+              <a:buNone/>
+            </a:pPr>
+            <a:r>
+              <a:rPr lang="it-IT" sz="1900" b="0" i="0" u="none" strike="noStrike" baseline="0" dirty="0"/>
+              <a:t>È un dataset di feedback impliciti collezionato da un sistema di raccomandazione </a:t>
+            </a:r>
+            <a:r>
+              <a:rPr lang="it-IT" sz="1900" b="0" i="0" u="none" strike="noStrike" baseline="0" dirty="0" err="1"/>
+              <a:t>context-aware</a:t>
+            </a:r>
+            <a:r>
+              <a:rPr lang="it-IT" sz="1900" b="0" i="0" u="none" strike="noStrike" baseline="0" dirty="0"/>
+              <a:t> di applicazioni Android.</a:t>
+            </a:r>
+          </a:p>
+          <a:p>
+            <a:pPr marL="0" indent="0">
+              <a:buNone/>
+            </a:pPr>
+            <a:endParaRPr lang="it-IT" b="1" dirty="0"/>
+          </a:p>
+        </p:txBody>
+      </p:sp>
+      <p:sp>
+        <p:nvSpPr>
+          <p:cNvPr id="9" name="CasellaDiTesto 8">
+            <a:extLst>
+              <a:ext uri="{FF2B5EF4-FFF2-40B4-BE49-F238E27FC236}">
+                <a16:creationId xmlns:a16="http://schemas.microsoft.com/office/drawing/2014/main" id="{A4BA0D4A-419D-4B7E-80B1-C402EFBEA01F}"/>
+              </a:ext>
+            </a:extLst>
+          </p:cNvPr>
+          <p:cNvSpPr txBox="1"/>
+          <p:nvPr/>
+        </p:nvSpPr>
+        <p:spPr>
+          <a:xfrm>
+            <a:off x="167152" y="3177768"/>
+            <a:ext cx="8809695" cy="936104"/>
+          </a:xfrm>
+          <a:prstGeom prst="rect">
+            <a:avLst/>
+          </a:prstGeom>
+          <a:noFill/>
+        </p:spPr>
+        <p:txBody>
+          <a:bodyPr wrap="square">
+            <a:normAutofit lnSpcReduction="10000"/>
+          </a:bodyPr>
+          <a:lstStyle/>
+          <a:p>
+            <a:r>
+              <a:rPr lang="it-IT" sz="2000" b="1" dirty="0"/>
+              <a:t>My Digital Footprint (MDF): </a:t>
+            </a:r>
+          </a:p>
+          <a:p>
+            <a:r>
+              <a:rPr lang="it-IT" dirty="0"/>
+              <a:t>È un dataset composto da dati di sensori di smartphone, informazioni di prossimità fisica, e interazioni sugli online social network.</a:t>
+            </a:r>
+          </a:p>
+          <a:p>
+            <a:endParaRPr lang="it-IT" dirty="0"/>
+          </a:p>
+          <a:p>
+            <a:endParaRPr lang="it-IT" dirty="0"/>
+          </a:p>
+          <a:p>
+            <a:endParaRPr lang="it-IT" dirty="0"/>
+          </a:p>
+          <a:p>
+            <a:endParaRPr lang="it-IT" dirty="0"/>
+          </a:p>
+          <a:p>
+            <a:endParaRPr lang="it-IT" dirty="0"/>
+          </a:p>
+        </p:txBody>
+      </p:sp>
+      <p:sp>
+        <p:nvSpPr>
+          <p:cNvPr id="10" name="CasellaDiTesto 9">
+            <a:extLst>
+              <a:ext uri="{FF2B5EF4-FFF2-40B4-BE49-F238E27FC236}">
+                <a16:creationId xmlns:a16="http://schemas.microsoft.com/office/drawing/2014/main" id="{3D9FFB73-567F-4A21-9A4E-FD1CA3A2DC3D}"/>
+              </a:ext>
+            </a:extLst>
+          </p:cNvPr>
+          <p:cNvSpPr txBox="1"/>
+          <p:nvPr/>
+        </p:nvSpPr>
+        <p:spPr>
+          <a:xfrm>
+            <a:off x="191872" y="3969855"/>
+            <a:ext cx="8784976" cy="2751621"/>
+          </a:xfrm>
+          <a:prstGeom prst="rect">
+            <a:avLst/>
+          </a:prstGeom>
+          <a:noFill/>
+        </p:spPr>
+        <p:txBody>
+          <a:bodyPr wrap="square" numCol="2" rtlCol="0">
+            <a:normAutofit lnSpcReduction="10000"/>
+          </a:bodyPr>
+          <a:lstStyle/>
+          <a:p>
+            <a:r>
+              <a:rPr lang="it-IT" u="sng" dirty="0"/>
+              <a:t>Statistiche:</a:t>
+            </a:r>
+          </a:p>
+          <a:p>
+            <a:pPr marL="285750" indent="-285750">
+              <a:buFont typeface="Arial" panose="020B0604020202020204" pitchFamily="34" charset="0"/>
+              <a:buChar char="•"/>
+            </a:pPr>
+            <a:r>
+              <a:rPr lang="it-IT" sz="1800" b="0" i="0" u="none" strike="noStrike" baseline="0" dirty="0">
+                <a:latin typeface="CMR12"/>
+              </a:rPr>
+              <a:t>73176 rating (66% positivi)</a:t>
+            </a:r>
+          </a:p>
+          <a:p>
+            <a:pPr marL="285750" indent="-285750">
+              <a:buFont typeface="Arial" panose="020B0604020202020204" pitchFamily="34" charset="0"/>
+              <a:buChar char="•"/>
+            </a:pPr>
+            <a:r>
+              <a:rPr lang="it-IT" dirty="0">
+                <a:latin typeface="CMR12"/>
+              </a:rPr>
+              <a:t>31 utenti</a:t>
+            </a:r>
+          </a:p>
+          <a:p>
+            <a:pPr marL="285750" indent="-285750">
+              <a:buFont typeface="Arial" panose="020B0604020202020204" pitchFamily="34" charset="0"/>
+              <a:buChar char="•"/>
+            </a:pPr>
+            <a:r>
+              <a:rPr lang="it-IT" dirty="0"/>
+              <a:t>338 oggetti</a:t>
+            </a:r>
+          </a:p>
+          <a:p>
+            <a:pPr marL="285750" indent="-285750">
+              <a:buFont typeface="Arial" panose="020B0604020202020204" pitchFamily="34" charset="0"/>
+              <a:buChar char="•"/>
+            </a:pPr>
+            <a:r>
+              <a:rPr lang="it-IT" dirty="0"/>
+              <a:t>71 feature di contesto</a:t>
+            </a:r>
+          </a:p>
+          <a:p>
+            <a:pPr marL="285750" indent="-285750">
+              <a:buFont typeface="Arial" panose="020B0604020202020204" pitchFamily="34" charset="0"/>
+              <a:buChar char="•"/>
+            </a:pPr>
+            <a:endParaRPr lang="it-IT" dirty="0"/>
+          </a:p>
+          <a:p>
+            <a:r>
+              <a:rPr lang="it-IT" u="sng" dirty="0"/>
+              <a:t>Feature di contesto:</a:t>
+            </a:r>
+          </a:p>
+          <a:p>
+            <a:pPr marL="285750" indent="-285750">
+              <a:buFont typeface="Arial" panose="020B0604020202020204" pitchFamily="34" charset="0"/>
+              <a:buChar char="•"/>
+            </a:pPr>
+            <a:r>
+              <a:rPr lang="it-IT" dirty="0"/>
+              <a:t>Attività utente (a piedi, in bici, corsa…)</a:t>
+            </a:r>
+          </a:p>
+          <a:p>
+            <a:pPr marL="285750" indent="-285750">
+              <a:buFont typeface="Arial" panose="020B0604020202020204" pitchFamily="34" charset="0"/>
+              <a:buChar char="•"/>
+            </a:pPr>
+            <a:r>
+              <a:rPr lang="it-IT" dirty="0"/>
+              <a:t>Modalità audio (silenzioso, vibrazione…)</a:t>
+            </a:r>
+          </a:p>
+          <a:p>
+            <a:pPr marL="285750" indent="-285750">
+              <a:buFont typeface="Arial" panose="020B0604020202020204" pitchFamily="34" charset="0"/>
+              <a:buChar char="•"/>
+            </a:pPr>
+            <a:r>
+              <a:rPr lang="it-IT" dirty="0"/>
+              <a:t>Volume </a:t>
+            </a:r>
+          </a:p>
+          <a:p>
+            <a:pPr marL="285750" indent="-285750">
+              <a:buFont typeface="Arial" panose="020B0604020202020204" pitchFamily="34" charset="0"/>
+              <a:buChar char="•"/>
+            </a:pPr>
+            <a:r>
+              <a:rPr lang="it-IT" dirty="0"/>
+              <a:t>Musica </a:t>
+            </a:r>
+          </a:p>
+          <a:p>
+            <a:pPr marL="285750" indent="-285750">
+              <a:buFont typeface="Arial" panose="020B0604020202020204" pitchFamily="34" charset="0"/>
+              <a:buChar char="•"/>
+            </a:pPr>
+            <a:r>
+              <a:rPr lang="it-IT" dirty="0"/>
+              <a:t>Batteria (livello, in carica)</a:t>
+            </a:r>
+          </a:p>
+          <a:p>
+            <a:pPr marL="285750" indent="-285750">
+              <a:buFont typeface="Arial" panose="020B0604020202020204" pitchFamily="34" charset="0"/>
+              <a:buChar char="•"/>
+            </a:pPr>
+            <a:r>
+              <a:rPr lang="it-IT" dirty="0"/>
+              <a:t>Schermo (rotazione, stato)</a:t>
+            </a:r>
+          </a:p>
+          <a:p>
+            <a:pPr marL="285750" indent="-285750">
+              <a:buFont typeface="Arial" panose="020B0604020202020204" pitchFamily="34" charset="0"/>
+              <a:buChar char="•"/>
+            </a:pPr>
+            <a:r>
+              <a:rPr lang="it-IT" dirty="0"/>
+              <a:t>Meteo</a:t>
+            </a:r>
+          </a:p>
+          <a:p>
+            <a:pPr marL="285750" indent="-285750">
+              <a:buFont typeface="Arial" panose="020B0604020202020204" pitchFamily="34" charset="0"/>
+              <a:buChar char="•"/>
+            </a:pPr>
+            <a:r>
+              <a:rPr lang="it-IT" dirty="0"/>
+              <a:t>WiFi</a:t>
+            </a:r>
+          </a:p>
+          <a:p>
+            <a:pPr marL="285750" indent="-285750">
+              <a:buFont typeface="Arial" panose="020B0604020202020204" pitchFamily="34" charset="0"/>
+              <a:buChar char="•"/>
+            </a:pPr>
+            <a:r>
+              <a:rPr lang="it-IT" dirty="0"/>
+              <a:t>Data e ora</a:t>
+            </a:r>
+          </a:p>
+          <a:p>
+            <a:pPr marL="285750" indent="-285750">
+              <a:buFont typeface="Arial" panose="020B0604020202020204" pitchFamily="34" charset="0"/>
+              <a:buChar char="•"/>
+            </a:pPr>
+            <a:r>
+              <a:rPr lang="it-IT" dirty="0"/>
+              <a:t>Tipologia di persone in prossimità dell’utente</a:t>
+            </a:r>
+          </a:p>
+          <a:p>
+            <a:endParaRPr lang="it-IT" dirty="0"/>
+          </a:p>
+        </p:txBody>
+      </p:sp>
+      <p:sp>
+        <p:nvSpPr>
+          <p:cNvPr id="4" name="CasellaDiTesto 3">
+            <a:extLst>
+              <a:ext uri="{FF2B5EF4-FFF2-40B4-BE49-F238E27FC236}">
+                <a16:creationId xmlns:a16="http://schemas.microsoft.com/office/drawing/2014/main" id="{74541A4D-BABD-4315-853C-48B6205E8C1A}"/>
+              </a:ext>
+            </a:extLst>
+          </p:cNvPr>
+          <p:cNvSpPr txBox="1"/>
+          <p:nvPr/>
+        </p:nvSpPr>
+        <p:spPr>
+          <a:xfrm>
+            <a:off x="167151" y="1423442"/>
+            <a:ext cx="8640960" cy="1754326"/>
+          </a:xfrm>
+          <a:prstGeom prst="rect">
+            <a:avLst/>
+          </a:prstGeom>
+          <a:noFill/>
+        </p:spPr>
+        <p:txBody>
+          <a:bodyPr wrap="square" numCol="2" rtlCol="0">
+            <a:normAutofit/>
+          </a:bodyPr>
+          <a:lstStyle/>
+          <a:p>
+            <a:pPr marL="0" indent="0" algn="l">
+              <a:buNone/>
+            </a:pPr>
+            <a:r>
+              <a:rPr lang="it-IT" u="sng" dirty="0"/>
+              <a:t>Statistiche:</a:t>
+            </a:r>
+          </a:p>
+          <a:p>
+            <a:pPr marL="342900" indent="-342900" algn="l">
+              <a:buFont typeface="Arial" panose="020B0604020202020204" pitchFamily="34" charset="0"/>
+              <a:buChar char="•"/>
+            </a:pPr>
+            <a:r>
+              <a:rPr lang="it-IT" dirty="0"/>
+              <a:t>78335 rating (62% positivi)</a:t>
+            </a:r>
+          </a:p>
+          <a:p>
+            <a:pPr marL="342900" indent="-342900" algn="l">
+              <a:buFont typeface="Arial" panose="020B0604020202020204" pitchFamily="34" charset="0"/>
+              <a:buChar char="•"/>
+            </a:pPr>
+            <a:r>
+              <a:rPr lang="it-IT" dirty="0"/>
+              <a:t>857 utenti</a:t>
+            </a:r>
+          </a:p>
+          <a:p>
+            <a:pPr marL="342900" indent="-342900" algn="l">
+              <a:buFont typeface="Arial" panose="020B0604020202020204" pitchFamily="34" charset="0"/>
+              <a:buChar char="•"/>
+            </a:pPr>
+            <a:r>
+              <a:rPr lang="it-IT" dirty="0"/>
+              <a:t>3180 oggetti</a:t>
+            </a:r>
+          </a:p>
+          <a:p>
+            <a:pPr marL="285750" indent="-285750" algn="l">
+              <a:buFont typeface="Arial" panose="020B0604020202020204" pitchFamily="34" charset="0"/>
+              <a:buChar char="•"/>
+            </a:pPr>
+            <a:r>
+              <a:rPr lang="it-IT" dirty="0"/>
+              <a:t> 24 feature di contesto</a:t>
+            </a:r>
+          </a:p>
+          <a:p>
+            <a:pPr marL="0" indent="0" algn="l">
+              <a:buNone/>
+            </a:pPr>
+            <a:endParaRPr lang="it-IT" u="sng" dirty="0"/>
+          </a:p>
+          <a:p>
+            <a:pPr marL="0" indent="0" algn="l">
+              <a:buNone/>
+            </a:pPr>
+            <a:r>
+              <a:rPr lang="it-IT" u="sng" dirty="0"/>
+              <a:t>Feature di contesto:</a:t>
+            </a:r>
+          </a:p>
+          <a:p>
+            <a:pPr marL="285750" indent="-285750">
+              <a:buFont typeface="Arial" panose="020B0604020202020204" pitchFamily="34" charset="0"/>
+              <a:buChar char="•"/>
+            </a:pPr>
+            <a:r>
+              <a:rPr lang="it-IT" dirty="0"/>
+              <a:t>Momento giornata</a:t>
+            </a:r>
+          </a:p>
+          <a:p>
+            <a:pPr marL="285750" indent="-285750">
+              <a:buFont typeface="Arial" panose="020B0604020202020204" pitchFamily="34" charset="0"/>
+              <a:buChar char="•"/>
+            </a:pPr>
+            <a:r>
+              <a:rPr lang="it-IT" dirty="0"/>
+              <a:t>Giorno della settimana</a:t>
+            </a:r>
+          </a:p>
+          <a:p>
+            <a:pPr marL="285750" indent="-285750">
+              <a:buFont typeface="Arial" panose="020B0604020202020204" pitchFamily="34" charset="0"/>
+              <a:buChar char="•"/>
+            </a:pPr>
+            <a:r>
+              <a:rPr lang="it-IT" dirty="0"/>
+              <a:t>Se è il fine settimana</a:t>
+            </a:r>
+          </a:p>
+          <a:p>
+            <a:pPr marL="285750" indent="-285750">
+              <a:buFont typeface="Arial" panose="020B0604020202020204" pitchFamily="34" charset="0"/>
+              <a:buChar char="•"/>
+            </a:pPr>
+            <a:r>
+              <a:rPr lang="it-IT" dirty="0"/>
+              <a:t>Meteo</a:t>
+            </a:r>
+          </a:p>
+          <a:p>
+            <a:endParaRPr lang="it-IT" dirty="0"/>
+          </a:p>
+        </p:txBody>
+      </p:sp>
+      <p:cxnSp>
+        <p:nvCxnSpPr>
+          <p:cNvPr id="8" name="Connettore diritto 7">
+            <a:extLst>
+              <a:ext uri="{FF2B5EF4-FFF2-40B4-BE49-F238E27FC236}">
+                <a16:creationId xmlns:a16="http://schemas.microsoft.com/office/drawing/2014/main" id="{B6FD2249-A20F-4D2A-9C9E-5DAE3DAF6FEC}"/>
+              </a:ext>
+            </a:extLst>
+          </p:cNvPr>
+          <p:cNvCxnSpPr>
+            <a:cxnSpLocks/>
+          </p:cNvCxnSpPr>
+          <p:nvPr/>
+        </p:nvCxnSpPr>
+        <p:spPr>
+          <a:xfrm>
+            <a:off x="509728" y="2996952"/>
+            <a:ext cx="8124544" cy="0"/>
+          </a:xfrm>
+          <a:prstGeom prst="line">
+            <a:avLst/>
+          </a:prstGeom>
+        </p:spPr>
+        <p:style>
+          <a:lnRef idx="1">
+            <a:schemeClr val="dk1"/>
+          </a:lnRef>
+          <a:fillRef idx="0">
+            <a:schemeClr val="dk1"/>
+          </a:fillRef>
+          <a:effectRef idx="0">
+            <a:schemeClr val="dk1"/>
+          </a:effectRef>
+          <a:fontRef idx="minor">
+            <a:schemeClr val="tx1"/>
+          </a:fontRef>
+        </p:style>
+      </p:cxnSp>
+    </p:spTree>
+    <p:extLst>
+      <p:ext uri="{BB962C8B-B14F-4D97-AF65-F5344CB8AC3E}">
+        <p14:creationId xmlns:p14="http://schemas.microsoft.com/office/powerpoint/2010/main" val="1769353711"/>
       </p:ext>
     </p:extLst>
   </p:cSld>
@@ -8070,7 +8813,7 @@
           <p:cNvPr id="2" name="Titolo 1">
             <a:extLst>
               <a:ext uri="{FF2B5EF4-FFF2-40B4-BE49-F238E27FC236}">
-                <a16:creationId xmlns:a16="http://schemas.microsoft.com/office/drawing/2014/main" id="{6B5C8CE6-773B-4C99-A303-3A55CAA756D3}"/>
+                <a16:creationId xmlns:a16="http://schemas.microsoft.com/office/drawing/2014/main" id="{46E9E1F8-8C38-4444-9E91-AEA784B6981E}"/>
               </a:ext>
             </a:extLst>
           </p:cNvPr>
@@ -8081,22 +8824,15 @@
             <p:ph type="title"/>
           </p:nvPr>
         </p:nvSpPr>
-        <p:spPr>
-          <a:xfrm>
-            <a:off x="539552" y="117066"/>
-            <a:ext cx="7886700" cy="421929"/>
-          </a:xfrm>
-        </p:spPr>
-        <p:txBody>
-          <a:bodyPr>
-            <a:noAutofit/>
-          </a:bodyPr>
+        <p:spPr/>
+        <p:txBody>
+          <a:bodyPr/>
           <a:lstStyle/>
           <a:p>
             <a:pPr algn="ctr"/>
             <a:r>
               <a:rPr lang="it-IT" dirty="0"/>
-              <a:t>Dataset</a:t>
+              <a:t>Valutazione</a:t>
             </a:r>
           </a:p>
         </p:txBody>
@@ -8106,7 +8842,7 @@
           <p:cNvPr id="3" name="Segnaposto contenuto 2">
             <a:extLst>
               <a:ext uri="{FF2B5EF4-FFF2-40B4-BE49-F238E27FC236}">
-                <a16:creationId xmlns:a16="http://schemas.microsoft.com/office/drawing/2014/main" id="{BE723A70-E80B-4CA0-941A-CB18D109A863}"/>
+                <a16:creationId xmlns:a16="http://schemas.microsoft.com/office/drawing/2014/main" id="{751510C9-6594-4046-8B7F-321272A9BB79}"/>
               </a:ext>
             </a:extLst>
           </p:cNvPr>
@@ -8117,417 +8853,125 @@
             <p:ph idx="1"/>
           </p:nvPr>
         </p:nvSpPr>
-        <p:spPr>
-          <a:xfrm>
-            <a:off x="179512" y="538995"/>
-            <a:ext cx="8784976" cy="1017797"/>
-          </a:xfrm>
-        </p:spPr>
+        <p:spPr/>
         <p:txBody>
           <a:bodyPr>
-            <a:normAutofit lnSpcReduction="10000"/>
-          </a:bodyPr>
-          <a:lstStyle/>
-          <a:p>
-            <a:pPr marL="0" indent="0" algn="l">
-              <a:buNone/>
-            </a:pPr>
-            <a:r>
-              <a:rPr lang="it-IT" sz="2200" b="1" dirty="0"/>
-              <a:t>Frappe: </a:t>
-            </a:r>
-          </a:p>
-          <a:p>
-            <a:pPr marL="0" indent="0" algn="l">
-              <a:buNone/>
-            </a:pPr>
-            <a:r>
-              <a:rPr lang="it-IT" sz="1900" b="0" i="0" u="none" strike="noStrike" baseline="0" dirty="0"/>
-              <a:t>È un dataset di feedback impliciti collezionato da un sistema di raccomandazione </a:t>
-            </a:r>
-            <a:r>
-              <a:rPr lang="it-IT" sz="1900" b="0" i="0" u="none" strike="noStrike" baseline="0" dirty="0" err="1"/>
-              <a:t>context-aware</a:t>
-            </a:r>
-            <a:r>
-              <a:rPr lang="it-IT" sz="1900" b="0" i="0" u="none" strike="noStrike" baseline="0" dirty="0"/>
-              <a:t> di applicazioni Android.</a:t>
-            </a:r>
-          </a:p>
-          <a:p>
-            <a:pPr marL="0" indent="0">
-              <a:buNone/>
-            </a:pPr>
-            <a:endParaRPr lang="it-IT" b="1" dirty="0"/>
-          </a:p>
-        </p:txBody>
-      </p:sp>
-      <p:sp>
-        <p:nvSpPr>
-          <p:cNvPr id="9" name="CasellaDiTesto 8">
-            <a:extLst>
-              <a:ext uri="{FF2B5EF4-FFF2-40B4-BE49-F238E27FC236}">
-                <a16:creationId xmlns:a16="http://schemas.microsoft.com/office/drawing/2014/main" id="{A4BA0D4A-419D-4B7E-80B1-C402EFBEA01F}"/>
-              </a:ext>
-            </a:extLst>
-          </p:cNvPr>
-          <p:cNvSpPr txBox="1"/>
-          <p:nvPr/>
-        </p:nvSpPr>
-        <p:spPr>
-          <a:xfrm>
-            <a:off x="154792" y="3429000"/>
-            <a:ext cx="8809695" cy="936104"/>
-          </a:xfrm>
-          <a:prstGeom prst="rect">
-            <a:avLst/>
-          </a:prstGeom>
-          <a:noFill/>
-        </p:spPr>
-        <p:txBody>
-          <a:bodyPr wrap="square">
-            <a:normAutofit lnSpcReduction="10000"/>
-          </a:bodyPr>
-          <a:lstStyle/>
-          <a:p>
-            <a:r>
-              <a:rPr lang="it-IT" sz="2000" b="1" dirty="0"/>
-              <a:t>My Digital Footprint (MDF): </a:t>
-            </a:r>
-          </a:p>
-          <a:p>
-            <a:r>
-              <a:rPr lang="it-IT" dirty="0"/>
-              <a:t>È un dataset composto da dati di sensori di smartphone, informazioni di prossimità fisica, e interazioni sugli online social network.</a:t>
-            </a:r>
-          </a:p>
-          <a:p>
-            <a:endParaRPr lang="it-IT" dirty="0"/>
-          </a:p>
-          <a:p>
-            <a:endParaRPr lang="it-IT" dirty="0"/>
-          </a:p>
-          <a:p>
-            <a:endParaRPr lang="it-IT" dirty="0"/>
-          </a:p>
-          <a:p>
-            <a:endParaRPr lang="it-IT" dirty="0"/>
-          </a:p>
-          <a:p>
-            <a:endParaRPr lang="it-IT" dirty="0"/>
-          </a:p>
-        </p:txBody>
-      </p:sp>
-      <p:sp>
-        <p:nvSpPr>
-          <p:cNvPr id="10" name="CasellaDiTesto 9">
-            <a:extLst>
-              <a:ext uri="{FF2B5EF4-FFF2-40B4-BE49-F238E27FC236}">
-                <a16:creationId xmlns:a16="http://schemas.microsoft.com/office/drawing/2014/main" id="{3D9FFB73-567F-4A21-9A4E-FD1CA3A2DC3D}"/>
-              </a:ext>
-            </a:extLst>
-          </p:cNvPr>
-          <p:cNvSpPr txBox="1"/>
-          <p:nvPr/>
-        </p:nvSpPr>
-        <p:spPr>
-          <a:xfrm>
-            <a:off x="179512" y="4221087"/>
-            <a:ext cx="8784976" cy="2519847"/>
-          </a:xfrm>
-          <a:prstGeom prst="rect">
-            <a:avLst/>
-          </a:prstGeom>
-          <a:noFill/>
-        </p:spPr>
-        <p:txBody>
-          <a:bodyPr wrap="square" numCol="2" rtlCol="0">
-            <a:normAutofit lnSpcReduction="10000"/>
-          </a:bodyPr>
-          <a:lstStyle/>
-          <a:p>
-            <a:r>
-              <a:rPr lang="it-IT" u="sng" dirty="0"/>
-              <a:t>Statistiche:</a:t>
-            </a:r>
-          </a:p>
-          <a:p>
-            <a:pPr marL="285750" indent="-285750">
-              <a:buFont typeface="Arial" panose="020B0604020202020204" pitchFamily="34" charset="0"/>
-              <a:buChar char="•"/>
-            </a:pPr>
-            <a:r>
-              <a:rPr lang="it-IT" sz="1800" b="0" i="0" u="none" strike="noStrike" baseline="0" dirty="0">
-                <a:latin typeface="CMR12"/>
-              </a:rPr>
-              <a:t>73176 rating</a:t>
-            </a:r>
-          </a:p>
-          <a:p>
-            <a:pPr marL="285750" indent="-285750">
-              <a:buFont typeface="Arial" panose="020B0604020202020204" pitchFamily="34" charset="0"/>
-              <a:buChar char="•"/>
-            </a:pPr>
-            <a:r>
-              <a:rPr lang="it-IT" dirty="0">
-                <a:latin typeface="CMR12"/>
-              </a:rPr>
-              <a:t>31 utenti</a:t>
-            </a:r>
-          </a:p>
-          <a:p>
-            <a:pPr marL="285750" indent="-285750">
-              <a:buFont typeface="Arial" panose="020B0604020202020204" pitchFamily="34" charset="0"/>
-              <a:buChar char="•"/>
-            </a:pPr>
-            <a:r>
-              <a:rPr lang="it-IT" dirty="0"/>
-              <a:t>338 oggetti</a:t>
-            </a:r>
-          </a:p>
-          <a:p>
-            <a:pPr marL="285750" indent="-285750">
-              <a:buFont typeface="Arial" panose="020B0604020202020204" pitchFamily="34" charset="0"/>
-              <a:buChar char="•"/>
-            </a:pPr>
-            <a:endParaRPr lang="it-IT" dirty="0"/>
-          </a:p>
-          <a:p>
-            <a:r>
-              <a:rPr lang="it-IT" u="sng" dirty="0"/>
-              <a:t>Feature di contesto:</a:t>
-            </a:r>
-          </a:p>
-          <a:p>
-            <a:pPr marL="285750" indent="-285750">
-              <a:buFont typeface="Arial" panose="020B0604020202020204" pitchFamily="34" charset="0"/>
-              <a:buChar char="•"/>
-            </a:pPr>
-            <a:r>
-              <a:rPr lang="it-IT" dirty="0"/>
-              <a:t>Attività utente (a piedi, in bici, corsa…)</a:t>
-            </a:r>
-          </a:p>
-          <a:p>
-            <a:pPr marL="285750" indent="-285750">
-              <a:buFont typeface="Arial" panose="020B0604020202020204" pitchFamily="34" charset="0"/>
-              <a:buChar char="•"/>
-            </a:pPr>
-            <a:r>
-              <a:rPr lang="it-IT" dirty="0"/>
-              <a:t>Modalità audio (silenzioso, vibrazione…)</a:t>
-            </a:r>
-          </a:p>
-          <a:p>
-            <a:pPr marL="285750" indent="-285750">
-              <a:buFont typeface="Arial" panose="020B0604020202020204" pitchFamily="34" charset="0"/>
-              <a:buChar char="•"/>
-            </a:pPr>
-            <a:r>
-              <a:rPr lang="it-IT" dirty="0"/>
-              <a:t>Volume </a:t>
-            </a:r>
-          </a:p>
-          <a:p>
-            <a:pPr marL="285750" indent="-285750">
-              <a:buFont typeface="Arial" panose="020B0604020202020204" pitchFamily="34" charset="0"/>
-              <a:buChar char="•"/>
-            </a:pPr>
-            <a:r>
-              <a:rPr lang="it-IT" dirty="0"/>
-              <a:t>Musica </a:t>
-            </a:r>
-          </a:p>
-          <a:p>
-            <a:pPr marL="285750" indent="-285750">
-              <a:buFont typeface="Arial" panose="020B0604020202020204" pitchFamily="34" charset="0"/>
-              <a:buChar char="•"/>
-            </a:pPr>
-            <a:r>
-              <a:rPr lang="it-IT" dirty="0"/>
-              <a:t>Batteria (livello, in carica)</a:t>
-            </a:r>
-          </a:p>
-          <a:p>
-            <a:pPr marL="285750" indent="-285750">
-              <a:buFont typeface="Arial" panose="020B0604020202020204" pitchFamily="34" charset="0"/>
-              <a:buChar char="•"/>
-            </a:pPr>
-            <a:r>
-              <a:rPr lang="it-IT" dirty="0"/>
-              <a:t>Schermo (rotazione, stato)</a:t>
-            </a:r>
-          </a:p>
-          <a:p>
-            <a:pPr marL="285750" indent="-285750">
-              <a:buFont typeface="Arial" panose="020B0604020202020204" pitchFamily="34" charset="0"/>
-              <a:buChar char="•"/>
-            </a:pPr>
-            <a:r>
-              <a:rPr lang="it-IT" dirty="0"/>
-              <a:t>Meteo</a:t>
-            </a:r>
-          </a:p>
-          <a:p>
-            <a:pPr marL="285750" indent="-285750">
-              <a:buFont typeface="Arial" panose="020B0604020202020204" pitchFamily="34" charset="0"/>
-              <a:buChar char="•"/>
-            </a:pPr>
-            <a:r>
-              <a:rPr lang="it-IT" dirty="0"/>
-              <a:t>WiFi</a:t>
-            </a:r>
-          </a:p>
-          <a:p>
-            <a:pPr marL="285750" indent="-285750">
-              <a:buFont typeface="Arial" panose="020B0604020202020204" pitchFamily="34" charset="0"/>
-              <a:buChar char="•"/>
-            </a:pPr>
-            <a:r>
-              <a:rPr lang="it-IT" dirty="0"/>
-              <a:t>Data e ora</a:t>
-            </a:r>
-          </a:p>
-          <a:p>
-            <a:pPr marL="285750" indent="-285750">
-              <a:buFont typeface="Arial" panose="020B0604020202020204" pitchFamily="34" charset="0"/>
-              <a:buChar char="•"/>
-            </a:pPr>
-            <a:r>
-              <a:rPr lang="it-IT" dirty="0"/>
-              <a:t>Tipologia di persone in prossimità dell’utente</a:t>
-            </a:r>
-          </a:p>
-          <a:p>
-            <a:endParaRPr lang="it-IT" dirty="0"/>
-          </a:p>
-        </p:txBody>
-      </p:sp>
-      <p:sp>
-        <p:nvSpPr>
-          <p:cNvPr id="4" name="CasellaDiTesto 3">
-            <a:extLst>
-              <a:ext uri="{FF2B5EF4-FFF2-40B4-BE49-F238E27FC236}">
-                <a16:creationId xmlns:a16="http://schemas.microsoft.com/office/drawing/2014/main" id="{74541A4D-BABD-4315-853C-48B6205E8C1A}"/>
-              </a:ext>
-            </a:extLst>
-          </p:cNvPr>
-          <p:cNvSpPr txBox="1"/>
-          <p:nvPr/>
-        </p:nvSpPr>
-        <p:spPr>
-          <a:xfrm>
-            <a:off x="179512" y="1556792"/>
-            <a:ext cx="8640960" cy="1754326"/>
-          </a:xfrm>
-          <a:prstGeom prst="rect">
-            <a:avLst/>
-          </a:prstGeom>
-          <a:noFill/>
-        </p:spPr>
-        <p:txBody>
-          <a:bodyPr wrap="square" numCol="2" rtlCol="0">
             <a:normAutofit/>
           </a:bodyPr>
           <a:lstStyle/>
           <a:p>
-            <a:pPr marL="0" indent="0" algn="l">
-              <a:buNone/>
-            </a:pPr>
-            <a:r>
-              <a:rPr lang="it-IT" u="sng" dirty="0"/>
-              <a:t>Statistiche:</a:t>
-            </a:r>
-          </a:p>
-          <a:p>
-            <a:pPr marL="342900" indent="-342900" algn="l">
-              <a:buFont typeface="Arial" panose="020B0604020202020204" pitchFamily="34" charset="0"/>
-              <a:buChar char="•"/>
-            </a:pPr>
             <a:r>
               <a:rPr lang="it-IT" dirty="0"/>
-              <a:t>78335 rating</a:t>
-            </a:r>
-          </a:p>
-          <a:p>
-            <a:pPr marL="342900" indent="-342900" algn="l">
-              <a:buFont typeface="Arial" panose="020B0604020202020204" pitchFamily="34" charset="0"/>
-              <a:buChar char="•"/>
-            </a:pPr>
+              <a:t>Obiettivi: </a:t>
+            </a:r>
+          </a:p>
+          <a:p>
+            <a:pPr lvl="1"/>
             <a:r>
               <a:rPr lang="it-IT" dirty="0"/>
-              <a:t>857 utenti</a:t>
-            </a:r>
-          </a:p>
-          <a:p>
-            <a:pPr marL="342900" indent="-342900" algn="l">
-              <a:buFont typeface="Arial" panose="020B0604020202020204" pitchFamily="34" charset="0"/>
-              <a:buChar char="•"/>
-            </a:pPr>
+              <a:t>ottenere prestazioni comparabili agli algoritmi stato dell’arte</a:t>
+            </a:r>
+          </a:p>
+          <a:p>
+            <a:pPr lvl="1"/>
             <a:r>
               <a:rPr lang="it-IT" dirty="0"/>
-              <a:t>3180 oggetti</a:t>
-            </a:r>
-          </a:p>
-          <a:p>
-            <a:pPr marL="0" indent="0" algn="l">
-              <a:buNone/>
-            </a:pPr>
-            <a:endParaRPr lang="it-IT" u="sng" dirty="0"/>
-          </a:p>
-          <a:p>
-            <a:pPr marL="0" indent="0" algn="l">
-              <a:buNone/>
-            </a:pPr>
-            <a:endParaRPr lang="it-IT" u="sng" dirty="0"/>
-          </a:p>
-          <a:p>
-            <a:pPr marL="0" indent="0" algn="l">
-              <a:buNone/>
-            </a:pPr>
-            <a:r>
-              <a:rPr lang="it-IT" u="sng" dirty="0"/>
-              <a:t>Feature di contesto:</a:t>
-            </a:r>
-          </a:p>
-          <a:p>
-            <a:pPr marL="285750" indent="-285750">
-              <a:buFont typeface="Arial" panose="020B0604020202020204" pitchFamily="34" charset="0"/>
-              <a:buChar char="•"/>
-            </a:pPr>
+              <a:t>Mantenere tempi di esecuzione bassi</a:t>
+            </a:r>
+          </a:p>
+          <a:p>
             <a:r>
               <a:rPr lang="it-IT" dirty="0"/>
-              <a:t>Momento giornata</a:t>
-            </a:r>
-          </a:p>
-          <a:p>
-            <a:pPr marL="285750" indent="-285750">
-              <a:buFont typeface="Arial" panose="020B0604020202020204" pitchFamily="34" charset="0"/>
-              <a:buChar char="•"/>
-            </a:pPr>
+              <a:t>Metrica: Area Under the ROC Curve (AUC)</a:t>
+            </a:r>
+          </a:p>
+          <a:p>
             <a:r>
               <a:rPr lang="it-IT" dirty="0"/>
-              <a:t>Giorno della settimana</a:t>
-            </a:r>
-          </a:p>
-          <a:p>
-            <a:pPr marL="285750" indent="-285750">
-              <a:buFont typeface="Arial" panose="020B0604020202020204" pitchFamily="34" charset="0"/>
-              <a:buChar char="•"/>
-            </a:pPr>
+              <a:t>K-</a:t>
+            </a:r>
+            <a:r>
+              <a:rPr lang="it-IT" dirty="0" err="1"/>
+              <a:t>fold</a:t>
+            </a:r>
             <a:r>
               <a:rPr lang="it-IT" dirty="0"/>
-              <a:t>Se è il fine settimana</a:t>
-            </a:r>
-          </a:p>
-          <a:p>
-            <a:pPr marL="285750" indent="-285750">
-              <a:buFont typeface="Arial" panose="020B0604020202020204" pitchFamily="34" charset="0"/>
-              <a:buChar char="•"/>
-            </a:pPr>
+              <a:t> cross </a:t>
+            </a:r>
+            <a:r>
+              <a:rPr lang="it-IT" dirty="0" err="1"/>
+              <a:t>validation</a:t>
+            </a:r>
             <a:r>
               <a:rPr lang="it-IT" dirty="0"/>
-              <a:t>Meteo</a:t>
+              <a:t>, k = 10</a:t>
+            </a:r>
+          </a:p>
+          <a:p>
+            <a:r>
+              <a:rPr lang="it-IT" dirty="0"/>
+              <a:t>Modelli di confronto:</a:t>
+            </a:r>
+          </a:p>
+          <a:p>
+            <a:pPr lvl="1"/>
+            <a:r>
+              <a:rPr lang="it-IT" dirty="0"/>
+              <a:t>ALS </a:t>
+            </a:r>
+            <a:r>
+              <a:rPr lang="it-IT" dirty="0">
+                <a:sym typeface="Wingdings" panose="05000000000000000000" pitchFamily="2" charset="2"/>
+              </a:rPr>
+              <a:t> </a:t>
+            </a:r>
+            <a:r>
+              <a:rPr lang="it-IT" dirty="0" err="1">
+                <a:sym typeface="Wingdings" panose="05000000000000000000" pitchFamily="2" charset="2"/>
+              </a:rPr>
+              <a:t>matrix</a:t>
+            </a:r>
+            <a:r>
+              <a:rPr lang="it-IT" dirty="0">
+                <a:sym typeface="Wingdings" panose="05000000000000000000" pitchFamily="2" charset="2"/>
+              </a:rPr>
+              <a:t> </a:t>
+            </a:r>
+            <a:r>
+              <a:rPr lang="it-IT" dirty="0" err="1">
+                <a:sym typeface="Wingdings" panose="05000000000000000000" pitchFamily="2" charset="2"/>
+              </a:rPr>
+              <a:t>factorization</a:t>
+            </a:r>
+            <a:r>
+              <a:rPr lang="it-IT" dirty="0">
+                <a:sym typeface="Wingdings" panose="05000000000000000000" pitchFamily="2" charset="2"/>
+              </a:rPr>
+              <a:t> per feedback impliciti</a:t>
+            </a:r>
+            <a:endParaRPr lang="it-IT" dirty="0"/>
+          </a:p>
+          <a:p>
+            <a:pPr lvl="1"/>
+            <a:r>
+              <a:rPr lang="it-IT" dirty="0" err="1"/>
+              <a:t>NeuMF</a:t>
+            </a:r>
+            <a:endParaRPr lang="it-IT" dirty="0"/>
+          </a:p>
+          <a:p>
+            <a:pPr lvl="1"/>
+            <a:r>
+              <a:rPr lang="it-IT" dirty="0"/>
+              <a:t>ECAM </a:t>
+            </a:r>
+            <a:r>
+              <a:rPr lang="it-IT" dirty="0" err="1"/>
+              <a:t>NeuMF</a:t>
+            </a:r>
+            <a:r>
+              <a:rPr lang="it-IT" dirty="0"/>
+              <a:t> </a:t>
             </a:r>
           </a:p>
           <a:p>
@@ -8538,7 +8982,7 @@
     </p:spTree>
     <p:extLst>
       <p:ext uri="{BB962C8B-B14F-4D97-AF65-F5344CB8AC3E}">
-        <p14:creationId xmlns:p14="http://schemas.microsoft.com/office/powerpoint/2010/main" val="1769353711"/>
+        <p14:creationId xmlns:p14="http://schemas.microsoft.com/office/powerpoint/2010/main" val="541751724"/>
       </p:ext>
     </p:extLst>
   </p:cSld>

</xml_diff>